<commit_message>
Add website link to our ppt
</commit_message>
<xml_diff>
--- a/Solar Electric Programs Reported_member1-Liu_member2-Tsai_member3-Yan_member4-Nwalie.pptx
+++ b/Solar Electric Programs Reported_member1-Liu_member2-Tsai_member3-Yan_member4-Nwalie.pptx
@@ -24,9 +24,10 @@
     <p:sldId id="260" r:id="rId18"/>
     <p:sldId id="280" r:id="rId19"/>
     <p:sldId id="281" r:id="rId20"/>
-    <p:sldId id="261" r:id="rId21"/>
-    <p:sldId id="262" r:id="rId22"/>
-    <p:sldId id="263" r:id="rId23"/>
+    <p:sldId id="283" r:id="rId21"/>
+    <p:sldId id="261" r:id="rId22"/>
+    <p:sldId id="262" r:id="rId23"/>
+    <p:sldId id="263" r:id="rId24"/>
   </p:sldIdLst>
   <p:sldSz cx="12192000" cy="6858000"/>
   <p:notesSz cx="6858000" cy="9144000"/>
@@ -1083,6 +1084,13 @@
         </dgm:presLayoutVars>
       </dgm:prSet>
       <dgm:spPr/>
+      <dgm:t>
+        <a:bodyPr/>
+        <a:lstStyle/>
+        <a:p>
+          <a:endParaRPr lang="zh-CN" altLang="en-US"/>
+        </a:p>
+      </dgm:t>
     </dgm:pt>
     <dgm:pt modelId="{2E4ED3BE-E049-4939-97B9-5B6C26808585}" type="pres">
       <dgm:prSet presAssocID="{0DD325A2-7355-4906-8303-DA65448A46EA}" presName="compNode" presStyleCnt="0"/>
@@ -1098,7 +1106,7 @@
                 <a14:useLocalDpi xmlns:a14="http://schemas.microsoft.com/office/drawing/2010/main" val="0"/>
               </a:ext>
               <a:ext uri="{96DAC541-7B7A-43D3-8B79-37D633B846F1}">
-                <asvg:svgBlip xmlns:asvg="http://schemas.microsoft.com/office/drawing/2016/SVG/main" r:embed="rId2"/>
+                <asvg:svgBlip xmlns:asvg="http://schemas.microsoft.com/office/drawing/2016/SVG/main" xmlns="" r:embed="rId2"/>
               </a:ext>
             </a:extLst>
           </a:blip>
@@ -1128,6 +1136,13 @@
         </dgm:presLayoutVars>
       </dgm:prSet>
       <dgm:spPr/>
+      <dgm:t>
+        <a:bodyPr/>
+        <a:lstStyle/>
+        <a:p>
+          <a:endParaRPr lang="zh-CN" altLang="en-US"/>
+        </a:p>
+      </dgm:t>
     </dgm:pt>
     <dgm:pt modelId="{0906240C-27C4-4CA9-A5E7-55E4A5662B02}" type="pres">
       <dgm:prSet presAssocID="{68EF5A79-504B-4365-A44E-4332160F13DB}" presName="sibTrans" presStyleCnt="0"/>
@@ -1147,7 +1162,7 @@
                 <a14:useLocalDpi xmlns:a14="http://schemas.microsoft.com/office/drawing/2010/main" val="0"/>
               </a:ext>
               <a:ext uri="{96DAC541-7B7A-43D3-8B79-37D633B846F1}">
-                <asvg:svgBlip xmlns:asvg="http://schemas.microsoft.com/office/drawing/2016/SVG/main" r:embed="rId4"/>
+                <asvg:svgBlip xmlns:asvg="http://schemas.microsoft.com/office/drawing/2016/SVG/main" xmlns="" r:embed="rId4"/>
               </a:ext>
             </a:extLst>
           </a:blip>
@@ -1177,6 +1192,13 @@
         </dgm:presLayoutVars>
       </dgm:prSet>
       <dgm:spPr/>
+      <dgm:t>
+        <a:bodyPr/>
+        <a:lstStyle/>
+        <a:p>
+          <a:endParaRPr lang="zh-CN" altLang="en-US"/>
+        </a:p>
+      </dgm:t>
     </dgm:pt>
     <dgm:pt modelId="{7A280B25-3D62-46B2-877C-B2B9517A009B}" type="pres">
       <dgm:prSet presAssocID="{6CD49CED-BB50-4169-85B0-8825F125395E}" presName="sibTrans" presStyleCnt="0"/>
@@ -1196,7 +1218,7 @@
                 <a14:useLocalDpi xmlns:a14="http://schemas.microsoft.com/office/drawing/2010/main" val="0"/>
               </a:ext>
               <a:ext uri="{96DAC541-7B7A-43D3-8B79-37D633B846F1}">
-                <asvg:svgBlip xmlns:asvg="http://schemas.microsoft.com/office/drawing/2016/SVG/main" r:embed="rId6"/>
+                <asvg:svgBlip xmlns:asvg="http://schemas.microsoft.com/office/drawing/2016/SVG/main" xmlns="" r:embed="rId6"/>
               </a:ext>
             </a:extLst>
           </a:blip>
@@ -1226,6 +1248,13 @@
         </dgm:presLayoutVars>
       </dgm:prSet>
       <dgm:spPr/>
+      <dgm:t>
+        <a:bodyPr/>
+        <a:lstStyle/>
+        <a:p>
+          <a:endParaRPr lang="zh-CN" altLang="en-US"/>
+        </a:p>
+      </dgm:t>
     </dgm:pt>
     <dgm:pt modelId="{0AC26194-6C91-4119-ACB8-573048B8FA7B}" type="pres">
       <dgm:prSet presAssocID="{7BCCBAD0-A221-470C-9B7D-7BBB4D99C4F1}" presName="sibTrans" presStyleCnt="0"/>
@@ -1245,7 +1274,7 @@
                 <a14:useLocalDpi xmlns:a14="http://schemas.microsoft.com/office/drawing/2010/main" val="0"/>
               </a:ext>
               <a:ext uri="{96DAC541-7B7A-43D3-8B79-37D633B846F1}">
-                <asvg:svgBlip xmlns:asvg="http://schemas.microsoft.com/office/drawing/2016/SVG/main" r:embed="rId8"/>
+                <asvg:svgBlip xmlns:asvg="http://schemas.microsoft.com/office/drawing/2016/SVG/main" xmlns="" r:embed="rId8"/>
               </a:ext>
             </a:extLst>
           </a:blip>
@@ -1275,18 +1304,25 @@
         </dgm:presLayoutVars>
       </dgm:prSet>
       <dgm:spPr/>
+      <dgm:t>
+        <a:bodyPr/>
+        <a:lstStyle/>
+        <a:p>
+          <a:endParaRPr lang="zh-CN" altLang="en-US"/>
+        </a:p>
+      </dgm:t>
     </dgm:pt>
   </dgm:ptLst>
   <dgm:cxnLst>
+    <dgm:cxn modelId="{82DA868F-643C-456E-BA1B-1C9AC9DBD598}" srcId="{0BEF144E-64B9-4423-B557-2C068717EA5A}" destId="{E623C05A-BD73-40BA-B592-52F2A6D7BE24}" srcOrd="2" destOrd="0" parTransId="{6BE32E37-76FB-495E-98A6-F093A08C2204}" sibTransId="{7BCCBAD0-A221-470C-9B7D-7BBB4D99C4F1}"/>
+    <dgm:cxn modelId="{289D1459-E4E7-4C04-9264-0CD135A3C7B5}" type="presOf" srcId="{E623C05A-BD73-40BA-B592-52F2A6D7BE24}" destId="{DF35177C-D3B7-4AF6-BCB2-DE93F8709DAA}" srcOrd="0" destOrd="0" presId="urn:microsoft.com/office/officeart/2018/2/layout/IconLabelList"/>
+    <dgm:cxn modelId="{FED27461-C585-4139-81E1-F1434AD19A20}" srcId="{0BEF144E-64B9-4423-B557-2C068717EA5A}" destId="{0DD325A2-7355-4906-8303-DA65448A46EA}" srcOrd="0" destOrd="0" parTransId="{2BC50A9E-5C2B-4428-BD9B-A655B68EBDE6}" sibTransId="{68EF5A79-504B-4365-A44E-4332160F13DB}"/>
     <dgm:cxn modelId="{44E78828-40D1-423A-A8DA-542688D52763}" type="presOf" srcId="{4828C3F5-C3F0-4B5A-B041-CD173D30D874}" destId="{B413CBB5-4F0B-417A-8D0E-4DCF716F7515}" srcOrd="0" destOrd="0" presId="urn:microsoft.com/office/officeart/2018/2/layout/IconLabelList"/>
-    <dgm:cxn modelId="{FED27461-C585-4139-81E1-F1434AD19A20}" srcId="{0BEF144E-64B9-4423-B557-2C068717EA5A}" destId="{0DD325A2-7355-4906-8303-DA65448A46EA}" srcOrd="0" destOrd="0" parTransId="{2BC50A9E-5C2B-4428-BD9B-A655B68EBDE6}" sibTransId="{68EF5A79-504B-4365-A44E-4332160F13DB}"/>
+    <dgm:cxn modelId="{428670ED-E194-4352-BF80-102546ABA2BE}" type="presOf" srcId="{0DD325A2-7355-4906-8303-DA65448A46EA}" destId="{BE9CA66F-C5B2-4D17-B65B-7C138C35773B}" srcOrd="0" destOrd="0" presId="urn:microsoft.com/office/officeart/2018/2/layout/IconLabelList"/>
+    <dgm:cxn modelId="{DB8CC07F-0FF9-4C86-B56B-E6F085058229}" srcId="{0BEF144E-64B9-4423-B557-2C068717EA5A}" destId="{4828C3F5-C3F0-4B5A-B041-CD173D30D874}" srcOrd="3" destOrd="0" parTransId="{21BD49A9-F909-4E4D-9510-661AC1AFA3F8}" sibTransId="{8AACDD96-0573-41BA-8693-9CB9B272BD5A}"/>
+    <dgm:cxn modelId="{C4F87FE4-7E37-4AE8-B650-87CA3693D0DB}" type="presOf" srcId="{45F5DE29-B592-4DBE-B3CB-3E8CC465F8C6}" destId="{345D69B7-E73C-4227-8BA6-74CA6BA808E5}" srcOrd="0" destOrd="0" presId="urn:microsoft.com/office/officeart/2018/2/layout/IconLabelList"/>
     <dgm:cxn modelId="{6D484458-C8B3-4E77-A0F7-A9486409BFEC}" type="presOf" srcId="{0BEF144E-64B9-4423-B557-2C068717EA5A}" destId="{CD1D4E96-0658-4029-92C2-639411016FBC}" srcOrd="0" destOrd="0" presId="urn:microsoft.com/office/officeart/2018/2/layout/IconLabelList"/>
-    <dgm:cxn modelId="{289D1459-E4E7-4C04-9264-0CD135A3C7B5}" type="presOf" srcId="{E623C05A-BD73-40BA-B592-52F2A6D7BE24}" destId="{DF35177C-D3B7-4AF6-BCB2-DE93F8709DAA}" srcOrd="0" destOrd="0" presId="urn:microsoft.com/office/officeart/2018/2/layout/IconLabelList"/>
-    <dgm:cxn modelId="{DB8CC07F-0FF9-4C86-B56B-E6F085058229}" srcId="{0BEF144E-64B9-4423-B557-2C068717EA5A}" destId="{4828C3F5-C3F0-4B5A-B041-CD173D30D874}" srcOrd="3" destOrd="0" parTransId="{21BD49A9-F909-4E4D-9510-661AC1AFA3F8}" sibTransId="{8AACDD96-0573-41BA-8693-9CB9B272BD5A}"/>
-    <dgm:cxn modelId="{82DA868F-643C-456E-BA1B-1C9AC9DBD598}" srcId="{0BEF144E-64B9-4423-B557-2C068717EA5A}" destId="{E623C05A-BD73-40BA-B592-52F2A6D7BE24}" srcOrd="2" destOrd="0" parTransId="{6BE32E37-76FB-495E-98A6-F093A08C2204}" sibTransId="{7BCCBAD0-A221-470C-9B7D-7BBB4D99C4F1}"/>
     <dgm:cxn modelId="{92961ED3-082B-42E2-9561-85D36D6C721B}" srcId="{0BEF144E-64B9-4423-B557-2C068717EA5A}" destId="{45F5DE29-B592-4DBE-B3CB-3E8CC465F8C6}" srcOrd="1" destOrd="0" parTransId="{DFEFD171-B65E-4C54-867D-4D17B304371A}" sibTransId="{6CD49CED-BB50-4169-85B0-8825F125395E}"/>
-    <dgm:cxn modelId="{C4F87FE4-7E37-4AE8-B650-87CA3693D0DB}" type="presOf" srcId="{45F5DE29-B592-4DBE-B3CB-3E8CC465F8C6}" destId="{345D69B7-E73C-4227-8BA6-74CA6BA808E5}" srcOrd="0" destOrd="0" presId="urn:microsoft.com/office/officeart/2018/2/layout/IconLabelList"/>
-    <dgm:cxn modelId="{428670ED-E194-4352-BF80-102546ABA2BE}" type="presOf" srcId="{0DD325A2-7355-4906-8303-DA65448A46EA}" destId="{BE9CA66F-C5B2-4D17-B65B-7C138C35773B}" srcOrd="0" destOrd="0" presId="urn:microsoft.com/office/officeart/2018/2/layout/IconLabelList"/>
     <dgm:cxn modelId="{676C6083-C4CE-49E0-AC1A-A125E5A679DE}" type="presParOf" srcId="{CD1D4E96-0658-4029-92C2-639411016FBC}" destId="{2E4ED3BE-E049-4939-97B9-5B6C26808585}" srcOrd="0" destOrd="0" presId="urn:microsoft.com/office/officeart/2018/2/layout/IconLabelList"/>
     <dgm:cxn modelId="{900AC823-00FF-4708-8E34-38863CBCBC39}" type="presParOf" srcId="{2E4ED3BE-E049-4939-97B9-5B6C26808585}" destId="{631A214F-B602-42D6-8A2D-B6D192B8F777}" srcOrd="0" destOrd="0" presId="urn:microsoft.com/office/officeart/2018/2/layout/IconLabelList"/>
     <dgm:cxn modelId="{1784D960-7265-48E1-8222-6E5A04A24A89}" type="presParOf" srcId="{2E4ED3BE-E049-4939-97B9-5B6C26808585}" destId="{0375A464-A8E4-48E3-A723-17888EFD8D9C}" srcOrd="1" destOrd="0" presId="urn:microsoft.com/office/officeart/2018/2/layout/IconLabelList"/>
@@ -1345,7 +1381,7 @@
                 <a14:useLocalDpi xmlns:a14="http://schemas.microsoft.com/office/drawing/2010/main" val="0"/>
               </a:ext>
               <a:ext uri="{96DAC541-7B7A-43D3-8B79-37D633B846F1}">
-                <asvg:svgBlip xmlns:asvg="http://schemas.microsoft.com/office/drawing/2016/SVG/main" r:embed="rId2"/>
+                <asvg:svgBlip xmlns:asvg="http://schemas.microsoft.com/office/drawing/2016/SVG/main" xmlns="" r:embed="rId2"/>
               </a:ext>
             </a:extLst>
           </a:blip>
@@ -1412,7 +1448,7 @@
         </a:bodyPr>
         <a:lstStyle/>
         <a:p>
-          <a:pPr marL="0" lvl="0" indent="0" algn="ctr" defTabSz="1111250">
+          <a:pPr lvl="0" algn="ctr" defTabSz="1111250">
             <a:lnSpc>
               <a:spcPct val="90000"/>
             </a:lnSpc>
@@ -1422,7 +1458,6 @@
             <a:spcAft>
               <a:spcPct val="35000"/>
             </a:spcAft>
-            <a:buNone/>
           </a:pPr>
           <a:r>
             <a:rPr lang="en-US" sz="2500" kern="1200"/>
@@ -1455,7 +1490,7 @@
                 <a14:useLocalDpi xmlns:a14="http://schemas.microsoft.com/office/drawing/2010/main" val="0"/>
               </a:ext>
               <a:ext uri="{96DAC541-7B7A-43D3-8B79-37D633B846F1}">
-                <asvg:svgBlip xmlns:asvg="http://schemas.microsoft.com/office/drawing/2016/SVG/main" r:embed="rId4"/>
+                <asvg:svgBlip xmlns:asvg="http://schemas.microsoft.com/office/drawing/2016/SVG/main" xmlns="" r:embed="rId4"/>
               </a:ext>
             </a:extLst>
           </a:blip>
@@ -1522,7 +1557,7 @@
         </a:bodyPr>
         <a:lstStyle/>
         <a:p>
-          <a:pPr marL="0" lvl="0" indent="0" algn="ctr" defTabSz="1111250">
+          <a:pPr lvl="0" algn="ctr" defTabSz="1111250">
             <a:lnSpc>
               <a:spcPct val="90000"/>
             </a:lnSpc>
@@ -1532,7 +1567,6 @@
             <a:spcAft>
               <a:spcPct val="35000"/>
             </a:spcAft>
-            <a:buNone/>
           </a:pPr>
           <a:r>
             <a:rPr lang="en-US" sz="2500" kern="1200"/>
@@ -1565,7 +1599,7 @@
                 <a14:useLocalDpi xmlns:a14="http://schemas.microsoft.com/office/drawing/2010/main" val="0"/>
               </a:ext>
               <a:ext uri="{96DAC541-7B7A-43D3-8B79-37D633B846F1}">
-                <asvg:svgBlip xmlns:asvg="http://schemas.microsoft.com/office/drawing/2016/SVG/main" r:embed="rId6"/>
+                <asvg:svgBlip xmlns:asvg="http://schemas.microsoft.com/office/drawing/2016/SVG/main" xmlns="" r:embed="rId6"/>
               </a:ext>
             </a:extLst>
           </a:blip>
@@ -1632,7 +1666,7 @@
         </a:bodyPr>
         <a:lstStyle/>
         <a:p>
-          <a:pPr marL="0" lvl="0" indent="0" algn="ctr" defTabSz="1111250">
+          <a:pPr lvl="0" algn="ctr" defTabSz="1111250">
             <a:lnSpc>
               <a:spcPct val="90000"/>
             </a:lnSpc>
@@ -1642,7 +1676,6 @@
             <a:spcAft>
               <a:spcPct val="35000"/>
             </a:spcAft>
-            <a:buNone/>
           </a:pPr>
           <a:r>
             <a:rPr lang="en-US" sz="2500" kern="1200"/>
@@ -1675,7 +1708,7 @@
                 <a14:useLocalDpi xmlns:a14="http://schemas.microsoft.com/office/drawing/2010/main" val="0"/>
               </a:ext>
               <a:ext uri="{96DAC541-7B7A-43D3-8B79-37D633B846F1}">
-                <asvg:svgBlip xmlns:asvg="http://schemas.microsoft.com/office/drawing/2016/SVG/main" r:embed="rId8"/>
+                <asvg:svgBlip xmlns:asvg="http://schemas.microsoft.com/office/drawing/2016/SVG/main" xmlns="" r:embed="rId8"/>
               </a:ext>
             </a:extLst>
           </a:blip>
@@ -1742,7 +1775,7 @@
         </a:bodyPr>
         <a:lstStyle/>
         <a:p>
-          <a:pPr marL="0" lvl="0" indent="0" algn="ctr" defTabSz="1111250">
+          <a:pPr lvl="0" algn="ctr" defTabSz="1111250">
             <a:lnSpc>
               <a:spcPct val="90000"/>
             </a:lnSpc>
@@ -1752,7 +1785,6 @@
             <a:spcAft>
               <a:spcPct val="35000"/>
             </a:spcAft>
-            <a:buNone/>
           </a:pPr>
           <a:r>
             <a:rPr lang="en-US" sz="2500" kern="1200"/>
@@ -1947,7 +1979,7 @@
   </dgm:layoutNode>
   <dgm:extLst>
     <a:ext uri="{68A01E43-0DF5-4B5B-8FA6-DAF915123BFB}">
-      <dgm1612:lstStyle xmlns:dgm1612="http://schemas.microsoft.com/office/drawing/2016/12/diagram">
+      <dgm1612:lstStyle xmlns:dgm1612="http://schemas.microsoft.com/office/drawing/2016/12/diagram" xmlns="">
         <a:lvl1pPr>
           <a:lnSpc>
             <a:spcPct val="100000"/>
@@ -3015,7 +3047,7 @@
           <p:cNvPr id="2" name="標題 1">
             <a:extLst>
               <a:ext uri="{FF2B5EF4-FFF2-40B4-BE49-F238E27FC236}">
-                <a16:creationId xmlns:a16="http://schemas.microsoft.com/office/drawing/2014/main" id="{212A8971-AB39-4412-B518-5CF56003E307}"/>
+                <a16:creationId xmlns:a16="http://schemas.microsoft.com/office/drawing/2014/main" xmlns="" id="{212A8971-AB39-4412-B518-5CF56003E307}"/>
               </a:ext>
             </a:extLst>
           </p:cNvPr>
@@ -3053,7 +3085,7 @@
           <p:cNvPr id="3" name="副標題 2">
             <a:extLst>
               <a:ext uri="{FF2B5EF4-FFF2-40B4-BE49-F238E27FC236}">
-                <a16:creationId xmlns:a16="http://schemas.microsoft.com/office/drawing/2014/main" id="{BCB707F6-C9B1-418A-9985-F72B175A76E3}"/>
+                <a16:creationId xmlns:a16="http://schemas.microsoft.com/office/drawing/2014/main" xmlns="" id="{BCB707F6-C9B1-418A-9985-F72B175A76E3}"/>
               </a:ext>
             </a:extLst>
           </p:cNvPr>
@@ -3124,7 +3156,7 @@
           <p:cNvPr id="4" name="日期版面配置區 3">
             <a:extLst>
               <a:ext uri="{FF2B5EF4-FFF2-40B4-BE49-F238E27FC236}">
-                <a16:creationId xmlns:a16="http://schemas.microsoft.com/office/drawing/2014/main" id="{7C057B30-B580-42C3-8802-D0B8FD342FF5}"/>
+                <a16:creationId xmlns:a16="http://schemas.microsoft.com/office/drawing/2014/main" xmlns="" id="{7C057B30-B580-42C3-8802-D0B8FD342FF5}"/>
               </a:ext>
             </a:extLst>
           </p:cNvPr>
@@ -3153,7 +3185,7 @@
           <p:cNvPr id="5" name="頁尾版面配置區 4">
             <a:extLst>
               <a:ext uri="{FF2B5EF4-FFF2-40B4-BE49-F238E27FC236}">
-                <a16:creationId xmlns:a16="http://schemas.microsoft.com/office/drawing/2014/main" id="{4B883AAE-946E-4F26-9752-E18AF020BBBC}"/>
+                <a16:creationId xmlns:a16="http://schemas.microsoft.com/office/drawing/2014/main" xmlns="" id="{4B883AAE-946E-4F26-9752-E18AF020BBBC}"/>
               </a:ext>
             </a:extLst>
           </p:cNvPr>
@@ -3178,7 +3210,7 @@
           <p:cNvPr id="6" name="投影片編號版面配置區 5">
             <a:extLst>
               <a:ext uri="{FF2B5EF4-FFF2-40B4-BE49-F238E27FC236}">
-                <a16:creationId xmlns:a16="http://schemas.microsoft.com/office/drawing/2014/main" id="{B36EE807-43EA-45C8-954B-558C61251739}"/>
+                <a16:creationId xmlns:a16="http://schemas.microsoft.com/office/drawing/2014/main" xmlns="" id="{B36EE807-43EA-45C8-954B-558C61251739}"/>
               </a:ext>
             </a:extLst>
           </p:cNvPr>
@@ -3237,7 +3269,7 @@
           <p:cNvPr id="2" name="標題 1">
             <a:extLst>
               <a:ext uri="{FF2B5EF4-FFF2-40B4-BE49-F238E27FC236}">
-                <a16:creationId xmlns:a16="http://schemas.microsoft.com/office/drawing/2014/main" id="{0F1A3E5E-2BC3-4F27-87B3-C3E10E70F9A3}"/>
+                <a16:creationId xmlns:a16="http://schemas.microsoft.com/office/drawing/2014/main" xmlns="" id="{0F1A3E5E-2BC3-4F27-87B3-C3E10E70F9A3}"/>
               </a:ext>
             </a:extLst>
           </p:cNvPr>
@@ -3266,7 +3298,7 @@
           <p:cNvPr id="3" name="直排文字版面配置區 2">
             <a:extLst>
               <a:ext uri="{FF2B5EF4-FFF2-40B4-BE49-F238E27FC236}">
-                <a16:creationId xmlns:a16="http://schemas.microsoft.com/office/drawing/2014/main" id="{45D5FD26-7EB8-40DE-BBA3-CBB441465D00}"/>
+                <a16:creationId xmlns:a16="http://schemas.microsoft.com/office/drawing/2014/main" xmlns="" id="{45D5FD26-7EB8-40DE-BBA3-CBB441465D00}"/>
               </a:ext>
             </a:extLst>
           </p:cNvPr>
@@ -3324,7 +3356,7 @@
           <p:cNvPr id="4" name="日期版面配置區 3">
             <a:extLst>
               <a:ext uri="{FF2B5EF4-FFF2-40B4-BE49-F238E27FC236}">
-                <a16:creationId xmlns:a16="http://schemas.microsoft.com/office/drawing/2014/main" id="{2396D0E4-BC47-4448-9A70-55C59922D041}"/>
+                <a16:creationId xmlns:a16="http://schemas.microsoft.com/office/drawing/2014/main" xmlns="" id="{2396D0E4-BC47-4448-9A70-55C59922D041}"/>
               </a:ext>
             </a:extLst>
           </p:cNvPr>
@@ -3353,7 +3385,7 @@
           <p:cNvPr id="5" name="頁尾版面配置區 4">
             <a:extLst>
               <a:ext uri="{FF2B5EF4-FFF2-40B4-BE49-F238E27FC236}">
-                <a16:creationId xmlns:a16="http://schemas.microsoft.com/office/drawing/2014/main" id="{4CAF189D-AB91-4988-8590-B69C94A8953A}"/>
+                <a16:creationId xmlns:a16="http://schemas.microsoft.com/office/drawing/2014/main" xmlns="" id="{4CAF189D-AB91-4988-8590-B69C94A8953A}"/>
               </a:ext>
             </a:extLst>
           </p:cNvPr>
@@ -3378,7 +3410,7 @@
           <p:cNvPr id="6" name="投影片編號版面配置區 5">
             <a:extLst>
               <a:ext uri="{FF2B5EF4-FFF2-40B4-BE49-F238E27FC236}">
-                <a16:creationId xmlns:a16="http://schemas.microsoft.com/office/drawing/2014/main" id="{8ED462F6-C20C-4CEE-B084-169FCA0ADCFF}"/>
+                <a16:creationId xmlns:a16="http://schemas.microsoft.com/office/drawing/2014/main" xmlns="" id="{8ED462F6-C20C-4CEE-B084-169FCA0ADCFF}"/>
               </a:ext>
             </a:extLst>
           </p:cNvPr>
@@ -3437,7 +3469,7 @@
           <p:cNvPr id="2" name="直排標題 1">
             <a:extLst>
               <a:ext uri="{FF2B5EF4-FFF2-40B4-BE49-F238E27FC236}">
-                <a16:creationId xmlns:a16="http://schemas.microsoft.com/office/drawing/2014/main" id="{9BE92EF9-2602-4E26-AA18-230EE8642594}"/>
+                <a16:creationId xmlns:a16="http://schemas.microsoft.com/office/drawing/2014/main" xmlns="" id="{9BE92EF9-2602-4E26-AA18-230EE8642594}"/>
               </a:ext>
             </a:extLst>
           </p:cNvPr>
@@ -3471,7 +3503,7 @@
           <p:cNvPr id="3" name="直排文字版面配置區 2">
             <a:extLst>
               <a:ext uri="{FF2B5EF4-FFF2-40B4-BE49-F238E27FC236}">
-                <a16:creationId xmlns:a16="http://schemas.microsoft.com/office/drawing/2014/main" id="{7E1EDF43-9BD0-448F-B406-50B41E3BAD4C}"/>
+                <a16:creationId xmlns:a16="http://schemas.microsoft.com/office/drawing/2014/main" xmlns="" id="{7E1EDF43-9BD0-448F-B406-50B41E3BAD4C}"/>
               </a:ext>
             </a:extLst>
           </p:cNvPr>
@@ -3534,7 +3566,7 @@
           <p:cNvPr id="4" name="日期版面配置區 3">
             <a:extLst>
               <a:ext uri="{FF2B5EF4-FFF2-40B4-BE49-F238E27FC236}">
-                <a16:creationId xmlns:a16="http://schemas.microsoft.com/office/drawing/2014/main" id="{9445850C-C7A9-4A1C-B501-5523168739EC}"/>
+                <a16:creationId xmlns:a16="http://schemas.microsoft.com/office/drawing/2014/main" xmlns="" id="{9445850C-C7A9-4A1C-B501-5523168739EC}"/>
               </a:ext>
             </a:extLst>
           </p:cNvPr>
@@ -3563,7 +3595,7 @@
           <p:cNvPr id="5" name="頁尾版面配置區 4">
             <a:extLst>
               <a:ext uri="{FF2B5EF4-FFF2-40B4-BE49-F238E27FC236}">
-                <a16:creationId xmlns:a16="http://schemas.microsoft.com/office/drawing/2014/main" id="{C0531C48-7127-4EAA-8D9E-B7290AFD0F4F}"/>
+                <a16:creationId xmlns:a16="http://schemas.microsoft.com/office/drawing/2014/main" xmlns="" id="{C0531C48-7127-4EAA-8D9E-B7290AFD0F4F}"/>
               </a:ext>
             </a:extLst>
           </p:cNvPr>
@@ -3588,7 +3620,7 @@
           <p:cNvPr id="6" name="投影片編號版面配置區 5">
             <a:extLst>
               <a:ext uri="{FF2B5EF4-FFF2-40B4-BE49-F238E27FC236}">
-                <a16:creationId xmlns:a16="http://schemas.microsoft.com/office/drawing/2014/main" id="{AE4CD09E-15A7-4B4C-9CFE-5C082904BA3A}"/>
+                <a16:creationId xmlns:a16="http://schemas.microsoft.com/office/drawing/2014/main" xmlns="" id="{AE4CD09E-15A7-4B4C-9CFE-5C082904BA3A}"/>
               </a:ext>
             </a:extLst>
           </p:cNvPr>
@@ -3647,7 +3679,7 @@
           <p:cNvPr id="2" name="標題 1">
             <a:extLst>
               <a:ext uri="{FF2B5EF4-FFF2-40B4-BE49-F238E27FC236}">
-                <a16:creationId xmlns:a16="http://schemas.microsoft.com/office/drawing/2014/main" id="{E9DE29CE-615A-4224-9EAB-040894775015}"/>
+                <a16:creationId xmlns:a16="http://schemas.microsoft.com/office/drawing/2014/main" xmlns="" id="{E9DE29CE-615A-4224-9EAB-040894775015}"/>
               </a:ext>
             </a:extLst>
           </p:cNvPr>
@@ -3676,7 +3708,7 @@
           <p:cNvPr id="3" name="內容版面配置區 2">
             <a:extLst>
               <a:ext uri="{FF2B5EF4-FFF2-40B4-BE49-F238E27FC236}">
-                <a16:creationId xmlns:a16="http://schemas.microsoft.com/office/drawing/2014/main" id="{C561EA86-A6BC-4E0B-8BB0-6751D17ABE3C}"/>
+                <a16:creationId xmlns:a16="http://schemas.microsoft.com/office/drawing/2014/main" xmlns="" id="{C561EA86-A6BC-4E0B-8BB0-6751D17ABE3C}"/>
               </a:ext>
             </a:extLst>
           </p:cNvPr>
@@ -3734,7 +3766,7 @@
           <p:cNvPr id="4" name="日期版面配置區 3">
             <a:extLst>
               <a:ext uri="{FF2B5EF4-FFF2-40B4-BE49-F238E27FC236}">
-                <a16:creationId xmlns:a16="http://schemas.microsoft.com/office/drawing/2014/main" id="{1CEC4430-D10D-4C9D-AC9C-007BEB829243}"/>
+                <a16:creationId xmlns:a16="http://schemas.microsoft.com/office/drawing/2014/main" xmlns="" id="{1CEC4430-D10D-4C9D-AC9C-007BEB829243}"/>
               </a:ext>
             </a:extLst>
           </p:cNvPr>
@@ -3763,7 +3795,7 @@
           <p:cNvPr id="5" name="頁尾版面配置區 4">
             <a:extLst>
               <a:ext uri="{FF2B5EF4-FFF2-40B4-BE49-F238E27FC236}">
-                <a16:creationId xmlns:a16="http://schemas.microsoft.com/office/drawing/2014/main" id="{C344F8C4-A867-4343-BC2B-C40CB93E24F4}"/>
+                <a16:creationId xmlns:a16="http://schemas.microsoft.com/office/drawing/2014/main" xmlns="" id="{C344F8C4-A867-4343-BC2B-C40CB93E24F4}"/>
               </a:ext>
             </a:extLst>
           </p:cNvPr>
@@ -3788,7 +3820,7 @@
           <p:cNvPr id="6" name="投影片編號版面配置區 5">
             <a:extLst>
               <a:ext uri="{FF2B5EF4-FFF2-40B4-BE49-F238E27FC236}">
-                <a16:creationId xmlns:a16="http://schemas.microsoft.com/office/drawing/2014/main" id="{62DF9FF0-7008-4E54-99E2-8021F5016501}"/>
+                <a16:creationId xmlns:a16="http://schemas.microsoft.com/office/drawing/2014/main" xmlns="" id="{62DF9FF0-7008-4E54-99E2-8021F5016501}"/>
               </a:ext>
             </a:extLst>
           </p:cNvPr>
@@ -3847,7 +3879,7 @@
           <p:cNvPr id="2" name="標題 1">
             <a:extLst>
               <a:ext uri="{FF2B5EF4-FFF2-40B4-BE49-F238E27FC236}">
-                <a16:creationId xmlns:a16="http://schemas.microsoft.com/office/drawing/2014/main" id="{B883E4FC-D3F9-45F1-B410-AFB4D7DCAC2C}"/>
+                <a16:creationId xmlns:a16="http://schemas.microsoft.com/office/drawing/2014/main" xmlns="" id="{B883E4FC-D3F9-45F1-B410-AFB4D7DCAC2C}"/>
               </a:ext>
             </a:extLst>
           </p:cNvPr>
@@ -3885,7 +3917,7 @@
           <p:cNvPr id="3" name="文字版面配置區 2">
             <a:extLst>
               <a:ext uri="{FF2B5EF4-FFF2-40B4-BE49-F238E27FC236}">
-                <a16:creationId xmlns:a16="http://schemas.microsoft.com/office/drawing/2014/main" id="{C52A27E8-5892-48C2-9E66-FCC84A6530A6}"/>
+                <a16:creationId xmlns:a16="http://schemas.microsoft.com/office/drawing/2014/main" xmlns="" id="{C52A27E8-5892-48C2-9E66-FCC84A6530A6}"/>
               </a:ext>
             </a:extLst>
           </p:cNvPr>
@@ -4010,7 +4042,7 @@
           <p:cNvPr id="4" name="日期版面配置區 3">
             <a:extLst>
               <a:ext uri="{FF2B5EF4-FFF2-40B4-BE49-F238E27FC236}">
-                <a16:creationId xmlns:a16="http://schemas.microsoft.com/office/drawing/2014/main" id="{546305E7-C560-4B31-B080-4E0AFF6385B6}"/>
+                <a16:creationId xmlns:a16="http://schemas.microsoft.com/office/drawing/2014/main" xmlns="" id="{546305E7-C560-4B31-B080-4E0AFF6385B6}"/>
               </a:ext>
             </a:extLst>
           </p:cNvPr>
@@ -4039,7 +4071,7 @@
           <p:cNvPr id="5" name="頁尾版面配置區 4">
             <a:extLst>
               <a:ext uri="{FF2B5EF4-FFF2-40B4-BE49-F238E27FC236}">
-                <a16:creationId xmlns:a16="http://schemas.microsoft.com/office/drawing/2014/main" id="{4A655CB5-8CBF-447D-9684-752BB649B500}"/>
+                <a16:creationId xmlns:a16="http://schemas.microsoft.com/office/drawing/2014/main" xmlns="" id="{4A655CB5-8CBF-447D-9684-752BB649B500}"/>
               </a:ext>
             </a:extLst>
           </p:cNvPr>
@@ -4064,7 +4096,7 @@
           <p:cNvPr id="6" name="投影片編號版面配置區 5">
             <a:extLst>
               <a:ext uri="{FF2B5EF4-FFF2-40B4-BE49-F238E27FC236}">
-                <a16:creationId xmlns:a16="http://schemas.microsoft.com/office/drawing/2014/main" id="{6AD82AF3-C47C-48AF-8636-7D4BB89743BB}"/>
+                <a16:creationId xmlns:a16="http://schemas.microsoft.com/office/drawing/2014/main" xmlns="" id="{6AD82AF3-C47C-48AF-8636-7D4BB89743BB}"/>
               </a:ext>
             </a:extLst>
           </p:cNvPr>
@@ -4123,7 +4155,7 @@
           <p:cNvPr id="2" name="標題 1">
             <a:extLst>
               <a:ext uri="{FF2B5EF4-FFF2-40B4-BE49-F238E27FC236}">
-                <a16:creationId xmlns:a16="http://schemas.microsoft.com/office/drawing/2014/main" id="{16C75D21-0375-441A-8F1E-E5B204671F69}"/>
+                <a16:creationId xmlns:a16="http://schemas.microsoft.com/office/drawing/2014/main" xmlns="" id="{16C75D21-0375-441A-8F1E-E5B204671F69}"/>
               </a:ext>
             </a:extLst>
           </p:cNvPr>
@@ -4152,7 +4184,7 @@
           <p:cNvPr id="3" name="內容版面配置區 2">
             <a:extLst>
               <a:ext uri="{FF2B5EF4-FFF2-40B4-BE49-F238E27FC236}">
-                <a16:creationId xmlns:a16="http://schemas.microsoft.com/office/drawing/2014/main" id="{9D9E2C6B-6BE7-4EF8-9FD6-3C8CC7ED2E15}"/>
+                <a16:creationId xmlns:a16="http://schemas.microsoft.com/office/drawing/2014/main" xmlns="" id="{9D9E2C6B-6BE7-4EF8-9FD6-3C8CC7ED2E15}"/>
               </a:ext>
             </a:extLst>
           </p:cNvPr>
@@ -4215,7 +4247,7 @@
           <p:cNvPr id="4" name="內容版面配置區 3">
             <a:extLst>
               <a:ext uri="{FF2B5EF4-FFF2-40B4-BE49-F238E27FC236}">
-                <a16:creationId xmlns:a16="http://schemas.microsoft.com/office/drawing/2014/main" id="{98B5E7B1-AA9E-4632-8745-A516C32672F2}"/>
+                <a16:creationId xmlns:a16="http://schemas.microsoft.com/office/drawing/2014/main" xmlns="" id="{98B5E7B1-AA9E-4632-8745-A516C32672F2}"/>
               </a:ext>
             </a:extLst>
           </p:cNvPr>
@@ -4278,7 +4310,7 @@
           <p:cNvPr id="5" name="日期版面配置區 4">
             <a:extLst>
               <a:ext uri="{FF2B5EF4-FFF2-40B4-BE49-F238E27FC236}">
-                <a16:creationId xmlns:a16="http://schemas.microsoft.com/office/drawing/2014/main" id="{60E1C585-84E1-450D-81A0-90BE569EC4EE}"/>
+                <a16:creationId xmlns:a16="http://schemas.microsoft.com/office/drawing/2014/main" xmlns="" id="{60E1C585-84E1-450D-81A0-90BE569EC4EE}"/>
               </a:ext>
             </a:extLst>
           </p:cNvPr>
@@ -4307,7 +4339,7 @@
           <p:cNvPr id="6" name="頁尾版面配置區 5">
             <a:extLst>
               <a:ext uri="{FF2B5EF4-FFF2-40B4-BE49-F238E27FC236}">
-                <a16:creationId xmlns:a16="http://schemas.microsoft.com/office/drawing/2014/main" id="{773EDF77-D446-4D5E-944B-821FBF59DFCA}"/>
+                <a16:creationId xmlns:a16="http://schemas.microsoft.com/office/drawing/2014/main" xmlns="" id="{773EDF77-D446-4D5E-944B-821FBF59DFCA}"/>
               </a:ext>
             </a:extLst>
           </p:cNvPr>
@@ -4332,7 +4364,7 @@
           <p:cNvPr id="7" name="投影片編號版面配置區 6">
             <a:extLst>
               <a:ext uri="{FF2B5EF4-FFF2-40B4-BE49-F238E27FC236}">
-                <a16:creationId xmlns:a16="http://schemas.microsoft.com/office/drawing/2014/main" id="{FD191F10-2070-456C-8E57-CD240E1780BD}"/>
+                <a16:creationId xmlns:a16="http://schemas.microsoft.com/office/drawing/2014/main" xmlns="" id="{FD191F10-2070-456C-8E57-CD240E1780BD}"/>
               </a:ext>
             </a:extLst>
           </p:cNvPr>
@@ -4391,7 +4423,7 @@
           <p:cNvPr id="2" name="標題 1">
             <a:extLst>
               <a:ext uri="{FF2B5EF4-FFF2-40B4-BE49-F238E27FC236}">
-                <a16:creationId xmlns:a16="http://schemas.microsoft.com/office/drawing/2014/main" id="{A1191C85-356C-46FA-B034-1FD902EA0665}"/>
+                <a16:creationId xmlns:a16="http://schemas.microsoft.com/office/drawing/2014/main" xmlns="" id="{A1191C85-356C-46FA-B034-1FD902EA0665}"/>
               </a:ext>
             </a:extLst>
           </p:cNvPr>
@@ -4425,7 +4457,7 @@
           <p:cNvPr id="3" name="文字版面配置區 2">
             <a:extLst>
               <a:ext uri="{FF2B5EF4-FFF2-40B4-BE49-F238E27FC236}">
-                <a16:creationId xmlns:a16="http://schemas.microsoft.com/office/drawing/2014/main" id="{7680679C-9FC2-4B9A-BF54-C7C3E3E752EB}"/>
+                <a16:creationId xmlns:a16="http://schemas.microsoft.com/office/drawing/2014/main" xmlns="" id="{7680679C-9FC2-4B9A-BF54-C7C3E3E752EB}"/>
               </a:ext>
             </a:extLst>
           </p:cNvPr>
@@ -4496,7 +4528,7 @@
           <p:cNvPr id="4" name="內容版面配置區 3">
             <a:extLst>
               <a:ext uri="{FF2B5EF4-FFF2-40B4-BE49-F238E27FC236}">
-                <a16:creationId xmlns:a16="http://schemas.microsoft.com/office/drawing/2014/main" id="{0D29148E-AD57-4620-AFCC-6BFAB230BD75}"/>
+                <a16:creationId xmlns:a16="http://schemas.microsoft.com/office/drawing/2014/main" xmlns="" id="{0D29148E-AD57-4620-AFCC-6BFAB230BD75}"/>
               </a:ext>
             </a:extLst>
           </p:cNvPr>
@@ -4559,7 +4591,7 @@
           <p:cNvPr id="5" name="文字版面配置區 4">
             <a:extLst>
               <a:ext uri="{FF2B5EF4-FFF2-40B4-BE49-F238E27FC236}">
-                <a16:creationId xmlns:a16="http://schemas.microsoft.com/office/drawing/2014/main" id="{77AC368D-4793-46D8-A830-B6CE6DB19C97}"/>
+                <a16:creationId xmlns:a16="http://schemas.microsoft.com/office/drawing/2014/main" xmlns="" id="{77AC368D-4793-46D8-A830-B6CE6DB19C97}"/>
               </a:ext>
             </a:extLst>
           </p:cNvPr>
@@ -4630,7 +4662,7 @@
           <p:cNvPr id="6" name="內容版面配置區 5">
             <a:extLst>
               <a:ext uri="{FF2B5EF4-FFF2-40B4-BE49-F238E27FC236}">
-                <a16:creationId xmlns:a16="http://schemas.microsoft.com/office/drawing/2014/main" id="{8D0467B7-3B17-422A-B325-80C13F750F9D}"/>
+                <a16:creationId xmlns:a16="http://schemas.microsoft.com/office/drawing/2014/main" xmlns="" id="{8D0467B7-3B17-422A-B325-80C13F750F9D}"/>
               </a:ext>
             </a:extLst>
           </p:cNvPr>
@@ -4693,7 +4725,7 @@
           <p:cNvPr id="7" name="日期版面配置區 6">
             <a:extLst>
               <a:ext uri="{FF2B5EF4-FFF2-40B4-BE49-F238E27FC236}">
-                <a16:creationId xmlns:a16="http://schemas.microsoft.com/office/drawing/2014/main" id="{4EBE7259-2588-49F5-9134-1CD09F3F17E0}"/>
+                <a16:creationId xmlns:a16="http://schemas.microsoft.com/office/drawing/2014/main" xmlns="" id="{4EBE7259-2588-49F5-9134-1CD09F3F17E0}"/>
               </a:ext>
             </a:extLst>
           </p:cNvPr>
@@ -4722,7 +4754,7 @@
           <p:cNvPr id="8" name="頁尾版面配置區 7">
             <a:extLst>
               <a:ext uri="{FF2B5EF4-FFF2-40B4-BE49-F238E27FC236}">
-                <a16:creationId xmlns:a16="http://schemas.microsoft.com/office/drawing/2014/main" id="{49C092E0-6C01-46D4-ADB6-8366CAAC5674}"/>
+                <a16:creationId xmlns:a16="http://schemas.microsoft.com/office/drawing/2014/main" xmlns="" id="{49C092E0-6C01-46D4-ADB6-8366CAAC5674}"/>
               </a:ext>
             </a:extLst>
           </p:cNvPr>
@@ -4747,7 +4779,7 @@
           <p:cNvPr id="9" name="投影片編號版面配置區 8">
             <a:extLst>
               <a:ext uri="{FF2B5EF4-FFF2-40B4-BE49-F238E27FC236}">
-                <a16:creationId xmlns:a16="http://schemas.microsoft.com/office/drawing/2014/main" id="{C9BF596E-A1AB-461E-86AC-62E64F2F4B0E}"/>
+                <a16:creationId xmlns:a16="http://schemas.microsoft.com/office/drawing/2014/main" xmlns="" id="{C9BF596E-A1AB-461E-86AC-62E64F2F4B0E}"/>
               </a:ext>
             </a:extLst>
           </p:cNvPr>
@@ -4806,7 +4838,7 @@
           <p:cNvPr id="2" name="標題 1">
             <a:extLst>
               <a:ext uri="{FF2B5EF4-FFF2-40B4-BE49-F238E27FC236}">
-                <a16:creationId xmlns:a16="http://schemas.microsoft.com/office/drawing/2014/main" id="{4FB78FC6-9B5E-44ED-A2C9-264047F8D113}"/>
+                <a16:creationId xmlns:a16="http://schemas.microsoft.com/office/drawing/2014/main" xmlns="" id="{4FB78FC6-9B5E-44ED-A2C9-264047F8D113}"/>
               </a:ext>
             </a:extLst>
           </p:cNvPr>
@@ -4835,7 +4867,7 @@
           <p:cNvPr id="3" name="日期版面配置區 2">
             <a:extLst>
               <a:ext uri="{FF2B5EF4-FFF2-40B4-BE49-F238E27FC236}">
-                <a16:creationId xmlns:a16="http://schemas.microsoft.com/office/drawing/2014/main" id="{7D6A50CF-E625-4579-AB12-CBAB9FC0BF25}"/>
+                <a16:creationId xmlns:a16="http://schemas.microsoft.com/office/drawing/2014/main" xmlns="" id="{7D6A50CF-E625-4579-AB12-CBAB9FC0BF25}"/>
               </a:ext>
             </a:extLst>
           </p:cNvPr>
@@ -4864,7 +4896,7 @@
           <p:cNvPr id="4" name="頁尾版面配置區 3">
             <a:extLst>
               <a:ext uri="{FF2B5EF4-FFF2-40B4-BE49-F238E27FC236}">
-                <a16:creationId xmlns:a16="http://schemas.microsoft.com/office/drawing/2014/main" id="{FD03745C-3AE6-473D-B50B-D88916270BBA}"/>
+                <a16:creationId xmlns:a16="http://schemas.microsoft.com/office/drawing/2014/main" xmlns="" id="{FD03745C-3AE6-473D-B50B-D88916270BBA}"/>
               </a:ext>
             </a:extLst>
           </p:cNvPr>
@@ -4889,7 +4921,7 @@
           <p:cNvPr id="5" name="投影片編號版面配置區 4">
             <a:extLst>
               <a:ext uri="{FF2B5EF4-FFF2-40B4-BE49-F238E27FC236}">
-                <a16:creationId xmlns:a16="http://schemas.microsoft.com/office/drawing/2014/main" id="{D65945F2-72AF-4CD8-9070-8AFAFB430BE3}"/>
+                <a16:creationId xmlns:a16="http://schemas.microsoft.com/office/drawing/2014/main" xmlns="" id="{D65945F2-72AF-4CD8-9070-8AFAFB430BE3}"/>
               </a:ext>
             </a:extLst>
           </p:cNvPr>
@@ -4948,7 +4980,7 @@
           <p:cNvPr id="2" name="日期版面配置區 1">
             <a:extLst>
               <a:ext uri="{FF2B5EF4-FFF2-40B4-BE49-F238E27FC236}">
-                <a16:creationId xmlns:a16="http://schemas.microsoft.com/office/drawing/2014/main" id="{72A01838-1ABC-44E6-9F5B-DD937E880D39}"/>
+                <a16:creationId xmlns:a16="http://schemas.microsoft.com/office/drawing/2014/main" xmlns="" id="{72A01838-1ABC-44E6-9F5B-DD937E880D39}"/>
               </a:ext>
             </a:extLst>
           </p:cNvPr>
@@ -4977,7 +5009,7 @@
           <p:cNvPr id="3" name="頁尾版面配置區 2">
             <a:extLst>
               <a:ext uri="{FF2B5EF4-FFF2-40B4-BE49-F238E27FC236}">
-                <a16:creationId xmlns:a16="http://schemas.microsoft.com/office/drawing/2014/main" id="{FAC83A81-511D-46E7-8914-1A0CD505CE27}"/>
+                <a16:creationId xmlns:a16="http://schemas.microsoft.com/office/drawing/2014/main" xmlns="" id="{FAC83A81-511D-46E7-8914-1A0CD505CE27}"/>
               </a:ext>
             </a:extLst>
           </p:cNvPr>
@@ -5002,7 +5034,7 @@
           <p:cNvPr id="4" name="投影片編號版面配置區 3">
             <a:extLst>
               <a:ext uri="{FF2B5EF4-FFF2-40B4-BE49-F238E27FC236}">
-                <a16:creationId xmlns:a16="http://schemas.microsoft.com/office/drawing/2014/main" id="{B8B70B28-38BC-4964-B0CC-72E8B8C766E1}"/>
+                <a16:creationId xmlns:a16="http://schemas.microsoft.com/office/drawing/2014/main" xmlns="" id="{B8B70B28-38BC-4964-B0CC-72E8B8C766E1}"/>
               </a:ext>
             </a:extLst>
           </p:cNvPr>
@@ -5061,7 +5093,7 @@
           <p:cNvPr id="2" name="標題 1">
             <a:extLst>
               <a:ext uri="{FF2B5EF4-FFF2-40B4-BE49-F238E27FC236}">
-                <a16:creationId xmlns:a16="http://schemas.microsoft.com/office/drawing/2014/main" id="{9D2158B5-FBE3-46DD-A616-930B0EF887DD}"/>
+                <a16:creationId xmlns:a16="http://schemas.microsoft.com/office/drawing/2014/main" xmlns="" id="{9D2158B5-FBE3-46DD-A616-930B0EF887DD}"/>
               </a:ext>
             </a:extLst>
           </p:cNvPr>
@@ -5099,7 +5131,7 @@
           <p:cNvPr id="3" name="內容版面配置區 2">
             <a:extLst>
               <a:ext uri="{FF2B5EF4-FFF2-40B4-BE49-F238E27FC236}">
-                <a16:creationId xmlns:a16="http://schemas.microsoft.com/office/drawing/2014/main" id="{3B337C0C-73B1-4C5A-A563-2A701A535134}"/>
+                <a16:creationId xmlns:a16="http://schemas.microsoft.com/office/drawing/2014/main" xmlns="" id="{3B337C0C-73B1-4C5A-A563-2A701A535134}"/>
               </a:ext>
             </a:extLst>
           </p:cNvPr>
@@ -5190,7 +5222,7 @@
           <p:cNvPr id="4" name="文字版面配置區 3">
             <a:extLst>
               <a:ext uri="{FF2B5EF4-FFF2-40B4-BE49-F238E27FC236}">
-                <a16:creationId xmlns:a16="http://schemas.microsoft.com/office/drawing/2014/main" id="{434DE911-0D3B-45D0-B7D6-45AB121D2884}"/>
+                <a16:creationId xmlns:a16="http://schemas.microsoft.com/office/drawing/2014/main" xmlns="" id="{434DE911-0D3B-45D0-B7D6-45AB121D2884}"/>
               </a:ext>
             </a:extLst>
           </p:cNvPr>
@@ -5261,7 +5293,7 @@
           <p:cNvPr id="5" name="日期版面配置區 4">
             <a:extLst>
               <a:ext uri="{FF2B5EF4-FFF2-40B4-BE49-F238E27FC236}">
-                <a16:creationId xmlns:a16="http://schemas.microsoft.com/office/drawing/2014/main" id="{77A34DD6-D478-4A79-8A5F-E42C73617EEA}"/>
+                <a16:creationId xmlns:a16="http://schemas.microsoft.com/office/drawing/2014/main" xmlns="" id="{77A34DD6-D478-4A79-8A5F-E42C73617EEA}"/>
               </a:ext>
             </a:extLst>
           </p:cNvPr>
@@ -5290,7 +5322,7 @@
           <p:cNvPr id="6" name="頁尾版面配置區 5">
             <a:extLst>
               <a:ext uri="{FF2B5EF4-FFF2-40B4-BE49-F238E27FC236}">
-                <a16:creationId xmlns:a16="http://schemas.microsoft.com/office/drawing/2014/main" id="{7918FA7B-B73B-4138-9444-2046F6B8460C}"/>
+                <a16:creationId xmlns:a16="http://schemas.microsoft.com/office/drawing/2014/main" xmlns="" id="{7918FA7B-B73B-4138-9444-2046F6B8460C}"/>
               </a:ext>
             </a:extLst>
           </p:cNvPr>
@@ -5315,7 +5347,7 @@
           <p:cNvPr id="7" name="投影片編號版面配置區 6">
             <a:extLst>
               <a:ext uri="{FF2B5EF4-FFF2-40B4-BE49-F238E27FC236}">
-                <a16:creationId xmlns:a16="http://schemas.microsoft.com/office/drawing/2014/main" id="{3A4692FB-0002-4487-89C0-ABB8C10481C2}"/>
+                <a16:creationId xmlns:a16="http://schemas.microsoft.com/office/drawing/2014/main" xmlns="" id="{3A4692FB-0002-4487-89C0-ABB8C10481C2}"/>
               </a:ext>
             </a:extLst>
           </p:cNvPr>
@@ -5374,7 +5406,7 @@
           <p:cNvPr id="2" name="標題 1">
             <a:extLst>
               <a:ext uri="{FF2B5EF4-FFF2-40B4-BE49-F238E27FC236}">
-                <a16:creationId xmlns:a16="http://schemas.microsoft.com/office/drawing/2014/main" id="{0A4A4E01-BF3B-493D-893A-05535CB3E13C}"/>
+                <a16:creationId xmlns:a16="http://schemas.microsoft.com/office/drawing/2014/main" xmlns="" id="{0A4A4E01-BF3B-493D-893A-05535CB3E13C}"/>
               </a:ext>
             </a:extLst>
           </p:cNvPr>
@@ -5412,7 +5444,7 @@
           <p:cNvPr id="3" name="圖片版面配置區 2">
             <a:extLst>
               <a:ext uri="{FF2B5EF4-FFF2-40B4-BE49-F238E27FC236}">
-                <a16:creationId xmlns:a16="http://schemas.microsoft.com/office/drawing/2014/main" id="{0F073DDB-95E0-424A-A0D1-4544CFCAC213}"/>
+                <a16:creationId xmlns:a16="http://schemas.microsoft.com/office/drawing/2014/main" xmlns="" id="{0F073DDB-95E0-424A-A0D1-4544CFCAC213}"/>
               </a:ext>
             </a:extLst>
           </p:cNvPr>
@@ -5479,7 +5511,7 @@
           <p:cNvPr id="4" name="文字版面配置區 3">
             <a:extLst>
               <a:ext uri="{FF2B5EF4-FFF2-40B4-BE49-F238E27FC236}">
-                <a16:creationId xmlns:a16="http://schemas.microsoft.com/office/drawing/2014/main" id="{F9FD10A2-0258-43B8-AB3C-2750DA2E31A4}"/>
+                <a16:creationId xmlns:a16="http://schemas.microsoft.com/office/drawing/2014/main" xmlns="" id="{F9FD10A2-0258-43B8-AB3C-2750DA2E31A4}"/>
               </a:ext>
             </a:extLst>
           </p:cNvPr>
@@ -5550,7 +5582,7 @@
           <p:cNvPr id="5" name="日期版面配置區 4">
             <a:extLst>
               <a:ext uri="{FF2B5EF4-FFF2-40B4-BE49-F238E27FC236}">
-                <a16:creationId xmlns:a16="http://schemas.microsoft.com/office/drawing/2014/main" id="{9B25E99D-0D7C-422E-A93E-11ABF2BF9C8B}"/>
+                <a16:creationId xmlns:a16="http://schemas.microsoft.com/office/drawing/2014/main" xmlns="" id="{9B25E99D-0D7C-422E-A93E-11ABF2BF9C8B}"/>
               </a:ext>
             </a:extLst>
           </p:cNvPr>
@@ -5579,7 +5611,7 @@
           <p:cNvPr id="6" name="頁尾版面配置區 5">
             <a:extLst>
               <a:ext uri="{FF2B5EF4-FFF2-40B4-BE49-F238E27FC236}">
-                <a16:creationId xmlns:a16="http://schemas.microsoft.com/office/drawing/2014/main" id="{1A448E4B-FCAA-4DAB-A583-6CD597441F67}"/>
+                <a16:creationId xmlns:a16="http://schemas.microsoft.com/office/drawing/2014/main" xmlns="" id="{1A448E4B-FCAA-4DAB-A583-6CD597441F67}"/>
               </a:ext>
             </a:extLst>
           </p:cNvPr>
@@ -5604,7 +5636,7 @@
           <p:cNvPr id="7" name="投影片編號版面配置區 6">
             <a:extLst>
               <a:ext uri="{FF2B5EF4-FFF2-40B4-BE49-F238E27FC236}">
-                <a16:creationId xmlns:a16="http://schemas.microsoft.com/office/drawing/2014/main" id="{662E48DE-C57A-4EED-9FAA-2C5F03A03EDE}"/>
+                <a16:creationId xmlns:a16="http://schemas.microsoft.com/office/drawing/2014/main" xmlns="" id="{662E48DE-C57A-4EED-9FAA-2C5F03A03EDE}"/>
               </a:ext>
             </a:extLst>
           </p:cNvPr>
@@ -5668,7 +5700,7 @@
           <p:cNvPr id="2" name="標題版面配置區 1">
             <a:extLst>
               <a:ext uri="{FF2B5EF4-FFF2-40B4-BE49-F238E27FC236}">
-                <a16:creationId xmlns:a16="http://schemas.microsoft.com/office/drawing/2014/main" id="{A5A87DEE-3846-4C20-9ECD-0AC08BEE9209}"/>
+                <a16:creationId xmlns:a16="http://schemas.microsoft.com/office/drawing/2014/main" xmlns="" id="{A5A87DEE-3846-4C20-9ECD-0AC08BEE9209}"/>
               </a:ext>
             </a:extLst>
           </p:cNvPr>
@@ -5707,7 +5739,7 @@
           <p:cNvPr id="3" name="文字版面配置區 2">
             <a:extLst>
               <a:ext uri="{FF2B5EF4-FFF2-40B4-BE49-F238E27FC236}">
-                <a16:creationId xmlns:a16="http://schemas.microsoft.com/office/drawing/2014/main" id="{E6C2D1D3-B2D8-42F5-9511-8A30A5C880DE}"/>
+                <a16:creationId xmlns:a16="http://schemas.microsoft.com/office/drawing/2014/main" xmlns="" id="{E6C2D1D3-B2D8-42F5-9511-8A30A5C880DE}"/>
               </a:ext>
             </a:extLst>
           </p:cNvPr>
@@ -5775,7 +5807,7 @@
           <p:cNvPr id="4" name="日期版面配置區 3">
             <a:extLst>
               <a:ext uri="{FF2B5EF4-FFF2-40B4-BE49-F238E27FC236}">
-                <a16:creationId xmlns:a16="http://schemas.microsoft.com/office/drawing/2014/main" id="{37E08023-C791-4F0A-9829-F81B29AECB1B}"/>
+                <a16:creationId xmlns:a16="http://schemas.microsoft.com/office/drawing/2014/main" xmlns="" id="{37E08023-C791-4F0A-9829-F81B29AECB1B}"/>
               </a:ext>
             </a:extLst>
           </p:cNvPr>
@@ -5822,7 +5854,7 @@
           <p:cNvPr id="5" name="頁尾版面配置區 4">
             <a:extLst>
               <a:ext uri="{FF2B5EF4-FFF2-40B4-BE49-F238E27FC236}">
-                <a16:creationId xmlns:a16="http://schemas.microsoft.com/office/drawing/2014/main" id="{3F59F37B-E19A-40E5-82C3-FD00891F87DE}"/>
+                <a16:creationId xmlns:a16="http://schemas.microsoft.com/office/drawing/2014/main" xmlns="" id="{3F59F37B-E19A-40E5-82C3-FD00891F87DE}"/>
               </a:ext>
             </a:extLst>
           </p:cNvPr>
@@ -5865,7 +5897,7 @@
           <p:cNvPr id="6" name="投影片編號版面配置區 5">
             <a:extLst>
               <a:ext uri="{FF2B5EF4-FFF2-40B4-BE49-F238E27FC236}">
-                <a16:creationId xmlns:a16="http://schemas.microsoft.com/office/drawing/2014/main" id="{521E55FD-E94C-40DD-A3BF-2931F3F2E5C2}"/>
+                <a16:creationId xmlns:a16="http://schemas.microsoft.com/office/drawing/2014/main" xmlns="" id="{521E55FD-E94C-40DD-A3BF-2931F3F2E5C2}"/>
               </a:ext>
             </a:extLst>
           </p:cNvPr>
@@ -6214,14 +6246,6 @@
 <file path=ppt/slides/slide1.xml><?xml version="1.0" encoding="utf-8"?>
 <p:sld xmlns:a="http://schemas.openxmlformats.org/drawingml/2006/main" xmlns:r="http://schemas.openxmlformats.org/officeDocument/2006/relationships" xmlns:p="http://schemas.openxmlformats.org/presentationml/2006/main">
   <p:cSld>
-    <p:bg>
-      <p:bgPr>
-        <a:solidFill>
-          <a:schemeClr val="bg1"/>
-        </a:solidFill>
-        <a:effectLst/>
-      </p:bgPr>
-    </p:bg>
     <p:spTree>
       <p:nvGrpSpPr>
         <p:cNvPr id="1" name=""/>
@@ -6241,10 +6265,10 @@
           <p:cNvPr id="25" name="Rectangle 14">
             <a:extLst>
               <a:ext uri="{FF2B5EF4-FFF2-40B4-BE49-F238E27FC236}">
-                <a16:creationId xmlns:a16="http://schemas.microsoft.com/office/drawing/2014/main" id="{23962611-DFD5-4092-AAFD-559E3DFCE2C9}"/>
+                <a16:creationId xmlns:a16="http://schemas.microsoft.com/office/drawing/2014/main" xmlns="" id="{23962611-DFD5-4092-AAFD-559E3DFCE2C9}"/>
               </a:ext>
               <a:ext uri="{C183D7F6-B498-43B3-948B-1728B52AA6E4}">
-                <adec:decorative xmlns:adec="http://schemas.microsoft.com/office/drawing/2017/decorative" val="1"/>
+                <adec:decorative xmlns:adec="http://schemas.microsoft.com/office/drawing/2017/decorative" xmlns="" val="1"/>
               </a:ext>
             </a:extLst>
           </p:cNvPr>
@@ -6252,11 +6276,7 @@
             <a:spLocks noGrp="1" noRot="1" noChangeAspect="1" noMove="1" noResize="1" noEditPoints="1" noAdjustHandles="1" noChangeArrowheads="1" noChangeShapeType="1" noTextEdit="1"/>
           </p:cNvSpPr>
           <p:nvPr>
-            <p:extLst>
-              <p:ext uri="{386F3935-93C4-4BCD-93E2-E3B085C9AB24}">
-                <p16:designElem xmlns:p16="http://schemas.microsoft.com/office/powerpoint/2015/main" val="1"/>
-              </p:ext>
-            </p:extLst>
+            <p:extLst/>
           </p:nvPr>
         </p:nvSpPr>
         <p:spPr>
@@ -6326,10 +6346,10 @@
           <p:cNvPr id="17" name="Picture 16">
             <a:extLst>
               <a:ext uri="{FF2B5EF4-FFF2-40B4-BE49-F238E27FC236}">
-                <a16:creationId xmlns:a16="http://schemas.microsoft.com/office/drawing/2014/main" id="{2270F1FA-0425-408F-9861-80BF5AFB276D}"/>
+                <a16:creationId xmlns:a16="http://schemas.microsoft.com/office/drawing/2014/main" xmlns="" id="{2270F1FA-0425-408F-9861-80BF5AFB276D}"/>
               </a:ext>
               <a:ext uri="{C183D7F6-B498-43B3-948B-1728B52AA6E4}">
-                <adec:decorative xmlns:adec="http://schemas.microsoft.com/office/drawing/2017/decorative" val="1"/>
+                <adec:decorative xmlns:adec="http://schemas.microsoft.com/office/drawing/2017/decorative" xmlns="" val="1"/>
               </a:ext>
             </a:extLst>
           </p:cNvPr>
@@ -6337,11 +6357,7 @@
             <a:picLocks noGrp="1" noRot="1" noChangeAspect="1" noMove="1" noResize="1" noEditPoints="1" noAdjustHandles="1" noChangeArrowheads="1" noChangeShapeType="1" noCrop="1"/>
           </p:cNvPicPr>
           <p:nvPr>
-            <p:extLst>
-              <p:ext uri="{386F3935-93C4-4BCD-93E2-E3B085C9AB24}">
-                <p16:designElem xmlns:p16="http://schemas.microsoft.com/office/powerpoint/2015/main" val="1"/>
-              </p:ext>
-            </p:extLst>
+            <p:extLst/>
           </p:nvPr>
         </p:nvPicPr>
         <p:blipFill>
@@ -6371,7 +6387,7 @@
           <p:cNvPr id="2" name="標題 1">
             <a:extLst>
               <a:ext uri="{FF2B5EF4-FFF2-40B4-BE49-F238E27FC236}">
-                <a16:creationId xmlns:a16="http://schemas.microsoft.com/office/drawing/2014/main" id="{6366DFCC-7410-44A8-BC1F-3F27CD244524}"/>
+                <a16:creationId xmlns:a16="http://schemas.microsoft.com/office/drawing/2014/main" xmlns="" id="{6366DFCC-7410-44A8-BC1F-3F27CD244524}"/>
               </a:ext>
             </a:extLst>
           </p:cNvPr>
@@ -6433,7 +6449,7 @@
           <p:cNvPr id="3" name="副標題 2">
             <a:extLst>
               <a:ext uri="{FF2B5EF4-FFF2-40B4-BE49-F238E27FC236}">
-                <a16:creationId xmlns:a16="http://schemas.microsoft.com/office/drawing/2014/main" id="{260F7E7C-D6AF-4E5C-9903-BD0F9AF4D17F}"/>
+                <a16:creationId xmlns:a16="http://schemas.microsoft.com/office/drawing/2014/main" xmlns="" id="{260F7E7C-D6AF-4E5C-9903-BD0F9AF4D17F}"/>
               </a:ext>
             </a:extLst>
           </p:cNvPr>
@@ -6486,20 +6502,19 @@
   <p:clrMapOvr>
     <a:masterClrMapping/>
   </p:clrMapOvr>
+  <p:timing>
+    <p:tnLst>
+      <p:par>
+        <p:cTn id="1" dur="indefinite" restart="never" nodeType="tmRoot"/>
+      </p:par>
+    </p:tnLst>
+  </p:timing>
 </p:sld>
 </file>
 
 <file path=ppt/slides/slide10.xml><?xml version="1.0" encoding="utf-8"?>
 <p:sld xmlns:a="http://schemas.openxmlformats.org/drawingml/2006/main" xmlns:r="http://schemas.openxmlformats.org/officeDocument/2006/relationships" xmlns:p="http://schemas.openxmlformats.org/presentationml/2006/main">
   <p:cSld>
-    <p:bg>
-      <p:bgPr>
-        <a:solidFill>
-          <a:schemeClr val="bg1"/>
-        </a:solidFill>
-        <a:effectLst/>
-      </p:bgPr>
-    </p:bg>
     <p:spTree>
       <p:nvGrpSpPr>
         <p:cNvPr id="1" name=""/>
@@ -6519,10 +6534,10 @@
           <p:cNvPr id="8" name="Rectangle 7">
             <a:extLst>
               <a:ext uri="{FF2B5EF4-FFF2-40B4-BE49-F238E27FC236}">
-                <a16:creationId xmlns:a16="http://schemas.microsoft.com/office/drawing/2014/main" id="{8D70B121-56F4-4848-B38B-182089D909FA}"/>
+                <a16:creationId xmlns:a16="http://schemas.microsoft.com/office/drawing/2014/main" xmlns="" id="{8D70B121-56F4-4848-B38B-182089D909FA}"/>
               </a:ext>
               <a:ext uri="{C183D7F6-B498-43B3-948B-1728B52AA6E4}">
-                <adec:decorative xmlns:adec="http://schemas.microsoft.com/office/drawing/2017/decorative" val="1"/>
+                <adec:decorative xmlns:adec="http://schemas.microsoft.com/office/drawing/2017/decorative" xmlns="" val="1"/>
               </a:ext>
             </a:extLst>
           </p:cNvPr>
@@ -6530,11 +6545,7 @@
             <a:spLocks noGrp="1" noRot="1" noChangeAspect="1" noMove="1" noResize="1" noEditPoints="1" noAdjustHandles="1" noChangeArrowheads="1" noChangeShapeType="1" noTextEdit="1"/>
           </p:cNvSpPr>
           <p:nvPr>
-            <p:extLst>
-              <p:ext uri="{386F3935-93C4-4BCD-93E2-E3B085C9AB24}">
-                <p16:designElem xmlns:p16="http://schemas.microsoft.com/office/powerpoint/2015/main" val="1"/>
-              </p:ext>
-            </p:extLst>
+            <p:extLst/>
           </p:nvPr>
         </p:nvSpPr>
         <p:spPr bwMode="ltGray">
@@ -6584,7 +6595,7 @@
           <p:cNvPr id="2" name="標題 1">
             <a:extLst>
               <a:ext uri="{FF2B5EF4-FFF2-40B4-BE49-F238E27FC236}">
-                <a16:creationId xmlns:a16="http://schemas.microsoft.com/office/drawing/2014/main" id="{2E806ECA-18F6-44CA-B3A9-C58DE8554998}"/>
+                <a16:creationId xmlns:a16="http://schemas.microsoft.com/office/drawing/2014/main" xmlns="" id="{2E806ECA-18F6-44CA-B3A9-C58DE8554998}"/>
               </a:ext>
             </a:extLst>
           </p:cNvPr>
@@ -6647,10 +6658,10 @@
           <p:cNvPr id="10" name="Straight Connector 9">
             <a:extLst>
               <a:ext uri="{FF2B5EF4-FFF2-40B4-BE49-F238E27FC236}">
-                <a16:creationId xmlns:a16="http://schemas.microsoft.com/office/drawing/2014/main" id="{2D72A2C9-F3CA-4216-8BAD-FA4C970C3C4E}"/>
+                <a16:creationId xmlns:a16="http://schemas.microsoft.com/office/drawing/2014/main" xmlns="" id="{2D72A2C9-F3CA-4216-8BAD-FA4C970C3C4E}"/>
               </a:ext>
               <a:ext uri="{C183D7F6-B498-43B3-948B-1728B52AA6E4}">
-                <adec:decorative xmlns:adec="http://schemas.microsoft.com/office/drawing/2017/decorative" val="1"/>
+                <adec:decorative xmlns:adec="http://schemas.microsoft.com/office/drawing/2017/decorative" xmlns="" val="1"/>
               </a:ext>
             </a:extLst>
           </p:cNvPr>
@@ -6658,11 +6669,7 @@
             <a:cxnSpLocks noGrp="1" noRot="1" noChangeAspect="1" noMove="1" noResize="1" noEditPoints="1" noAdjustHandles="1" noChangeArrowheads="1" noChangeShapeType="1"/>
           </p:cNvCxnSpPr>
           <p:nvPr>
-            <p:extLst>
-              <p:ext uri="{386F3935-93C4-4BCD-93E2-E3B085C9AB24}">
-                <p16:designElem xmlns:p16="http://schemas.microsoft.com/office/powerpoint/2015/main" val="1"/>
-              </p:ext>
-            </p:extLst>
+            <p:extLst/>
           </p:nvPr>
         </p:nvCxnSpPr>
         <p:spPr>
@@ -6702,7 +6709,7 @@
           <p:cNvPr id="3" name="內容版面配置區 2">
             <a:extLst>
               <a:ext uri="{FF2B5EF4-FFF2-40B4-BE49-F238E27FC236}">
-                <a16:creationId xmlns:a16="http://schemas.microsoft.com/office/drawing/2014/main" id="{EA13BA1C-74FF-4E8B-A255-F5F231FCC174}"/>
+                <a16:creationId xmlns:a16="http://schemas.microsoft.com/office/drawing/2014/main" xmlns="" id="{EA13BA1C-74FF-4E8B-A255-F5F231FCC174}"/>
               </a:ext>
             </a:extLst>
           </p:cNvPr>
@@ -6758,20 +6765,19 @@
   <p:clrMapOvr>
     <a:masterClrMapping/>
   </p:clrMapOvr>
+  <p:timing>
+    <p:tnLst>
+      <p:par>
+        <p:cTn id="1" dur="indefinite" restart="never" nodeType="tmRoot"/>
+      </p:par>
+    </p:tnLst>
+  </p:timing>
 </p:sld>
 </file>
 
 <file path=ppt/slides/slide11.xml><?xml version="1.0" encoding="utf-8"?>
 <p:sld xmlns:a="http://schemas.openxmlformats.org/drawingml/2006/main" xmlns:r="http://schemas.openxmlformats.org/officeDocument/2006/relationships" xmlns:p="http://schemas.openxmlformats.org/presentationml/2006/main">
   <p:cSld>
-    <p:bg>
-      <p:bgPr>
-        <a:solidFill>
-          <a:schemeClr val="bg1"/>
-        </a:solidFill>
-        <a:effectLst/>
-      </p:bgPr>
-    </p:bg>
     <p:spTree>
       <p:nvGrpSpPr>
         <p:cNvPr id="1" name=""/>
@@ -6791,10 +6797,10 @@
           <p:cNvPr id="75" name="Rectangle 74">
             <a:extLst>
               <a:ext uri="{FF2B5EF4-FFF2-40B4-BE49-F238E27FC236}">
-                <a16:creationId xmlns:a16="http://schemas.microsoft.com/office/drawing/2014/main" id="{42A5316D-ED2F-4F89-B4B4-8D9240B1A348}"/>
+                <a16:creationId xmlns:a16="http://schemas.microsoft.com/office/drawing/2014/main" xmlns="" id="{42A5316D-ED2F-4F89-B4B4-8D9240B1A348}"/>
               </a:ext>
               <a:ext uri="{C183D7F6-B498-43B3-948B-1728B52AA6E4}">
-                <adec:decorative xmlns:adec="http://schemas.microsoft.com/office/drawing/2017/decorative" val="1"/>
+                <adec:decorative xmlns:adec="http://schemas.microsoft.com/office/drawing/2017/decorative" xmlns="" val="1"/>
               </a:ext>
             </a:extLst>
           </p:cNvPr>
@@ -6802,11 +6808,7 @@
             <a:spLocks noGrp="1" noRot="1" noChangeAspect="1" noMove="1" noResize="1" noEditPoints="1" noAdjustHandles="1" noChangeArrowheads="1" noChangeShapeType="1" noTextEdit="1"/>
           </p:cNvSpPr>
           <p:nvPr>
-            <p:extLst>
-              <p:ext uri="{386F3935-93C4-4BCD-93E2-E3B085C9AB24}">
-                <p16:designElem xmlns:p16="http://schemas.microsoft.com/office/powerpoint/2015/main" val="1"/>
-              </p:ext>
-            </p:extLst>
+            <p:extLst/>
           </p:nvPr>
         </p:nvSpPr>
         <p:spPr>
@@ -6883,7 +6885,7 @@
           <p:cNvPr id="2" name="標題 1">
             <a:extLst>
               <a:ext uri="{FF2B5EF4-FFF2-40B4-BE49-F238E27FC236}">
-                <a16:creationId xmlns:a16="http://schemas.microsoft.com/office/drawing/2014/main" id="{2516AB71-1BDD-47B7-9588-8C22B0D34DA1}"/>
+                <a16:creationId xmlns:a16="http://schemas.microsoft.com/office/drawing/2014/main" xmlns="" id="{2516AB71-1BDD-47B7-9588-8C22B0D34DA1}"/>
               </a:ext>
             </a:extLst>
           </p:cNvPr>
@@ -6957,7 +6959,7 @@
           <p:cNvPr id="7" name="內容版面配置區 6">
             <a:extLst>
               <a:ext uri="{FF2B5EF4-FFF2-40B4-BE49-F238E27FC236}">
-                <a16:creationId xmlns:a16="http://schemas.microsoft.com/office/drawing/2014/main" id="{5FB2D480-D558-493C-9853-8A1CC0B42505}"/>
+                <a16:creationId xmlns:a16="http://schemas.microsoft.com/office/drawing/2014/main" xmlns="" id="{5FB2D480-D558-493C-9853-8A1CC0B42505}"/>
               </a:ext>
             </a:extLst>
           </p:cNvPr>
@@ -6987,7 +6989,7 @@
           <p:cNvPr id="72" name="Content Placeholder 71">
             <a:extLst>
               <a:ext uri="{FF2B5EF4-FFF2-40B4-BE49-F238E27FC236}">
-                <a16:creationId xmlns:a16="http://schemas.microsoft.com/office/drawing/2014/main" id="{6DDC6CB6-BB7F-4212-9B3C-17A3FC109380}"/>
+                <a16:creationId xmlns:a16="http://schemas.microsoft.com/office/drawing/2014/main" xmlns="" id="{6DDC6CB6-BB7F-4212-9B3C-17A3FC109380}"/>
               </a:ext>
             </a:extLst>
           </p:cNvPr>
@@ -7010,7 +7012,7 @@
           </a:bodyPr>
           <a:lstStyle/>
           <a:p>
-            <a:endParaRPr lang="en-US" sz="1800"/>
+            <a:endParaRPr lang="en-US" sz="1800" dirty="0" smtClean="0"/>
           </a:p>
         </p:txBody>
       </p:sp>
@@ -7024,20 +7026,19 @@
   <p:clrMapOvr>
     <a:masterClrMapping/>
   </p:clrMapOvr>
+  <p:timing>
+    <p:tnLst>
+      <p:par>
+        <p:cTn id="1" dur="indefinite" restart="never" nodeType="tmRoot"/>
+      </p:par>
+    </p:tnLst>
+  </p:timing>
 </p:sld>
 </file>
 
 <file path=ppt/slides/slide12.xml><?xml version="1.0" encoding="utf-8"?>
 <p:sld xmlns:a="http://schemas.openxmlformats.org/drawingml/2006/main" xmlns:r="http://schemas.openxmlformats.org/officeDocument/2006/relationships" xmlns:p="http://schemas.openxmlformats.org/presentationml/2006/main">
   <p:cSld>
-    <p:bg>
-      <p:bgPr>
-        <a:solidFill>
-          <a:schemeClr val="bg1"/>
-        </a:solidFill>
-        <a:effectLst/>
-      </p:bgPr>
-    </p:bg>
     <p:spTree>
       <p:nvGrpSpPr>
         <p:cNvPr id="1" name=""/>
@@ -7057,10 +7058,10 @@
           <p:cNvPr id="19" name="Rectangle 18">
             <a:extLst>
               <a:ext uri="{FF2B5EF4-FFF2-40B4-BE49-F238E27FC236}">
-                <a16:creationId xmlns:a16="http://schemas.microsoft.com/office/drawing/2014/main" id="{42A5316D-ED2F-4F89-B4B4-8D9240B1A348}"/>
+                <a16:creationId xmlns:a16="http://schemas.microsoft.com/office/drawing/2014/main" xmlns="" id="{42A5316D-ED2F-4F89-B4B4-8D9240B1A348}"/>
               </a:ext>
               <a:ext uri="{C183D7F6-B498-43B3-948B-1728B52AA6E4}">
-                <adec:decorative xmlns:adec="http://schemas.microsoft.com/office/drawing/2017/decorative" val="1"/>
+                <adec:decorative xmlns:adec="http://schemas.microsoft.com/office/drawing/2017/decorative" xmlns="" val="1"/>
               </a:ext>
             </a:extLst>
           </p:cNvPr>
@@ -7068,11 +7069,7 @@
             <a:spLocks noGrp="1" noRot="1" noChangeAspect="1" noMove="1" noResize="1" noEditPoints="1" noAdjustHandles="1" noChangeArrowheads="1" noChangeShapeType="1" noTextEdit="1"/>
           </p:cNvSpPr>
           <p:nvPr>
-            <p:extLst>
-              <p:ext uri="{386F3935-93C4-4BCD-93E2-E3B085C9AB24}">
-                <p16:designElem xmlns:p16="http://schemas.microsoft.com/office/powerpoint/2015/main" val="1"/>
-              </p:ext>
-            </p:extLst>
+            <p:extLst/>
           </p:nvPr>
         </p:nvSpPr>
         <p:spPr>
@@ -7149,7 +7146,7 @@
           <p:cNvPr id="2" name="標題 1">
             <a:extLst>
               <a:ext uri="{FF2B5EF4-FFF2-40B4-BE49-F238E27FC236}">
-                <a16:creationId xmlns:a16="http://schemas.microsoft.com/office/drawing/2014/main" id="{A61F1A7B-87D2-4E32-B320-94C5FC57A794}"/>
+                <a16:creationId xmlns:a16="http://schemas.microsoft.com/office/drawing/2014/main" xmlns="" id="{A61F1A7B-87D2-4E32-B320-94C5FC57A794}"/>
               </a:ext>
             </a:extLst>
           </p:cNvPr>
@@ -7223,7 +7220,7 @@
           <p:cNvPr id="5" name="內容版面配置區 4" descr="一張含有 螢幕擷取畫面 的圖片&#10;&#10;自動產生的描述">
             <a:extLst>
               <a:ext uri="{FF2B5EF4-FFF2-40B4-BE49-F238E27FC236}">
-                <a16:creationId xmlns:a16="http://schemas.microsoft.com/office/drawing/2014/main" id="{EA526310-7F0B-40E4-B240-B8081E0656EF}"/>
+                <a16:creationId xmlns:a16="http://schemas.microsoft.com/office/drawing/2014/main" xmlns="" id="{EA526310-7F0B-40E4-B240-B8081E0656EF}"/>
               </a:ext>
             </a:extLst>
           </p:cNvPr>
@@ -7259,7 +7256,7 @@
           <p:cNvPr id="16" name="Content Placeholder 15">
             <a:extLst>
               <a:ext uri="{FF2B5EF4-FFF2-40B4-BE49-F238E27FC236}">
-                <a16:creationId xmlns:a16="http://schemas.microsoft.com/office/drawing/2014/main" id="{06FBE38E-1E82-4D1E-A965-D79DB08E838F}"/>
+                <a16:creationId xmlns:a16="http://schemas.microsoft.com/office/drawing/2014/main" xmlns="" id="{06FBE38E-1E82-4D1E-A965-D79DB08E838F}"/>
               </a:ext>
             </a:extLst>
           </p:cNvPr>
@@ -7282,7 +7279,7 @@
           </a:bodyPr>
           <a:lstStyle/>
           <a:p>
-            <a:endParaRPr lang="en-US" sz="1800"/>
+            <a:endParaRPr lang="en-US" sz="1800" dirty="0"/>
           </a:p>
         </p:txBody>
       </p:sp>
@@ -7296,20 +7293,19 @@
   <p:clrMapOvr>
     <a:masterClrMapping/>
   </p:clrMapOvr>
+  <p:timing>
+    <p:tnLst>
+      <p:par>
+        <p:cTn id="1" dur="indefinite" restart="never" nodeType="tmRoot"/>
+      </p:par>
+    </p:tnLst>
+  </p:timing>
 </p:sld>
 </file>
 
 <file path=ppt/slides/slide13.xml><?xml version="1.0" encoding="utf-8"?>
 <p:sld xmlns:a="http://schemas.openxmlformats.org/drawingml/2006/main" xmlns:r="http://schemas.openxmlformats.org/officeDocument/2006/relationships" xmlns:p="http://schemas.openxmlformats.org/presentationml/2006/main">
   <p:cSld>
-    <p:bg>
-      <p:bgPr>
-        <a:solidFill>
-          <a:schemeClr val="bg1"/>
-        </a:solidFill>
-        <a:effectLst/>
-      </p:bgPr>
-    </p:bg>
     <p:spTree>
       <p:nvGrpSpPr>
         <p:cNvPr id="1" name=""/>
@@ -7329,10 +7325,10 @@
           <p:cNvPr id="8" name="Rectangle 7">
             <a:extLst>
               <a:ext uri="{FF2B5EF4-FFF2-40B4-BE49-F238E27FC236}">
-                <a16:creationId xmlns:a16="http://schemas.microsoft.com/office/drawing/2014/main" id="{8D70B121-56F4-4848-B38B-182089D909FA}"/>
+                <a16:creationId xmlns:a16="http://schemas.microsoft.com/office/drawing/2014/main" xmlns="" id="{8D70B121-56F4-4848-B38B-182089D909FA}"/>
               </a:ext>
               <a:ext uri="{C183D7F6-B498-43B3-948B-1728B52AA6E4}">
-                <adec:decorative xmlns:adec="http://schemas.microsoft.com/office/drawing/2017/decorative" val="1"/>
+                <adec:decorative xmlns:adec="http://schemas.microsoft.com/office/drawing/2017/decorative" xmlns="" val="1"/>
               </a:ext>
             </a:extLst>
           </p:cNvPr>
@@ -7340,11 +7336,7 @@
             <a:spLocks noGrp="1" noRot="1" noChangeAspect="1" noMove="1" noResize="1" noEditPoints="1" noAdjustHandles="1" noChangeArrowheads="1" noChangeShapeType="1" noTextEdit="1"/>
           </p:cNvSpPr>
           <p:nvPr>
-            <p:extLst>
-              <p:ext uri="{386F3935-93C4-4BCD-93E2-E3B085C9AB24}">
-                <p16:designElem xmlns:p16="http://schemas.microsoft.com/office/powerpoint/2015/main" val="1"/>
-              </p:ext>
-            </p:extLst>
+            <p:extLst/>
           </p:nvPr>
         </p:nvSpPr>
         <p:spPr bwMode="ltGray">
@@ -7394,7 +7386,7 @@
           <p:cNvPr id="2" name="標題 1">
             <a:extLst>
               <a:ext uri="{FF2B5EF4-FFF2-40B4-BE49-F238E27FC236}">
-                <a16:creationId xmlns:a16="http://schemas.microsoft.com/office/drawing/2014/main" id="{EDD61C43-B02A-4250-929C-95625ADD5B17}"/>
+                <a16:creationId xmlns:a16="http://schemas.microsoft.com/office/drawing/2014/main" xmlns="" id="{EDD61C43-B02A-4250-929C-95625ADD5B17}"/>
               </a:ext>
             </a:extLst>
           </p:cNvPr>
@@ -7457,10 +7449,10 @@
           <p:cNvPr id="10" name="Straight Connector 9">
             <a:extLst>
               <a:ext uri="{FF2B5EF4-FFF2-40B4-BE49-F238E27FC236}">
-                <a16:creationId xmlns:a16="http://schemas.microsoft.com/office/drawing/2014/main" id="{2D72A2C9-F3CA-4216-8BAD-FA4C970C3C4E}"/>
+                <a16:creationId xmlns:a16="http://schemas.microsoft.com/office/drawing/2014/main" xmlns="" id="{2D72A2C9-F3CA-4216-8BAD-FA4C970C3C4E}"/>
               </a:ext>
               <a:ext uri="{C183D7F6-B498-43B3-948B-1728B52AA6E4}">
-                <adec:decorative xmlns:adec="http://schemas.microsoft.com/office/drawing/2017/decorative" val="1"/>
+                <adec:decorative xmlns:adec="http://schemas.microsoft.com/office/drawing/2017/decorative" xmlns="" val="1"/>
               </a:ext>
             </a:extLst>
           </p:cNvPr>
@@ -7468,11 +7460,7 @@
             <a:cxnSpLocks noGrp="1" noRot="1" noChangeAspect="1" noMove="1" noResize="1" noEditPoints="1" noAdjustHandles="1" noChangeArrowheads="1" noChangeShapeType="1"/>
           </p:cNvCxnSpPr>
           <p:nvPr>
-            <p:extLst>
-              <p:ext uri="{386F3935-93C4-4BCD-93E2-E3B085C9AB24}">
-                <p16:designElem xmlns:p16="http://schemas.microsoft.com/office/powerpoint/2015/main" val="1"/>
-              </p:ext>
-            </p:extLst>
+            <p:extLst/>
           </p:nvPr>
         </p:nvCxnSpPr>
         <p:spPr>
@@ -7512,7 +7500,7 @@
           <p:cNvPr id="3" name="內容版面配置區 2">
             <a:extLst>
               <a:ext uri="{FF2B5EF4-FFF2-40B4-BE49-F238E27FC236}">
-                <a16:creationId xmlns:a16="http://schemas.microsoft.com/office/drawing/2014/main" id="{C1BD6C7E-B807-4DFA-9C81-3409B35B2694}"/>
+                <a16:creationId xmlns:a16="http://schemas.microsoft.com/office/drawing/2014/main" xmlns="" id="{C1BD6C7E-B807-4DFA-9C81-3409B35B2694}"/>
               </a:ext>
             </a:extLst>
           </p:cNvPr>
@@ -7577,20 +7565,19 @@
   <p:clrMapOvr>
     <a:masterClrMapping/>
   </p:clrMapOvr>
+  <p:timing>
+    <p:tnLst>
+      <p:par>
+        <p:cTn id="1" dur="indefinite" restart="never" nodeType="tmRoot"/>
+      </p:par>
+    </p:tnLst>
+  </p:timing>
 </p:sld>
 </file>
 
 <file path=ppt/slides/slide14.xml><?xml version="1.0" encoding="utf-8"?>
 <p:sld xmlns:a="http://schemas.openxmlformats.org/drawingml/2006/main" xmlns:r="http://schemas.openxmlformats.org/officeDocument/2006/relationships" xmlns:p="http://schemas.openxmlformats.org/presentationml/2006/main">
   <p:cSld>
-    <p:bg>
-      <p:bgPr>
-        <a:solidFill>
-          <a:schemeClr val="bg1"/>
-        </a:solidFill>
-        <a:effectLst/>
-      </p:bgPr>
-    </p:bg>
     <p:spTree>
       <p:nvGrpSpPr>
         <p:cNvPr id="1" name=""/>
@@ -7610,10 +7597,10 @@
           <p:cNvPr id="12" name="Rectangle 11">
             <a:extLst>
               <a:ext uri="{FF2B5EF4-FFF2-40B4-BE49-F238E27FC236}">
-                <a16:creationId xmlns:a16="http://schemas.microsoft.com/office/drawing/2014/main" id="{6D24BC9E-AC6A-42EE-AFD8-B290720B841F}"/>
+                <a16:creationId xmlns:a16="http://schemas.microsoft.com/office/drawing/2014/main" xmlns="" id="{6D24BC9E-AC6A-42EE-AFD8-B290720B841F}"/>
               </a:ext>
               <a:ext uri="{C183D7F6-B498-43B3-948B-1728B52AA6E4}">
-                <adec:decorative xmlns:adec="http://schemas.microsoft.com/office/drawing/2017/decorative" val="1"/>
+                <adec:decorative xmlns:adec="http://schemas.microsoft.com/office/drawing/2017/decorative" xmlns="" val="1"/>
               </a:ext>
             </a:extLst>
           </p:cNvPr>
@@ -7621,11 +7608,7 @@
             <a:spLocks noGrp="1" noRot="1" noChangeAspect="1" noMove="1" noResize="1" noEditPoints="1" noAdjustHandles="1" noChangeArrowheads="1" noChangeShapeType="1" noTextEdit="1"/>
           </p:cNvSpPr>
           <p:nvPr>
-            <p:extLst>
-              <p:ext uri="{386F3935-93C4-4BCD-93E2-E3B085C9AB24}">
-                <p16:designElem xmlns:p16="http://schemas.microsoft.com/office/powerpoint/2015/main" val="1"/>
-              </p:ext>
-            </p:extLst>
+            <p:extLst/>
           </p:nvPr>
         </p:nvSpPr>
         <p:spPr>
@@ -7670,10 +7653,10 @@
           <p:cNvPr id="14" name="Rectangle 13">
             <a:extLst>
               <a:ext uri="{FF2B5EF4-FFF2-40B4-BE49-F238E27FC236}">
-                <a16:creationId xmlns:a16="http://schemas.microsoft.com/office/drawing/2014/main" id="{0990C621-3B8B-4820-8328-D47EF7CE823C}"/>
+                <a16:creationId xmlns:a16="http://schemas.microsoft.com/office/drawing/2014/main" xmlns="" id="{0990C621-3B8B-4820-8328-D47EF7CE823C}"/>
               </a:ext>
               <a:ext uri="{C183D7F6-B498-43B3-948B-1728B52AA6E4}">
-                <adec:decorative xmlns:adec="http://schemas.microsoft.com/office/drawing/2017/decorative" val="1"/>
+                <adec:decorative xmlns:adec="http://schemas.microsoft.com/office/drawing/2017/decorative" xmlns="" val="1"/>
               </a:ext>
             </a:extLst>
           </p:cNvPr>
@@ -7681,11 +7664,7 @@
             <a:spLocks noGrp="1" noRot="1" noChangeAspect="1" noMove="1" noResize="1" noEditPoints="1" noAdjustHandles="1" noChangeArrowheads="1" noChangeShapeType="1" noTextEdit="1"/>
           </p:cNvSpPr>
           <p:nvPr>
-            <p:extLst>
-              <p:ext uri="{386F3935-93C4-4BCD-93E2-E3B085C9AB24}">
-                <p16:designElem xmlns:p16="http://schemas.microsoft.com/office/powerpoint/2015/main" val="1"/>
-              </p:ext>
-            </p:extLst>
+            <p:extLst/>
           </p:nvPr>
         </p:nvSpPr>
         <p:spPr>
@@ -7769,7 +7748,7 @@
           <p:cNvPr id="2" name="標題 1">
             <a:extLst>
               <a:ext uri="{FF2B5EF4-FFF2-40B4-BE49-F238E27FC236}">
-                <a16:creationId xmlns:a16="http://schemas.microsoft.com/office/drawing/2014/main" id="{D442ACEE-891F-4345-AF41-21E14E4EBA4C}"/>
+                <a16:creationId xmlns:a16="http://schemas.microsoft.com/office/drawing/2014/main" xmlns="" id="{D442ACEE-891F-4345-AF41-21E14E4EBA4C}"/>
               </a:ext>
             </a:extLst>
           </p:cNvPr>
@@ -7805,7 +7784,7 @@
           <p:cNvPr id="5" name="圖片 4" descr="一張含有 文字, 報紙 的圖片&#10;&#10;自動產生的描述">
             <a:extLst>
               <a:ext uri="{FF2B5EF4-FFF2-40B4-BE49-F238E27FC236}">
-                <a16:creationId xmlns:a16="http://schemas.microsoft.com/office/drawing/2014/main" id="{1CD7A48A-A9D3-4EF5-A086-6DF1F275F448}"/>
+                <a16:creationId xmlns:a16="http://schemas.microsoft.com/office/drawing/2014/main" xmlns="" id="{1CD7A48A-A9D3-4EF5-A086-6DF1F275F448}"/>
               </a:ext>
             </a:extLst>
           </p:cNvPr>
@@ -7841,7 +7820,7 @@
           <p:cNvPr id="7" name="圖片 6" descr="一張含有 螢幕擷取畫面 的圖片&#10;&#10;自動產生的描述">
             <a:extLst>
               <a:ext uri="{FF2B5EF4-FFF2-40B4-BE49-F238E27FC236}">
-                <a16:creationId xmlns:a16="http://schemas.microsoft.com/office/drawing/2014/main" id="{FDE4C264-3F3F-4476-ABB5-F3983C5A2258}"/>
+                <a16:creationId xmlns:a16="http://schemas.microsoft.com/office/drawing/2014/main" xmlns="" id="{FDE4C264-3F3F-4476-ABB5-F3983C5A2258}"/>
               </a:ext>
             </a:extLst>
           </p:cNvPr>
@@ -7877,10 +7856,10 @@
           <p:cNvPr id="16" name="Rectangle 15">
             <a:extLst>
               <a:ext uri="{FF2B5EF4-FFF2-40B4-BE49-F238E27FC236}">
-                <a16:creationId xmlns:a16="http://schemas.microsoft.com/office/drawing/2014/main" id="{C1A2385B-1D2A-4E17-84FA-6CB7F0AAE473}"/>
+                <a16:creationId xmlns:a16="http://schemas.microsoft.com/office/drawing/2014/main" xmlns="" id="{C1A2385B-1D2A-4E17-84FA-6CB7F0AAE473}"/>
               </a:ext>
               <a:ext uri="{C183D7F6-B498-43B3-948B-1728B52AA6E4}">
-                <adec:decorative xmlns:adec="http://schemas.microsoft.com/office/drawing/2017/decorative" val="1"/>
+                <adec:decorative xmlns:adec="http://schemas.microsoft.com/office/drawing/2017/decorative" xmlns="" val="1"/>
               </a:ext>
             </a:extLst>
           </p:cNvPr>
@@ -7888,11 +7867,7 @@
             <a:spLocks noGrp="1" noRot="1" noChangeAspect="1" noMove="1" noResize="1" noEditPoints="1" noAdjustHandles="1" noChangeArrowheads="1" noChangeShapeType="1" noTextEdit="1"/>
           </p:cNvSpPr>
           <p:nvPr>
-            <p:extLst>
-              <p:ext uri="{386F3935-93C4-4BCD-93E2-E3B085C9AB24}">
-                <p16:designElem xmlns:p16="http://schemas.microsoft.com/office/powerpoint/2015/main" val="1"/>
-              </p:ext>
-            </p:extLst>
+            <p:extLst/>
           </p:nvPr>
         </p:nvSpPr>
         <p:spPr>
@@ -7945,10 +7920,10 @@
           <p:cNvPr id="18" name="Rectangle 17">
             <a:extLst>
               <a:ext uri="{FF2B5EF4-FFF2-40B4-BE49-F238E27FC236}">
-                <a16:creationId xmlns:a16="http://schemas.microsoft.com/office/drawing/2014/main" id="{5E791F2F-79DB-4CC0-9FA1-001E3E91E8B7}"/>
+                <a16:creationId xmlns:a16="http://schemas.microsoft.com/office/drawing/2014/main" xmlns="" id="{5E791F2F-79DB-4CC0-9FA1-001E3E91E8B7}"/>
               </a:ext>
               <a:ext uri="{C183D7F6-B498-43B3-948B-1728B52AA6E4}">
-                <adec:decorative xmlns:adec="http://schemas.microsoft.com/office/drawing/2017/decorative" val="1"/>
+                <adec:decorative xmlns:adec="http://schemas.microsoft.com/office/drawing/2017/decorative" xmlns="" val="1"/>
               </a:ext>
             </a:extLst>
           </p:cNvPr>
@@ -7956,11 +7931,7 @@
             <a:spLocks noGrp="1" noRot="1" noChangeAspect="1" noMove="1" noResize="1" noEditPoints="1" noAdjustHandles="1" noChangeArrowheads="1" noChangeShapeType="1" noTextEdit="1"/>
           </p:cNvSpPr>
           <p:nvPr>
-            <p:extLst>
-              <p:ext uri="{386F3935-93C4-4BCD-93E2-E3B085C9AB24}">
-                <p16:designElem xmlns:p16="http://schemas.microsoft.com/office/powerpoint/2015/main" val="1"/>
-              </p:ext>
-            </p:extLst>
+            <p:extLst/>
           </p:nvPr>
         </p:nvSpPr>
         <p:spPr>
@@ -8038,7 +8009,7 @@
           <p:cNvPr id="3" name="內容版面配置區 2">
             <a:extLst>
               <a:ext uri="{FF2B5EF4-FFF2-40B4-BE49-F238E27FC236}">
-                <a16:creationId xmlns:a16="http://schemas.microsoft.com/office/drawing/2014/main" id="{309D23E3-3715-4093-9F68-1F111638770C}"/>
+                <a16:creationId xmlns:a16="http://schemas.microsoft.com/office/drawing/2014/main" xmlns="" id="{309D23E3-3715-4093-9F68-1F111638770C}"/>
               </a:ext>
             </a:extLst>
           </p:cNvPr>
@@ -8089,20 +8060,19 @@
   <p:clrMapOvr>
     <a:masterClrMapping/>
   </p:clrMapOvr>
+  <p:timing>
+    <p:tnLst>
+      <p:par>
+        <p:cTn id="1" dur="indefinite" restart="never" nodeType="tmRoot"/>
+      </p:par>
+    </p:tnLst>
+  </p:timing>
 </p:sld>
 </file>
 
 <file path=ppt/slides/slide15.xml><?xml version="1.0" encoding="utf-8"?>
 <p:sld xmlns:a="http://schemas.openxmlformats.org/drawingml/2006/main" xmlns:r="http://schemas.openxmlformats.org/officeDocument/2006/relationships" xmlns:p="http://schemas.openxmlformats.org/presentationml/2006/main">
   <p:cSld>
-    <p:bg>
-      <p:bgPr>
-        <a:solidFill>
-          <a:schemeClr val="bg1"/>
-        </a:solidFill>
-        <a:effectLst/>
-      </p:bgPr>
-    </p:bg>
     <p:spTree>
       <p:nvGrpSpPr>
         <p:cNvPr id="1" name=""/>
@@ -8122,10 +8092,10 @@
           <p:cNvPr id="12" name="Rectangle 11">
             <a:extLst>
               <a:ext uri="{FF2B5EF4-FFF2-40B4-BE49-F238E27FC236}">
-                <a16:creationId xmlns:a16="http://schemas.microsoft.com/office/drawing/2014/main" id="{6D24BC9E-AC6A-42EE-AFD8-B290720B841F}"/>
+                <a16:creationId xmlns:a16="http://schemas.microsoft.com/office/drawing/2014/main" xmlns="" id="{6D24BC9E-AC6A-42EE-AFD8-B290720B841F}"/>
               </a:ext>
               <a:ext uri="{C183D7F6-B498-43B3-948B-1728B52AA6E4}">
-                <adec:decorative xmlns:adec="http://schemas.microsoft.com/office/drawing/2017/decorative" val="1"/>
+                <adec:decorative xmlns:adec="http://schemas.microsoft.com/office/drawing/2017/decorative" xmlns="" val="1"/>
               </a:ext>
             </a:extLst>
           </p:cNvPr>
@@ -8133,11 +8103,7 @@
             <a:spLocks noGrp="1" noRot="1" noChangeAspect="1" noMove="1" noResize="1" noEditPoints="1" noAdjustHandles="1" noChangeArrowheads="1" noChangeShapeType="1" noTextEdit="1"/>
           </p:cNvSpPr>
           <p:nvPr>
-            <p:extLst>
-              <p:ext uri="{386F3935-93C4-4BCD-93E2-E3B085C9AB24}">
-                <p16:designElem xmlns:p16="http://schemas.microsoft.com/office/powerpoint/2015/main" val="1"/>
-              </p:ext>
-            </p:extLst>
+            <p:extLst/>
           </p:nvPr>
         </p:nvSpPr>
         <p:spPr>
@@ -8182,10 +8148,10 @@
           <p:cNvPr id="14" name="Rectangle 13">
             <a:extLst>
               <a:ext uri="{FF2B5EF4-FFF2-40B4-BE49-F238E27FC236}">
-                <a16:creationId xmlns:a16="http://schemas.microsoft.com/office/drawing/2014/main" id="{0990C621-3B8B-4820-8328-D47EF7CE823C}"/>
+                <a16:creationId xmlns:a16="http://schemas.microsoft.com/office/drawing/2014/main" xmlns="" id="{0990C621-3B8B-4820-8328-D47EF7CE823C}"/>
               </a:ext>
               <a:ext uri="{C183D7F6-B498-43B3-948B-1728B52AA6E4}">
-                <adec:decorative xmlns:adec="http://schemas.microsoft.com/office/drawing/2017/decorative" val="1"/>
+                <adec:decorative xmlns:adec="http://schemas.microsoft.com/office/drawing/2017/decorative" xmlns="" val="1"/>
               </a:ext>
             </a:extLst>
           </p:cNvPr>
@@ -8193,11 +8159,7 @@
             <a:spLocks noGrp="1" noRot="1" noChangeAspect="1" noMove="1" noResize="1" noEditPoints="1" noAdjustHandles="1" noChangeArrowheads="1" noChangeShapeType="1" noTextEdit="1"/>
           </p:cNvSpPr>
           <p:nvPr>
-            <p:extLst>
-              <p:ext uri="{386F3935-93C4-4BCD-93E2-E3B085C9AB24}">
-                <p16:designElem xmlns:p16="http://schemas.microsoft.com/office/powerpoint/2015/main" val="1"/>
-              </p:ext>
-            </p:extLst>
+            <p:extLst/>
           </p:nvPr>
         </p:nvSpPr>
         <p:spPr>
@@ -8281,7 +8243,7 @@
           <p:cNvPr id="2" name="標題 1">
             <a:extLst>
               <a:ext uri="{FF2B5EF4-FFF2-40B4-BE49-F238E27FC236}">
-                <a16:creationId xmlns:a16="http://schemas.microsoft.com/office/drawing/2014/main" id="{BAF2F97F-F21C-4866-B8FB-9328EA8B9B76}"/>
+                <a16:creationId xmlns:a16="http://schemas.microsoft.com/office/drawing/2014/main" xmlns="" id="{BAF2F97F-F21C-4866-B8FB-9328EA8B9B76}"/>
               </a:ext>
             </a:extLst>
           </p:cNvPr>
@@ -8317,7 +8279,7 @@
           <p:cNvPr id="5" name="圖片 4" descr="一張含有 文字 的圖片&#10;&#10;自動產生的描述">
             <a:extLst>
               <a:ext uri="{FF2B5EF4-FFF2-40B4-BE49-F238E27FC236}">
-                <a16:creationId xmlns:a16="http://schemas.microsoft.com/office/drawing/2014/main" id="{9551926D-F4C3-4262-BD6B-D5AF4DAC58E0}"/>
+                <a16:creationId xmlns:a16="http://schemas.microsoft.com/office/drawing/2014/main" xmlns="" id="{9551926D-F4C3-4262-BD6B-D5AF4DAC58E0}"/>
               </a:ext>
             </a:extLst>
           </p:cNvPr>
@@ -8353,7 +8315,7 @@
           <p:cNvPr id="7" name="圖片 6" descr="一張含有 螢幕擷取畫面 的圖片&#10;&#10;自動產生的描述">
             <a:extLst>
               <a:ext uri="{FF2B5EF4-FFF2-40B4-BE49-F238E27FC236}">
-                <a16:creationId xmlns:a16="http://schemas.microsoft.com/office/drawing/2014/main" id="{93FD0D4C-AA90-4D59-BB8E-3A799134245A}"/>
+                <a16:creationId xmlns:a16="http://schemas.microsoft.com/office/drawing/2014/main" xmlns="" id="{93FD0D4C-AA90-4D59-BB8E-3A799134245A}"/>
               </a:ext>
             </a:extLst>
           </p:cNvPr>
@@ -8389,10 +8351,10 @@
           <p:cNvPr id="16" name="Rectangle 15">
             <a:extLst>
               <a:ext uri="{FF2B5EF4-FFF2-40B4-BE49-F238E27FC236}">
-                <a16:creationId xmlns:a16="http://schemas.microsoft.com/office/drawing/2014/main" id="{C1A2385B-1D2A-4E17-84FA-6CB7F0AAE473}"/>
+                <a16:creationId xmlns:a16="http://schemas.microsoft.com/office/drawing/2014/main" xmlns="" id="{C1A2385B-1D2A-4E17-84FA-6CB7F0AAE473}"/>
               </a:ext>
               <a:ext uri="{C183D7F6-B498-43B3-948B-1728B52AA6E4}">
-                <adec:decorative xmlns:adec="http://schemas.microsoft.com/office/drawing/2017/decorative" val="1"/>
+                <adec:decorative xmlns:adec="http://schemas.microsoft.com/office/drawing/2017/decorative" xmlns="" val="1"/>
               </a:ext>
             </a:extLst>
           </p:cNvPr>
@@ -8400,11 +8362,7 @@
             <a:spLocks noGrp="1" noRot="1" noChangeAspect="1" noMove="1" noResize="1" noEditPoints="1" noAdjustHandles="1" noChangeArrowheads="1" noChangeShapeType="1" noTextEdit="1"/>
           </p:cNvSpPr>
           <p:nvPr>
-            <p:extLst>
-              <p:ext uri="{386F3935-93C4-4BCD-93E2-E3B085C9AB24}">
-                <p16:designElem xmlns:p16="http://schemas.microsoft.com/office/powerpoint/2015/main" val="1"/>
-              </p:ext>
-            </p:extLst>
+            <p:extLst/>
           </p:nvPr>
         </p:nvSpPr>
         <p:spPr>
@@ -8457,10 +8415,10 @@
           <p:cNvPr id="18" name="Rectangle 17">
             <a:extLst>
               <a:ext uri="{FF2B5EF4-FFF2-40B4-BE49-F238E27FC236}">
-                <a16:creationId xmlns:a16="http://schemas.microsoft.com/office/drawing/2014/main" id="{5E791F2F-79DB-4CC0-9FA1-001E3E91E8B7}"/>
+                <a16:creationId xmlns:a16="http://schemas.microsoft.com/office/drawing/2014/main" xmlns="" id="{5E791F2F-79DB-4CC0-9FA1-001E3E91E8B7}"/>
               </a:ext>
               <a:ext uri="{C183D7F6-B498-43B3-948B-1728B52AA6E4}">
-                <adec:decorative xmlns:adec="http://schemas.microsoft.com/office/drawing/2017/decorative" val="1"/>
+                <adec:decorative xmlns:adec="http://schemas.microsoft.com/office/drawing/2017/decorative" xmlns="" val="1"/>
               </a:ext>
             </a:extLst>
           </p:cNvPr>
@@ -8468,11 +8426,7 @@
             <a:spLocks noGrp="1" noRot="1" noChangeAspect="1" noMove="1" noResize="1" noEditPoints="1" noAdjustHandles="1" noChangeArrowheads="1" noChangeShapeType="1" noTextEdit="1"/>
           </p:cNvSpPr>
           <p:nvPr>
-            <p:extLst>
-              <p:ext uri="{386F3935-93C4-4BCD-93E2-E3B085C9AB24}">
-                <p16:designElem xmlns:p16="http://schemas.microsoft.com/office/powerpoint/2015/main" val="1"/>
-              </p:ext>
-            </p:extLst>
+            <p:extLst/>
           </p:nvPr>
         </p:nvSpPr>
         <p:spPr>
@@ -8550,7 +8504,7 @@
           <p:cNvPr id="3" name="內容版面配置區 2">
             <a:extLst>
               <a:ext uri="{FF2B5EF4-FFF2-40B4-BE49-F238E27FC236}">
-                <a16:creationId xmlns:a16="http://schemas.microsoft.com/office/drawing/2014/main" id="{19147796-2CE5-46C5-9F6D-9F990C2014BC}"/>
+                <a16:creationId xmlns:a16="http://schemas.microsoft.com/office/drawing/2014/main" xmlns="" id="{19147796-2CE5-46C5-9F6D-9F990C2014BC}"/>
               </a:ext>
             </a:extLst>
           </p:cNvPr>
@@ -8600,20 +8554,19 @@
   <p:clrMapOvr>
     <a:masterClrMapping/>
   </p:clrMapOvr>
+  <p:timing>
+    <p:tnLst>
+      <p:par>
+        <p:cTn id="1" dur="indefinite" restart="never" nodeType="tmRoot"/>
+      </p:par>
+    </p:tnLst>
+  </p:timing>
 </p:sld>
 </file>
 
 <file path=ppt/slides/slide16.xml><?xml version="1.0" encoding="utf-8"?>
 <p:sld xmlns:a="http://schemas.openxmlformats.org/drawingml/2006/main" xmlns:r="http://schemas.openxmlformats.org/officeDocument/2006/relationships" xmlns:p="http://schemas.openxmlformats.org/presentationml/2006/main">
   <p:cSld>
-    <p:bg>
-      <p:bgPr>
-        <a:solidFill>
-          <a:schemeClr val="bg1"/>
-        </a:solidFill>
-        <a:effectLst/>
-      </p:bgPr>
-    </p:bg>
     <p:spTree>
       <p:nvGrpSpPr>
         <p:cNvPr id="1" name=""/>
@@ -8633,10 +8586,10 @@
           <p:cNvPr id="10" name="Rectangle 9">
             <a:extLst>
               <a:ext uri="{FF2B5EF4-FFF2-40B4-BE49-F238E27FC236}">
-                <a16:creationId xmlns:a16="http://schemas.microsoft.com/office/drawing/2014/main" id="{6753252F-4873-4F63-801D-CC719279A7D5}"/>
+                <a16:creationId xmlns:a16="http://schemas.microsoft.com/office/drawing/2014/main" xmlns="" id="{6753252F-4873-4F63-801D-CC719279A7D5}"/>
               </a:ext>
               <a:ext uri="{C183D7F6-B498-43B3-948B-1728B52AA6E4}">
-                <adec:decorative xmlns:adec="http://schemas.microsoft.com/office/drawing/2017/decorative" val="1"/>
+                <adec:decorative xmlns:adec="http://schemas.microsoft.com/office/drawing/2017/decorative" xmlns="" val="1"/>
               </a:ext>
             </a:extLst>
           </p:cNvPr>
@@ -8644,11 +8597,7 @@
             <a:spLocks noGrp="1" noRot="1" noChangeAspect="1" noMove="1" noResize="1" noEditPoints="1" noAdjustHandles="1" noChangeArrowheads="1" noChangeShapeType="1" noTextEdit="1"/>
           </p:cNvSpPr>
           <p:nvPr>
-            <p:extLst>
-              <p:ext uri="{386F3935-93C4-4BCD-93E2-E3B085C9AB24}">
-                <p16:designElem xmlns:p16="http://schemas.microsoft.com/office/powerpoint/2015/main" val="1"/>
-              </p:ext>
-            </p:extLst>
+            <p:extLst/>
           </p:nvPr>
         </p:nvSpPr>
         <p:spPr>
@@ -8696,10 +8645,10 @@
           <p:cNvPr id="12" name="Rectangle 11">
             <a:extLst>
               <a:ext uri="{FF2B5EF4-FFF2-40B4-BE49-F238E27FC236}">
-                <a16:creationId xmlns:a16="http://schemas.microsoft.com/office/drawing/2014/main" id="{047C8CCB-F95D-4249-92DD-651249D3535A}"/>
+                <a16:creationId xmlns:a16="http://schemas.microsoft.com/office/drawing/2014/main" xmlns="" id="{047C8CCB-F95D-4249-92DD-651249D3535A}"/>
               </a:ext>
               <a:ext uri="{C183D7F6-B498-43B3-948B-1728B52AA6E4}">
-                <adec:decorative xmlns:adec="http://schemas.microsoft.com/office/drawing/2017/decorative" val="1"/>
+                <adec:decorative xmlns:adec="http://schemas.microsoft.com/office/drawing/2017/decorative" xmlns="" val="1"/>
               </a:ext>
             </a:extLst>
           </p:cNvPr>
@@ -8707,11 +8656,7 @@
             <a:spLocks noGrp="1" noRot="1" noChangeAspect="1" noMove="1" noResize="1" noEditPoints="1" noAdjustHandles="1" noChangeArrowheads="1" noChangeShapeType="1" noTextEdit="1"/>
           </p:cNvSpPr>
           <p:nvPr>
-            <p:extLst>
-              <p:ext uri="{386F3935-93C4-4BCD-93E2-E3B085C9AB24}">
-                <p16:designElem xmlns:p16="http://schemas.microsoft.com/office/powerpoint/2015/main" val="1"/>
-              </p:ext>
-            </p:extLst>
+            <p:extLst/>
           </p:nvPr>
         </p:nvSpPr>
         <p:spPr>
@@ -8759,7 +8704,7 @@
           <p:cNvPr id="2" name="標題 1">
             <a:extLst>
               <a:ext uri="{FF2B5EF4-FFF2-40B4-BE49-F238E27FC236}">
-                <a16:creationId xmlns:a16="http://schemas.microsoft.com/office/drawing/2014/main" id="{C46C7880-1122-4356-9100-FBA3D7ABA9A5}"/>
+                <a16:creationId xmlns:a16="http://schemas.microsoft.com/office/drawing/2014/main" xmlns="" id="{C46C7880-1122-4356-9100-FBA3D7ABA9A5}"/>
               </a:ext>
             </a:extLst>
           </p:cNvPr>
@@ -8819,7 +8764,7 @@
           <p:cNvPr id="5" name="內容版面配置區 4" descr="一張含有 螢幕擷取畫面 的圖片&#10;&#10;自動產生的描述">
             <a:extLst>
               <a:ext uri="{FF2B5EF4-FFF2-40B4-BE49-F238E27FC236}">
-                <a16:creationId xmlns:a16="http://schemas.microsoft.com/office/drawing/2014/main" id="{12CCCE99-3418-4097-9818-5056DF1C9820}"/>
+                <a16:creationId xmlns:a16="http://schemas.microsoft.com/office/drawing/2014/main" xmlns="" id="{12CCCE99-3418-4097-9818-5056DF1C9820}"/>
               </a:ext>
             </a:extLst>
           </p:cNvPr>
@@ -8862,20 +8807,19 @@
   <p:clrMapOvr>
     <a:masterClrMapping/>
   </p:clrMapOvr>
+  <p:timing>
+    <p:tnLst>
+      <p:par>
+        <p:cTn id="1" dur="indefinite" restart="never" nodeType="tmRoot"/>
+      </p:par>
+    </p:tnLst>
+  </p:timing>
 </p:sld>
 </file>
 
 <file path=ppt/slides/slide17.xml><?xml version="1.0" encoding="utf-8"?>
 <p:sld xmlns:a="http://schemas.openxmlformats.org/drawingml/2006/main" xmlns:r="http://schemas.openxmlformats.org/officeDocument/2006/relationships" xmlns:p="http://schemas.openxmlformats.org/presentationml/2006/main">
   <p:cSld>
-    <p:bg>
-      <p:bgPr>
-        <a:solidFill>
-          <a:schemeClr val="bg1"/>
-        </a:solidFill>
-        <a:effectLst/>
-      </p:bgPr>
-    </p:bg>
     <p:spTree>
       <p:nvGrpSpPr>
         <p:cNvPr id="1" name=""/>
@@ -8895,10 +8839,10 @@
           <p:cNvPr id="8" name="Rectangle 7">
             <a:extLst>
               <a:ext uri="{FF2B5EF4-FFF2-40B4-BE49-F238E27FC236}">
-                <a16:creationId xmlns:a16="http://schemas.microsoft.com/office/drawing/2014/main" id="{8D70B121-56F4-4848-B38B-182089D909FA}"/>
+                <a16:creationId xmlns:a16="http://schemas.microsoft.com/office/drawing/2014/main" xmlns="" id="{8D70B121-56F4-4848-B38B-182089D909FA}"/>
               </a:ext>
               <a:ext uri="{C183D7F6-B498-43B3-948B-1728B52AA6E4}">
-                <adec:decorative xmlns:adec="http://schemas.microsoft.com/office/drawing/2017/decorative" val="1"/>
+                <adec:decorative xmlns:adec="http://schemas.microsoft.com/office/drawing/2017/decorative" xmlns="" val="1"/>
               </a:ext>
             </a:extLst>
           </p:cNvPr>
@@ -8906,11 +8850,7 @@
             <a:spLocks noGrp="1" noRot="1" noChangeAspect="1" noMove="1" noResize="1" noEditPoints="1" noAdjustHandles="1" noChangeArrowheads="1" noChangeShapeType="1" noTextEdit="1"/>
           </p:cNvSpPr>
           <p:nvPr>
-            <p:extLst>
-              <p:ext uri="{386F3935-93C4-4BCD-93E2-E3B085C9AB24}">
-                <p16:designElem xmlns:p16="http://schemas.microsoft.com/office/powerpoint/2015/main" val="1"/>
-              </p:ext>
-            </p:extLst>
+            <p:extLst/>
           </p:nvPr>
         </p:nvSpPr>
         <p:spPr bwMode="ltGray">
@@ -8960,7 +8900,7 @@
           <p:cNvPr id="2" name="標題 1">
             <a:extLst>
               <a:ext uri="{FF2B5EF4-FFF2-40B4-BE49-F238E27FC236}">
-                <a16:creationId xmlns:a16="http://schemas.microsoft.com/office/drawing/2014/main" id="{C4F1FF4A-FE6D-41A6-8480-BCB0D2ED67EA}"/>
+                <a16:creationId xmlns:a16="http://schemas.microsoft.com/office/drawing/2014/main" xmlns="" id="{C4F1FF4A-FE6D-41A6-8480-BCB0D2ED67EA}"/>
               </a:ext>
             </a:extLst>
           </p:cNvPr>
@@ -9023,10 +8963,10 @@
           <p:cNvPr id="10" name="Straight Connector 9">
             <a:extLst>
               <a:ext uri="{FF2B5EF4-FFF2-40B4-BE49-F238E27FC236}">
-                <a16:creationId xmlns:a16="http://schemas.microsoft.com/office/drawing/2014/main" id="{2D72A2C9-F3CA-4216-8BAD-FA4C970C3C4E}"/>
+                <a16:creationId xmlns:a16="http://schemas.microsoft.com/office/drawing/2014/main" xmlns="" id="{2D72A2C9-F3CA-4216-8BAD-FA4C970C3C4E}"/>
               </a:ext>
               <a:ext uri="{C183D7F6-B498-43B3-948B-1728B52AA6E4}">
-                <adec:decorative xmlns:adec="http://schemas.microsoft.com/office/drawing/2017/decorative" val="1"/>
+                <adec:decorative xmlns:adec="http://schemas.microsoft.com/office/drawing/2017/decorative" xmlns="" val="1"/>
               </a:ext>
             </a:extLst>
           </p:cNvPr>
@@ -9034,11 +8974,7 @@
             <a:cxnSpLocks noGrp="1" noRot="1" noChangeAspect="1" noMove="1" noResize="1" noEditPoints="1" noAdjustHandles="1" noChangeArrowheads="1" noChangeShapeType="1"/>
           </p:cNvCxnSpPr>
           <p:nvPr>
-            <p:extLst>
-              <p:ext uri="{386F3935-93C4-4BCD-93E2-E3B085C9AB24}">
-                <p16:designElem xmlns:p16="http://schemas.microsoft.com/office/powerpoint/2015/main" val="1"/>
-              </p:ext>
-            </p:extLst>
+            <p:extLst/>
           </p:nvPr>
         </p:nvCxnSpPr>
         <p:spPr>
@@ -9078,7 +9014,7 @@
           <p:cNvPr id="3" name="內容版面配置區 2">
             <a:extLst>
               <a:ext uri="{FF2B5EF4-FFF2-40B4-BE49-F238E27FC236}">
-                <a16:creationId xmlns:a16="http://schemas.microsoft.com/office/drawing/2014/main" id="{94652D2F-E568-49A1-A505-610D397F1EA7}"/>
+                <a16:creationId xmlns:a16="http://schemas.microsoft.com/office/drawing/2014/main" xmlns="" id="{94652D2F-E568-49A1-A505-610D397F1EA7}"/>
               </a:ext>
             </a:extLst>
           </p:cNvPr>
@@ -9134,20 +9070,19 @@
   <p:clrMapOvr>
     <a:masterClrMapping/>
   </p:clrMapOvr>
+  <p:timing>
+    <p:tnLst>
+      <p:par>
+        <p:cTn id="1" dur="indefinite" restart="never" nodeType="tmRoot"/>
+      </p:par>
+    </p:tnLst>
+  </p:timing>
 </p:sld>
 </file>
 
 <file path=ppt/slides/slide18.xml><?xml version="1.0" encoding="utf-8"?>
 <p:sld xmlns:a="http://schemas.openxmlformats.org/drawingml/2006/main" xmlns:r="http://schemas.openxmlformats.org/officeDocument/2006/relationships" xmlns:p="http://schemas.openxmlformats.org/presentationml/2006/main">
   <p:cSld>
-    <p:bg>
-      <p:bgPr>
-        <a:solidFill>
-          <a:schemeClr val="bg1"/>
-        </a:solidFill>
-        <a:effectLst/>
-      </p:bgPr>
-    </p:bg>
     <p:spTree>
       <p:nvGrpSpPr>
         <p:cNvPr id="1" name=""/>
@@ -9167,10 +9102,10 @@
           <p:cNvPr id="10" name="Rectangle 9">
             <a:extLst>
               <a:ext uri="{FF2B5EF4-FFF2-40B4-BE49-F238E27FC236}">
-                <a16:creationId xmlns:a16="http://schemas.microsoft.com/office/drawing/2014/main" id="{6753252F-4873-4F63-801D-CC719279A7D5}"/>
+                <a16:creationId xmlns:a16="http://schemas.microsoft.com/office/drawing/2014/main" xmlns="" id="{6753252F-4873-4F63-801D-CC719279A7D5}"/>
               </a:ext>
               <a:ext uri="{C183D7F6-B498-43B3-948B-1728B52AA6E4}">
-                <adec:decorative xmlns:adec="http://schemas.microsoft.com/office/drawing/2017/decorative" val="1"/>
+                <adec:decorative xmlns:adec="http://schemas.microsoft.com/office/drawing/2017/decorative" xmlns="" val="1"/>
               </a:ext>
             </a:extLst>
           </p:cNvPr>
@@ -9178,11 +9113,7 @@
             <a:spLocks noGrp="1" noRot="1" noChangeAspect="1" noMove="1" noResize="1" noEditPoints="1" noAdjustHandles="1" noChangeArrowheads="1" noChangeShapeType="1" noTextEdit="1"/>
           </p:cNvSpPr>
           <p:nvPr>
-            <p:extLst>
-              <p:ext uri="{386F3935-93C4-4BCD-93E2-E3B085C9AB24}">
-                <p16:designElem xmlns:p16="http://schemas.microsoft.com/office/powerpoint/2015/main" val="1"/>
-              </p:ext>
-            </p:extLst>
+            <p:extLst/>
           </p:nvPr>
         </p:nvSpPr>
         <p:spPr>
@@ -9230,10 +9161,10 @@
           <p:cNvPr id="12" name="Rectangle 11">
             <a:extLst>
               <a:ext uri="{FF2B5EF4-FFF2-40B4-BE49-F238E27FC236}">
-                <a16:creationId xmlns:a16="http://schemas.microsoft.com/office/drawing/2014/main" id="{047C8CCB-F95D-4249-92DD-651249D3535A}"/>
+                <a16:creationId xmlns:a16="http://schemas.microsoft.com/office/drawing/2014/main" xmlns="" id="{047C8CCB-F95D-4249-92DD-651249D3535A}"/>
               </a:ext>
               <a:ext uri="{C183D7F6-B498-43B3-948B-1728B52AA6E4}">
-                <adec:decorative xmlns:adec="http://schemas.microsoft.com/office/drawing/2017/decorative" val="1"/>
+                <adec:decorative xmlns:adec="http://schemas.microsoft.com/office/drawing/2017/decorative" xmlns="" val="1"/>
               </a:ext>
             </a:extLst>
           </p:cNvPr>
@@ -9241,11 +9172,7 @@
             <a:spLocks noGrp="1" noRot="1" noChangeAspect="1" noMove="1" noResize="1" noEditPoints="1" noAdjustHandles="1" noChangeArrowheads="1" noChangeShapeType="1" noTextEdit="1"/>
           </p:cNvSpPr>
           <p:nvPr>
-            <p:extLst>
-              <p:ext uri="{386F3935-93C4-4BCD-93E2-E3B085C9AB24}">
-                <p16:designElem xmlns:p16="http://schemas.microsoft.com/office/powerpoint/2015/main" val="1"/>
-              </p:ext>
-            </p:extLst>
+            <p:extLst/>
           </p:nvPr>
         </p:nvSpPr>
         <p:spPr>
@@ -9293,7 +9220,7 @@
           <p:cNvPr id="2" name="標題 1">
             <a:extLst>
               <a:ext uri="{FF2B5EF4-FFF2-40B4-BE49-F238E27FC236}">
-                <a16:creationId xmlns:a16="http://schemas.microsoft.com/office/drawing/2014/main" id="{3613885F-04EB-4C56-A8F2-CB9DAD0A6DC6}"/>
+                <a16:creationId xmlns:a16="http://schemas.microsoft.com/office/drawing/2014/main" xmlns="" id="{3613885F-04EB-4C56-A8F2-CB9DAD0A6DC6}"/>
               </a:ext>
             </a:extLst>
           </p:cNvPr>
@@ -9353,7 +9280,7 @@
           <p:cNvPr id="5" name="內容版面配置區 4" descr="一張含有 螢幕擷取畫面 的圖片&#10;&#10;自動產生的描述">
             <a:extLst>
               <a:ext uri="{FF2B5EF4-FFF2-40B4-BE49-F238E27FC236}">
-                <a16:creationId xmlns:a16="http://schemas.microsoft.com/office/drawing/2014/main" id="{2AB76CA4-D124-4DB3-8FBF-532A1B01AEB4}"/>
+                <a16:creationId xmlns:a16="http://schemas.microsoft.com/office/drawing/2014/main" xmlns="" id="{2AB76CA4-D124-4DB3-8FBF-532A1B01AEB4}"/>
               </a:ext>
             </a:extLst>
           </p:cNvPr>
@@ -9396,20 +9323,19 @@
   <p:clrMapOvr>
     <a:masterClrMapping/>
   </p:clrMapOvr>
+  <p:timing>
+    <p:tnLst>
+      <p:par>
+        <p:cTn id="1" dur="indefinite" restart="never" nodeType="tmRoot"/>
+      </p:par>
+    </p:tnLst>
+  </p:timing>
 </p:sld>
 </file>
 
 <file path=ppt/slides/slide19.xml><?xml version="1.0" encoding="utf-8"?>
 <p:sld xmlns:a="http://schemas.openxmlformats.org/drawingml/2006/main" xmlns:r="http://schemas.openxmlformats.org/officeDocument/2006/relationships" xmlns:p="http://schemas.openxmlformats.org/presentationml/2006/main">
   <p:cSld>
-    <p:bg>
-      <p:bgPr>
-        <a:solidFill>
-          <a:schemeClr val="bg1"/>
-        </a:solidFill>
-        <a:effectLst/>
-      </p:bgPr>
-    </p:bg>
     <p:spTree>
       <p:nvGrpSpPr>
         <p:cNvPr id="1" name=""/>
@@ -9429,10 +9355,10 @@
           <p:cNvPr id="17" name="Rectangle 16">
             <a:extLst>
               <a:ext uri="{FF2B5EF4-FFF2-40B4-BE49-F238E27FC236}">
-                <a16:creationId xmlns:a16="http://schemas.microsoft.com/office/drawing/2014/main" id="{6753252F-4873-4F63-801D-CC719279A7D5}"/>
+                <a16:creationId xmlns:a16="http://schemas.microsoft.com/office/drawing/2014/main" xmlns="" id="{6753252F-4873-4F63-801D-CC719279A7D5}"/>
               </a:ext>
               <a:ext uri="{C183D7F6-B498-43B3-948B-1728B52AA6E4}">
-                <adec:decorative xmlns:adec="http://schemas.microsoft.com/office/drawing/2017/decorative" val="1"/>
+                <adec:decorative xmlns:adec="http://schemas.microsoft.com/office/drawing/2017/decorative" xmlns="" val="1"/>
               </a:ext>
             </a:extLst>
           </p:cNvPr>
@@ -9440,11 +9366,7 @@
             <a:spLocks noGrp="1" noRot="1" noChangeAspect="1" noMove="1" noResize="1" noEditPoints="1" noAdjustHandles="1" noChangeArrowheads="1" noChangeShapeType="1" noTextEdit="1"/>
           </p:cNvSpPr>
           <p:nvPr>
-            <p:extLst>
-              <p:ext uri="{386F3935-93C4-4BCD-93E2-E3B085C9AB24}">
-                <p16:designElem xmlns:p16="http://schemas.microsoft.com/office/powerpoint/2015/main" val="1"/>
-              </p:ext>
-            </p:extLst>
+            <p:extLst/>
           </p:nvPr>
         </p:nvSpPr>
         <p:spPr>
@@ -9492,10 +9414,10 @@
           <p:cNvPr id="19" name="Rectangle 18">
             <a:extLst>
               <a:ext uri="{FF2B5EF4-FFF2-40B4-BE49-F238E27FC236}">
-                <a16:creationId xmlns:a16="http://schemas.microsoft.com/office/drawing/2014/main" id="{047C8CCB-F95D-4249-92DD-651249D3535A}"/>
+                <a16:creationId xmlns:a16="http://schemas.microsoft.com/office/drawing/2014/main" xmlns="" id="{047C8CCB-F95D-4249-92DD-651249D3535A}"/>
               </a:ext>
               <a:ext uri="{C183D7F6-B498-43B3-948B-1728B52AA6E4}">
-                <adec:decorative xmlns:adec="http://schemas.microsoft.com/office/drawing/2017/decorative" val="1"/>
+                <adec:decorative xmlns:adec="http://schemas.microsoft.com/office/drawing/2017/decorative" xmlns="" val="1"/>
               </a:ext>
             </a:extLst>
           </p:cNvPr>
@@ -9503,11 +9425,7 @@
             <a:spLocks noGrp="1" noRot="1" noChangeAspect="1" noMove="1" noResize="1" noEditPoints="1" noAdjustHandles="1" noChangeArrowheads="1" noChangeShapeType="1" noTextEdit="1"/>
           </p:cNvSpPr>
           <p:nvPr>
-            <p:extLst>
-              <p:ext uri="{386F3935-93C4-4BCD-93E2-E3B085C9AB24}">
-                <p16:designElem xmlns:p16="http://schemas.microsoft.com/office/powerpoint/2015/main" val="1"/>
-              </p:ext>
-            </p:extLst>
+            <p:extLst/>
           </p:nvPr>
         </p:nvSpPr>
         <p:spPr>
@@ -9555,7 +9473,7 @@
           <p:cNvPr id="2" name="標題 1">
             <a:extLst>
               <a:ext uri="{FF2B5EF4-FFF2-40B4-BE49-F238E27FC236}">
-                <a16:creationId xmlns:a16="http://schemas.microsoft.com/office/drawing/2014/main" id="{96A9862A-2276-4672-ADE0-6C9F2781504A}"/>
+                <a16:creationId xmlns:a16="http://schemas.microsoft.com/office/drawing/2014/main" xmlns="" id="{96A9862A-2276-4672-ADE0-6C9F2781504A}"/>
               </a:ext>
             </a:extLst>
           </p:cNvPr>
@@ -9615,7 +9533,7 @@
           <p:cNvPr id="5" name="內容版面配置區 4" descr="一張含有 螢幕擷取畫面 的圖片&#10;&#10;自動產生的描述">
             <a:extLst>
               <a:ext uri="{FF2B5EF4-FFF2-40B4-BE49-F238E27FC236}">
-                <a16:creationId xmlns:a16="http://schemas.microsoft.com/office/drawing/2014/main" id="{57419162-B390-4796-A2E4-1B7918ACC0B7}"/>
+                <a16:creationId xmlns:a16="http://schemas.microsoft.com/office/drawing/2014/main" xmlns="" id="{57419162-B390-4796-A2E4-1B7918ACC0B7}"/>
               </a:ext>
             </a:extLst>
           </p:cNvPr>
@@ -9658,20 +9576,19 @@
   <p:clrMapOvr>
     <a:masterClrMapping/>
   </p:clrMapOvr>
+  <p:timing>
+    <p:tnLst>
+      <p:par>
+        <p:cTn id="1" dur="indefinite" restart="never" nodeType="tmRoot"/>
+      </p:par>
+    </p:tnLst>
+  </p:timing>
 </p:sld>
 </file>
 
 <file path=ppt/slides/slide2.xml><?xml version="1.0" encoding="utf-8"?>
 <p:sld xmlns:a="http://schemas.openxmlformats.org/drawingml/2006/main" xmlns:r="http://schemas.openxmlformats.org/officeDocument/2006/relationships" xmlns:p="http://schemas.openxmlformats.org/presentationml/2006/main">
   <p:cSld>
-    <p:bg>
-      <p:bgPr>
-        <a:solidFill>
-          <a:schemeClr val="bg1"/>
-        </a:solidFill>
-        <a:effectLst/>
-      </p:bgPr>
-    </p:bg>
     <p:spTree>
       <p:nvGrpSpPr>
         <p:cNvPr id="1" name=""/>
@@ -9691,7 +9608,7 @@
           <p:cNvPr id="2" name="標題 1">
             <a:extLst>
               <a:ext uri="{FF2B5EF4-FFF2-40B4-BE49-F238E27FC236}">
-                <a16:creationId xmlns:a16="http://schemas.microsoft.com/office/drawing/2014/main" id="{591EBFF2-E9B5-4D0B-82F4-AE8B994E5DA9}"/>
+                <a16:creationId xmlns:a16="http://schemas.microsoft.com/office/drawing/2014/main" xmlns="" id="{591EBFF2-E9B5-4D0B-82F4-AE8B994E5DA9}"/>
               </a:ext>
             </a:extLst>
           </p:cNvPr>
@@ -9727,7 +9644,7 @@
           <p:cNvPr id="12" name="內容版面配置區 2">
             <a:extLst>
               <a:ext uri="{FF2B5EF4-FFF2-40B4-BE49-F238E27FC236}">
-                <a16:creationId xmlns:a16="http://schemas.microsoft.com/office/drawing/2014/main" id="{B0880163-49DB-4D1E-9286-AC58B5DE2D81}"/>
+                <a16:creationId xmlns:a16="http://schemas.microsoft.com/office/drawing/2014/main" xmlns="" id="{B0880163-49DB-4D1E-9286-AC58B5DE2D81}"/>
               </a:ext>
             </a:extLst>
           </p:cNvPr>
@@ -9763,20 +9680,19 @@
   <p:clrMapOvr>
     <a:masterClrMapping/>
   </p:clrMapOvr>
+  <p:timing>
+    <p:tnLst>
+      <p:par>
+        <p:cTn id="1" dur="indefinite" restart="never" nodeType="tmRoot"/>
+      </p:par>
+    </p:tnLst>
+  </p:timing>
 </p:sld>
 </file>
 
 <file path=ppt/slides/slide20.xml><?xml version="1.0" encoding="utf-8"?>
 <p:sld xmlns:a="http://schemas.openxmlformats.org/drawingml/2006/main" xmlns:r="http://schemas.openxmlformats.org/officeDocument/2006/relationships" xmlns:p="http://schemas.openxmlformats.org/presentationml/2006/main">
   <p:cSld>
-    <p:bg>
-      <p:bgPr>
-        <a:solidFill>
-          <a:schemeClr val="bg1"/>
-        </a:solidFill>
-        <a:effectLst/>
-      </p:bgPr>
-    </p:bg>
     <p:spTree>
       <p:nvGrpSpPr>
         <p:cNvPr id="1" name=""/>
@@ -9793,13 +9709,289 @@
       </p:grpSpPr>
       <p:sp>
         <p:nvSpPr>
+          <p:cNvPr id="17" name="Rectangle 16">
+            <a:extLst>
+              <a:ext uri="{FF2B5EF4-FFF2-40B4-BE49-F238E27FC236}">
+                <a16:creationId xmlns:a16="http://schemas.microsoft.com/office/drawing/2014/main" xmlns="" id="{6753252F-4873-4F63-801D-CC719279A7D5}"/>
+              </a:ext>
+              <a:ext uri="{C183D7F6-B498-43B3-948B-1728B52AA6E4}">
+                <adec:decorative xmlns:adec="http://schemas.microsoft.com/office/drawing/2017/decorative" xmlns="" val="1"/>
+              </a:ext>
+            </a:extLst>
+          </p:cNvPr>
+          <p:cNvSpPr>
+            <a:spLocks noGrp="1" noRot="1" noChangeAspect="1" noMove="1" noResize="1" noEditPoints="1" noAdjustHandles="1" noChangeArrowheads="1" noChangeShapeType="1" noTextEdit="1"/>
+          </p:cNvSpPr>
+          <p:nvPr>
+            <p:extLst/>
+          </p:nvPr>
+        </p:nvSpPr>
+        <p:spPr>
+          <a:xfrm>
+            <a:off x="0" y="0"/>
+            <a:ext cx="12192000" cy="6858000"/>
+          </a:xfrm>
+          <a:prstGeom prst="rect">
+            <a:avLst/>
+          </a:prstGeom>
+          <a:solidFill>
+            <a:srgbClr val="FFFFFF"/>
+          </a:solidFill>
+          <a:ln>
+            <a:noFill/>
+          </a:ln>
+        </p:spPr>
+        <p:style>
+          <a:lnRef idx="2">
+            <a:schemeClr val="accent1">
+              <a:shade val="50000"/>
+            </a:schemeClr>
+          </a:lnRef>
+          <a:fillRef idx="1">
+            <a:schemeClr val="accent1"/>
+          </a:fillRef>
+          <a:effectRef idx="0">
+            <a:schemeClr val="accent1"/>
+          </a:effectRef>
+          <a:fontRef idx="minor">
+            <a:schemeClr val="lt1"/>
+          </a:fontRef>
+        </p:style>
+        <p:txBody>
+          <a:bodyPr rtlCol="0" anchor="ctr"/>
+          <a:lstStyle/>
+          <a:p>
+            <a:pPr algn="ctr"/>
+            <a:endParaRPr lang="en-US"/>
+          </a:p>
+        </p:txBody>
+      </p:sp>
+      <p:sp>
+        <p:nvSpPr>
+          <p:cNvPr id="19" name="Rectangle 18">
+            <a:extLst>
+              <a:ext uri="{FF2B5EF4-FFF2-40B4-BE49-F238E27FC236}">
+                <a16:creationId xmlns:a16="http://schemas.microsoft.com/office/drawing/2014/main" xmlns="" id="{047C8CCB-F95D-4249-92DD-651249D3535A}"/>
+              </a:ext>
+              <a:ext uri="{C183D7F6-B498-43B3-948B-1728B52AA6E4}">
+                <adec:decorative xmlns:adec="http://schemas.microsoft.com/office/drawing/2017/decorative" xmlns="" val="1"/>
+              </a:ext>
+            </a:extLst>
+          </p:cNvPr>
+          <p:cNvSpPr>
+            <a:spLocks noGrp="1" noRot="1" noChangeAspect="1" noMove="1" noResize="1" noEditPoints="1" noAdjustHandles="1" noChangeArrowheads="1" noChangeShapeType="1" noTextEdit="1"/>
+          </p:cNvSpPr>
+          <p:nvPr>
+            <p:extLst/>
+          </p:nvPr>
+        </p:nvSpPr>
+        <p:spPr>
+          <a:xfrm>
+            <a:off x="0" y="0"/>
+            <a:ext cx="2013557" cy="6858000"/>
+          </a:xfrm>
+          <a:prstGeom prst="rect">
+            <a:avLst/>
+          </a:prstGeom>
+          <a:solidFill>
+            <a:srgbClr val="7F7F7F"/>
+          </a:solidFill>
+          <a:ln>
+            <a:noFill/>
+          </a:ln>
+        </p:spPr>
+        <p:style>
+          <a:lnRef idx="2">
+            <a:schemeClr val="accent1">
+              <a:shade val="50000"/>
+            </a:schemeClr>
+          </a:lnRef>
+          <a:fillRef idx="1">
+            <a:schemeClr val="accent1"/>
+          </a:fillRef>
+          <a:effectRef idx="0">
+            <a:schemeClr val="accent1"/>
+          </a:effectRef>
+          <a:fontRef idx="minor">
+            <a:schemeClr val="lt1"/>
+          </a:fontRef>
+        </p:style>
+        <p:txBody>
+          <a:bodyPr rtlCol="0" anchor="ctr"/>
+          <a:lstStyle/>
+          <a:p>
+            <a:pPr algn="ctr"/>
+            <a:endParaRPr lang="en-US"/>
+          </a:p>
+        </p:txBody>
+      </p:sp>
+      <p:sp>
+        <p:nvSpPr>
+          <p:cNvPr id="2" name="標題 1">
+            <a:extLst>
+              <a:ext uri="{FF2B5EF4-FFF2-40B4-BE49-F238E27FC236}">
+                <a16:creationId xmlns:a16="http://schemas.microsoft.com/office/drawing/2014/main" xmlns="" id="{96A9862A-2276-4672-ADE0-6C9F2781504A}"/>
+              </a:ext>
+            </a:extLst>
+          </p:cNvPr>
+          <p:cNvSpPr>
+            <a:spLocks noGrp="1"/>
+          </p:cNvSpPr>
+          <p:nvPr>
+            <p:ph type="title"/>
+          </p:nvPr>
+        </p:nvSpPr>
+        <p:spPr>
+          <a:xfrm>
+            <a:off x="640080" y="2074363"/>
+            <a:ext cx="2752354" cy="2709275"/>
+          </a:xfrm>
+          <a:prstGeom prst="ellipse">
+            <a:avLst/>
+          </a:prstGeom>
+          <a:solidFill>
+            <a:srgbClr val="262626"/>
+          </a:solidFill>
+          <a:ln w="174625" cmpd="thinThick">
+            <a:solidFill>
+              <a:srgbClr val="262626"/>
+            </a:solidFill>
+          </a:ln>
+        </p:spPr>
+        <p:txBody>
+          <a:bodyPr vert="horz" lIns="91440" tIns="45720" rIns="91440" bIns="45720" rtlCol="0" anchor="ctr">
+            <a:normAutofit/>
+          </a:bodyPr>
+          <a:lstStyle/>
+          <a:p>
+            <a:pPr algn="ctr"/>
+            <a:r>
+              <a:rPr kumimoji="1" lang="en-US" altLang="zh-CN" sz="2800" b="1" dirty="0">
+                <a:solidFill>
+                  <a:schemeClr val="bg1"/>
+                </a:solidFill>
+                <a:latin typeface="Times New Roman" charset="0"/>
+                <a:ea typeface="Times New Roman" charset="0"/>
+                <a:cs typeface="Times New Roman" charset="0"/>
+              </a:rPr>
+              <a:t>Project Related Link:</a:t>
+            </a:r>
+            <a:endParaRPr lang="en-US" altLang="zh-CN" sz="2600" b="1" kern="1200" dirty="0">
+              <a:solidFill>
+                <a:schemeClr val="bg1"/>
+              </a:solidFill>
+              <a:effectLst>
+                <a:outerShdw blurRad="38100" dist="38100" dir="2700000" algn="tl">
+                  <a:srgbClr val="000000">
+                    <a:alpha val="43137"/>
+                  </a:srgbClr>
+                </a:outerShdw>
+              </a:effectLst>
+              <a:latin typeface="Times New Roman" panose="02020603050405020304" pitchFamily="18" charset="0"/>
+              <a:cs typeface="Times New Roman" panose="02020603050405020304" pitchFamily="18" charset="0"/>
+            </a:endParaRPr>
+          </a:p>
+        </p:txBody>
+      </p:sp>
+      <p:sp>
+        <p:nvSpPr>
+          <p:cNvPr id="3" name="内容占位符 2"/>
+          <p:cNvSpPr>
+            <a:spLocks noGrp="1"/>
+          </p:cNvSpPr>
+          <p:nvPr>
+            <p:ph idx="1"/>
+          </p:nvPr>
+        </p:nvSpPr>
+        <p:spPr>
+          <a:xfrm>
+            <a:off x="3650615" y="1253331"/>
+            <a:ext cx="8283203" cy="4351338"/>
+          </a:xfrm>
+        </p:spPr>
+        <p:txBody>
+          <a:bodyPr/>
+          <a:lstStyle/>
+          <a:p>
+            <a:r>
+              <a:rPr kumimoji="1" lang="en-US" altLang="zh-CN" sz="3600" b="1" dirty="0"/>
+              <a:t>Repository Page: </a:t>
+            </a:r>
+            <a:r>
+              <a:rPr kumimoji="1" lang="en-US" altLang="zh-CN" dirty="0">
+                <a:hlinkClick r:id="rId2"/>
+              </a:rPr>
+              <a:t>https://github.com/change521/CS4353_Final_Project/</a:t>
+            </a:r>
+            <a:endParaRPr kumimoji="1" lang="en-US" altLang="zh-CN" dirty="0"/>
+          </a:p>
+          <a:p>
+            <a:endParaRPr kumimoji="1" lang="en-US" altLang="zh-CN" dirty="0"/>
+          </a:p>
+          <a:p>
+            <a:r>
+              <a:rPr kumimoji="1" lang="en-US" altLang="zh-CN" sz="3600" b="1" dirty="0"/>
+              <a:t>Website Page: </a:t>
+            </a:r>
+            <a:r>
+              <a:rPr kumimoji="1" lang="en-US" altLang="zh-CN" dirty="0">
+                <a:hlinkClick r:id="rId3"/>
+              </a:rPr>
+              <a:t>https://dyaniel96.github.io/CS4354Project/</a:t>
+            </a:r>
+            <a:endParaRPr kumimoji="1" lang="en-US" altLang="zh-CN" dirty="0"/>
+          </a:p>
+          <a:p>
+            <a:endParaRPr kumimoji="1" lang="zh-CN" altLang="en-US" dirty="0"/>
+          </a:p>
+        </p:txBody>
+      </p:sp>
+    </p:spTree>
+    <p:extLst>
+      <p:ext uri="{BB962C8B-B14F-4D97-AF65-F5344CB8AC3E}">
+        <p14:creationId xmlns:p14="http://schemas.microsoft.com/office/powerpoint/2010/main" val="1825881979"/>
+      </p:ext>
+    </p:extLst>
+  </p:cSld>
+  <p:clrMapOvr>
+    <a:masterClrMapping/>
+  </p:clrMapOvr>
+  <p:timing>
+    <p:tnLst>
+      <p:par>
+        <p:cTn id="1" dur="indefinite" restart="never" nodeType="tmRoot"/>
+      </p:par>
+    </p:tnLst>
+  </p:timing>
+</p:sld>
+</file>
+
+<file path=ppt/slides/slide21.xml><?xml version="1.0" encoding="utf-8"?>
+<p:sld xmlns:a="http://schemas.openxmlformats.org/drawingml/2006/main" xmlns:r="http://schemas.openxmlformats.org/officeDocument/2006/relationships" xmlns:p="http://schemas.openxmlformats.org/presentationml/2006/main">
+  <p:cSld>
+    <p:spTree>
+      <p:nvGrpSpPr>
+        <p:cNvPr id="1" name=""/>
+        <p:cNvGrpSpPr/>
+        <p:nvPr/>
+      </p:nvGrpSpPr>
+      <p:grpSpPr>
+        <a:xfrm>
+          <a:off x="0" y="0"/>
+          <a:ext cx="0" cy="0"/>
+          <a:chOff x="0" y="0"/>
+          <a:chExt cx="0" cy="0"/>
+        </a:xfrm>
+      </p:grpSpPr>
+      <p:sp>
+        <p:nvSpPr>
           <p:cNvPr id="8" name="Rectangle 7">
             <a:extLst>
               <a:ext uri="{FF2B5EF4-FFF2-40B4-BE49-F238E27FC236}">
-                <a16:creationId xmlns:a16="http://schemas.microsoft.com/office/drawing/2014/main" id="{8D70B121-56F4-4848-B38B-182089D909FA}"/>
+                <a16:creationId xmlns:a16="http://schemas.microsoft.com/office/drawing/2014/main" xmlns="" id="{8D70B121-56F4-4848-B38B-182089D909FA}"/>
               </a:ext>
               <a:ext uri="{C183D7F6-B498-43B3-948B-1728B52AA6E4}">
-                <adec:decorative xmlns:adec="http://schemas.microsoft.com/office/drawing/2017/decorative" val="1"/>
+                <adec:decorative xmlns:adec="http://schemas.microsoft.com/office/drawing/2017/decorative" xmlns="" val="1"/>
               </a:ext>
             </a:extLst>
           </p:cNvPr>
@@ -9807,11 +9999,7 @@
             <a:spLocks noGrp="1" noRot="1" noChangeAspect="1" noMove="1" noResize="1" noEditPoints="1" noAdjustHandles="1" noChangeArrowheads="1" noChangeShapeType="1" noTextEdit="1"/>
           </p:cNvSpPr>
           <p:nvPr>
-            <p:extLst>
-              <p:ext uri="{386F3935-93C4-4BCD-93E2-E3B085C9AB24}">
-                <p16:designElem xmlns:p16="http://schemas.microsoft.com/office/powerpoint/2015/main" val="1"/>
-              </p:ext>
-            </p:extLst>
+            <p:extLst/>
           </p:nvPr>
         </p:nvSpPr>
         <p:spPr bwMode="ltGray">
@@ -9861,7 +10049,7 @@
           <p:cNvPr id="2" name="標題 1">
             <a:extLst>
               <a:ext uri="{FF2B5EF4-FFF2-40B4-BE49-F238E27FC236}">
-                <a16:creationId xmlns:a16="http://schemas.microsoft.com/office/drawing/2014/main" id="{D927C832-9C3C-4E38-B822-5EA174AA03C2}"/>
+                <a16:creationId xmlns:a16="http://schemas.microsoft.com/office/drawing/2014/main" xmlns="" id="{D927C832-9C3C-4E38-B822-5EA174AA03C2}"/>
               </a:ext>
             </a:extLst>
           </p:cNvPr>
@@ -9924,10 +10112,10 @@
           <p:cNvPr id="10" name="Straight Connector 9">
             <a:extLst>
               <a:ext uri="{FF2B5EF4-FFF2-40B4-BE49-F238E27FC236}">
-                <a16:creationId xmlns:a16="http://schemas.microsoft.com/office/drawing/2014/main" id="{2D72A2C9-F3CA-4216-8BAD-FA4C970C3C4E}"/>
+                <a16:creationId xmlns:a16="http://schemas.microsoft.com/office/drawing/2014/main" xmlns="" id="{2D72A2C9-F3CA-4216-8BAD-FA4C970C3C4E}"/>
               </a:ext>
               <a:ext uri="{C183D7F6-B498-43B3-948B-1728B52AA6E4}">
-                <adec:decorative xmlns:adec="http://schemas.microsoft.com/office/drawing/2017/decorative" val="1"/>
+                <adec:decorative xmlns:adec="http://schemas.microsoft.com/office/drawing/2017/decorative" xmlns="" val="1"/>
               </a:ext>
             </a:extLst>
           </p:cNvPr>
@@ -9935,11 +10123,7 @@
             <a:cxnSpLocks noGrp="1" noRot="1" noChangeAspect="1" noMove="1" noResize="1" noEditPoints="1" noAdjustHandles="1" noChangeArrowheads="1" noChangeShapeType="1"/>
           </p:cNvCxnSpPr>
           <p:nvPr>
-            <p:extLst>
-              <p:ext uri="{386F3935-93C4-4BCD-93E2-E3B085C9AB24}">
-                <p16:designElem xmlns:p16="http://schemas.microsoft.com/office/powerpoint/2015/main" val="1"/>
-              </p:ext>
-            </p:extLst>
+            <p:extLst/>
           </p:nvPr>
         </p:nvCxnSpPr>
         <p:spPr>
@@ -9979,7 +10163,7 @@
           <p:cNvPr id="3" name="內容版面配置區 2">
             <a:extLst>
               <a:ext uri="{FF2B5EF4-FFF2-40B4-BE49-F238E27FC236}">
-                <a16:creationId xmlns:a16="http://schemas.microsoft.com/office/drawing/2014/main" id="{8B7D3A84-AD2D-48BC-9898-03A01CCFA839}"/>
+                <a16:creationId xmlns:a16="http://schemas.microsoft.com/office/drawing/2014/main" xmlns="" id="{8B7D3A84-AD2D-48BC-9898-03A01CCFA839}"/>
               </a:ext>
             </a:extLst>
           </p:cNvPr>
@@ -10089,20 +10273,19 @@
   <p:clrMapOvr>
     <a:masterClrMapping/>
   </p:clrMapOvr>
+  <p:timing>
+    <p:tnLst>
+      <p:par>
+        <p:cTn id="1" dur="indefinite" restart="never" nodeType="tmRoot"/>
+      </p:par>
+    </p:tnLst>
+  </p:timing>
 </p:sld>
 </file>
 
-<file path=ppt/slides/slide21.xml><?xml version="1.0" encoding="utf-8"?>
+<file path=ppt/slides/slide22.xml><?xml version="1.0" encoding="utf-8"?>
 <p:sld xmlns:a="http://schemas.openxmlformats.org/drawingml/2006/main" xmlns:r="http://schemas.openxmlformats.org/officeDocument/2006/relationships" xmlns:p="http://schemas.openxmlformats.org/presentationml/2006/main">
   <p:cSld>
-    <p:bg>
-      <p:bgPr>
-        <a:solidFill>
-          <a:schemeClr val="bg1"/>
-        </a:solidFill>
-        <a:effectLst/>
-      </p:bgPr>
-    </p:bg>
     <p:spTree>
       <p:nvGrpSpPr>
         <p:cNvPr id="1" name=""/>
@@ -10122,10 +10305,10 @@
           <p:cNvPr id="8" name="Rectangle 7">
             <a:extLst>
               <a:ext uri="{FF2B5EF4-FFF2-40B4-BE49-F238E27FC236}">
-                <a16:creationId xmlns:a16="http://schemas.microsoft.com/office/drawing/2014/main" id="{8D70B121-56F4-4848-B38B-182089D909FA}"/>
+                <a16:creationId xmlns:a16="http://schemas.microsoft.com/office/drawing/2014/main" xmlns="" id="{8D70B121-56F4-4848-B38B-182089D909FA}"/>
               </a:ext>
               <a:ext uri="{C183D7F6-B498-43B3-948B-1728B52AA6E4}">
-                <adec:decorative xmlns:adec="http://schemas.microsoft.com/office/drawing/2017/decorative" val="1"/>
+                <adec:decorative xmlns:adec="http://schemas.microsoft.com/office/drawing/2017/decorative" xmlns="" val="1"/>
               </a:ext>
             </a:extLst>
           </p:cNvPr>
@@ -10133,11 +10316,7 @@
             <a:spLocks noGrp="1" noRot="1" noChangeAspect="1" noMove="1" noResize="1" noEditPoints="1" noAdjustHandles="1" noChangeArrowheads="1" noChangeShapeType="1" noTextEdit="1"/>
           </p:cNvSpPr>
           <p:nvPr>
-            <p:extLst>
-              <p:ext uri="{386F3935-93C4-4BCD-93E2-E3B085C9AB24}">
-                <p16:designElem xmlns:p16="http://schemas.microsoft.com/office/powerpoint/2015/main" val="1"/>
-              </p:ext>
-            </p:extLst>
+            <p:extLst/>
           </p:nvPr>
         </p:nvSpPr>
         <p:spPr bwMode="ltGray">
@@ -10187,7 +10366,7 @@
           <p:cNvPr id="2" name="標題 1">
             <a:extLst>
               <a:ext uri="{FF2B5EF4-FFF2-40B4-BE49-F238E27FC236}">
-                <a16:creationId xmlns:a16="http://schemas.microsoft.com/office/drawing/2014/main" id="{A8197EAF-44F3-420E-89B1-08548C83367F}"/>
+                <a16:creationId xmlns:a16="http://schemas.microsoft.com/office/drawing/2014/main" xmlns="" id="{A8197EAF-44F3-420E-89B1-08548C83367F}"/>
               </a:ext>
             </a:extLst>
           </p:cNvPr>
@@ -10250,10 +10429,10 @@
           <p:cNvPr id="10" name="Straight Connector 9">
             <a:extLst>
               <a:ext uri="{FF2B5EF4-FFF2-40B4-BE49-F238E27FC236}">
-                <a16:creationId xmlns:a16="http://schemas.microsoft.com/office/drawing/2014/main" id="{2D72A2C9-F3CA-4216-8BAD-FA4C970C3C4E}"/>
+                <a16:creationId xmlns:a16="http://schemas.microsoft.com/office/drawing/2014/main" xmlns="" id="{2D72A2C9-F3CA-4216-8BAD-FA4C970C3C4E}"/>
               </a:ext>
               <a:ext uri="{C183D7F6-B498-43B3-948B-1728B52AA6E4}">
-                <adec:decorative xmlns:adec="http://schemas.microsoft.com/office/drawing/2017/decorative" val="1"/>
+                <adec:decorative xmlns:adec="http://schemas.microsoft.com/office/drawing/2017/decorative" xmlns="" val="1"/>
               </a:ext>
             </a:extLst>
           </p:cNvPr>
@@ -10261,11 +10440,7 @@
             <a:cxnSpLocks noGrp="1" noRot="1" noChangeAspect="1" noMove="1" noResize="1" noEditPoints="1" noAdjustHandles="1" noChangeArrowheads="1" noChangeShapeType="1"/>
           </p:cNvCxnSpPr>
           <p:nvPr>
-            <p:extLst>
-              <p:ext uri="{386F3935-93C4-4BCD-93E2-E3B085C9AB24}">
-                <p16:designElem xmlns:p16="http://schemas.microsoft.com/office/powerpoint/2015/main" val="1"/>
-              </p:ext>
-            </p:extLst>
+            <p:extLst/>
           </p:nvPr>
         </p:nvCxnSpPr>
         <p:spPr>
@@ -10305,7 +10480,7 @@
           <p:cNvPr id="3" name="內容版面配置區 2">
             <a:extLst>
               <a:ext uri="{FF2B5EF4-FFF2-40B4-BE49-F238E27FC236}">
-                <a16:creationId xmlns:a16="http://schemas.microsoft.com/office/drawing/2014/main" id="{B5C04CA7-E7CD-4F1B-998D-D964268E3599}"/>
+                <a16:creationId xmlns:a16="http://schemas.microsoft.com/office/drawing/2014/main" xmlns="" id="{B5C04CA7-E7CD-4F1B-998D-D964268E3599}"/>
               </a:ext>
             </a:extLst>
           </p:cNvPr>
@@ -10435,20 +10610,19 @@
   <p:clrMapOvr>
     <a:masterClrMapping/>
   </p:clrMapOvr>
+  <p:timing>
+    <p:tnLst>
+      <p:par>
+        <p:cTn id="1" dur="indefinite" restart="never" nodeType="tmRoot"/>
+      </p:par>
+    </p:tnLst>
+  </p:timing>
 </p:sld>
 </file>
 
-<file path=ppt/slides/slide22.xml><?xml version="1.0" encoding="utf-8"?>
+<file path=ppt/slides/slide23.xml><?xml version="1.0" encoding="utf-8"?>
 <p:sld xmlns:a="http://schemas.openxmlformats.org/drawingml/2006/main" xmlns:r="http://schemas.openxmlformats.org/officeDocument/2006/relationships" xmlns:p="http://schemas.openxmlformats.org/presentationml/2006/main">
   <p:cSld>
-    <p:bg>
-      <p:bgPr>
-        <a:solidFill>
-          <a:schemeClr val="bg1"/>
-        </a:solidFill>
-        <a:effectLst/>
-      </p:bgPr>
-    </p:bg>
     <p:spTree>
       <p:nvGrpSpPr>
         <p:cNvPr id="1" name=""/>
@@ -10468,10 +10642,10 @@
           <p:cNvPr id="8" name="Rectangle 7">
             <a:extLst>
               <a:ext uri="{FF2B5EF4-FFF2-40B4-BE49-F238E27FC236}">
-                <a16:creationId xmlns:a16="http://schemas.microsoft.com/office/drawing/2014/main" id="{23962611-DFD5-4092-AAFD-559E3DFCE2C9}"/>
+                <a16:creationId xmlns:a16="http://schemas.microsoft.com/office/drawing/2014/main" xmlns="" id="{23962611-DFD5-4092-AAFD-559E3DFCE2C9}"/>
               </a:ext>
               <a:ext uri="{C183D7F6-B498-43B3-948B-1728B52AA6E4}">
-                <adec:decorative xmlns:adec="http://schemas.microsoft.com/office/drawing/2017/decorative" val="1"/>
+                <adec:decorative xmlns:adec="http://schemas.microsoft.com/office/drawing/2017/decorative" xmlns="" val="1"/>
               </a:ext>
             </a:extLst>
           </p:cNvPr>
@@ -10479,11 +10653,7 @@
             <a:spLocks noGrp="1" noRot="1" noChangeAspect="1" noMove="1" noResize="1" noEditPoints="1" noAdjustHandles="1" noChangeArrowheads="1" noChangeShapeType="1" noTextEdit="1"/>
           </p:cNvSpPr>
           <p:nvPr>
-            <p:extLst>
-              <p:ext uri="{386F3935-93C4-4BCD-93E2-E3B085C9AB24}">
-                <p16:designElem xmlns:p16="http://schemas.microsoft.com/office/powerpoint/2015/main" val="1"/>
-              </p:ext>
-            </p:extLst>
+            <p:extLst/>
           </p:nvPr>
         </p:nvSpPr>
         <p:spPr>
@@ -10553,10 +10723,10 @@
           <p:cNvPr id="10" name="Picture 9">
             <a:extLst>
               <a:ext uri="{FF2B5EF4-FFF2-40B4-BE49-F238E27FC236}">
-                <a16:creationId xmlns:a16="http://schemas.microsoft.com/office/drawing/2014/main" id="{2270F1FA-0425-408F-9861-80BF5AFB276D}"/>
+                <a16:creationId xmlns:a16="http://schemas.microsoft.com/office/drawing/2014/main" xmlns="" id="{2270F1FA-0425-408F-9861-80BF5AFB276D}"/>
               </a:ext>
               <a:ext uri="{C183D7F6-B498-43B3-948B-1728B52AA6E4}">
-                <adec:decorative xmlns:adec="http://schemas.microsoft.com/office/drawing/2017/decorative" val="1"/>
+                <adec:decorative xmlns:adec="http://schemas.microsoft.com/office/drawing/2017/decorative" xmlns="" val="1"/>
               </a:ext>
             </a:extLst>
           </p:cNvPr>
@@ -10564,11 +10734,7 @@
             <a:picLocks noGrp="1" noRot="1" noChangeAspect="1" noMove="1" noResize="1" noEditPoints="1" noAdjustHandles="1" noChangeArrowheads="1" noChangeShapeType="1" noCrop="1"/>
           </p:cNvPicPr>
           <p:nvPr>
-            <p:extLst>
-              <p:ext uri="{386F3935-93C4-4BCD-93E2-E3B085C9AB24}">
-                <p16:designElem xmlns:p16="http://schemas.microsoft.com/office/powerpoint/2015/main" val="1"/>
-              </p:ext>
-            </p:extLst>
+            <p:extLst/>
           </p:nvPr>
         </p:nvPicPr>
         <p:blipFill>
@@ -10598,7 +10764,7 @@
           <p:cNvPr id="2" name="標題 1">
             <a:extLst>
               <a:ext uri="{FF2B5EF4-FFF2-40B4-BE49-F238E27FC236}">
-                <a16:creationId xmlns:a16="http://schemas.microsoft.com/office/drawing/2014/main" id="{C28F0AE9-AEFD-4A31-9362-E8865C193865}"/>
+                <a16:creationId xmlns:a16="http://schemas.microsoft.com/office/drawing/2014/main" xmlns="" id="{C28F0AE9-AEFD-4A31-9362-E8865C193865}"/>
               </a:ext>
             </a:extLst>
           </p:cNvPr>
@@ -10652,20 +10818,19 @@
   <p:clrMapOvr>
     <a:masterClrMapping/>
   </p:clrMapOvr>
+  <p:timing>
+    <p:tnLst>
+      <p:par>
+        <p:cTn id="1" dur="indefinite" restart="never" nodeType="tmRoot"/>
+      </p:par>
+    </p:tnLst>
+  </p:timing>
 </p:sld>
 </file>
 
 <file path=ppt/slides/slide3.xml><?xml version="1.0" encoding="utf-8"?>
 <p:sld xmlns:a="http://schemas.openxmlformats.org/drawingml/2006/main" xmlns:r="http://schemas.openxmlformats.org/officeDocument/2006/relationships" xmlns:p="http://schemas.openxmlformats.org/presentationml/2006/main">
   <p:cSld>
-    <p:bg>
-      <p:bgPr>
-        <a:solidFill>
-          <a:schemeClr val="bg1"/>
-        </a:solidFill>
-        <a:effectLst/>
-      </p:bgPr>
-    </p:bg>
     <p:spTree>
       <p:nvGrpSpPr>
         <p:cNvPr id="1" name=""/>
@@ -10685,10 +10850,10 @@
           <p:cNvPr id="22" name="Rectangle 21">
             <a:extLst>
               <a:ext uri="{FF2B5EF4-FFF2-40B4-BE49-F238E27FC236}">
-                <a16:creationId xmlns:a16="http://schemas.microsoft.com/office/drawing/2014/main" id="{3B854194-185D-494D-905C-7C7CB2E30F6E}"/>
+                <a16:creationId xmlns:a16="http://schemas.microsoft.com/office/drawing/2014/main" xmlns="" id="{3B854194-185D-494D-905C-7C7CB2E30F6E}"/>
               </a:ext>
               <a:ext uri="{C183D7F6-B498-43B3-948B-1728B52AA6E4}">
-                <adec:decorative xmlns:adec="http://schemas.microsoft.com/office/drawing/2017/decorative" val="1"/>
+                <adec:decorative xmlns:adec="http://schemas.microsoft.com/office/drawing/2017/decorative" xmlns="" val="1"/>
               </a:ext>
             </a:extLst>
           </p:cNvPr>
@@ -10696,11 +10861,7 @@
             <a:spLocks noGrp="1" noRot="1" noChangeAspect="1" noMove="1" noResize="1" noEditPoints="1" noAdjustHandles="1" noChangeArrowheads="1" noChangeShapeType="1" noTextEdit="1"/>
           </p:cNvSpPr>
           <p:nvPr>
-            <p:extLst>
-              <p:ext uri="{386F3935-93C4-4BCD-93E2-E3B085C9AB24}">
-                <p16:designElem xmlns:p16="http://schemas.microsoft.com/office/powerpoint/2015/main" val="1"/>
-              </p:ext>
-            </p:extLst>
+            <p:extLst/>
           </p:nvPr>
         </p:nvSpPr>
         <p:spPr>
@@ -10745,10 +10906,10 @@
           <p:cNvPr id="24" name="Rectangle 23">
             <a:extLst>
               <a:ext uri="{FF2B5EF4-FFF2-40B4-BE49-F238E27FC236}">
-                <a16:creationId xmlns:a16="http://schemas.microsoft.com/office/drawing/2014/main" id="{B4F5FA0D-0104-4987-8241-EFF7C85B88DE}"/>
+                <a16:creationId xmlns:a16="http://schemas.microsoft.com/office/drawing/2014/main" xmlns="" id="{B4F5FA0D-0104-4987-8241-EFF7C85B88DE}"/>
               </a:ext>
               <a:ext uri="{C183D7F6-B498-43B3-948B-1728B52AA6E4}">
-                <adec:decorative xmlns:adec="http://schemas.microsoft.com/office/drawing/2017/decorative" val="1"/>
+                <adec:decorative xmlns:adec="http://schemas.microsoft.com/office/drawing/2017/decorative" xmlns="" val="1"/>
               </a:ext>
             </a:extLst>
           </p:cNvPr>
@@ -10756,11 +10917,7 @@
             <a:spLocks noGrp="1" noRot="1" noChangeAspect="1" noMove="1" noResize="1" noEditPoints="1" noAdjustHandles="1" noChangeArrowheads="1" noChangeShapeType="1" noTextEdit="1"/>
           </p:cNvSpPr>
           <p:nvPr>
-            <p:extLst>
-              <p:ext uri="{386F3935-93C4-4BCD-93E2-E3B085C9AB24}">
-                <p16:designElem xmlns:p16="http://schemas.microsoft.com/office/powerpoint/2015/main" val="1"/>
-              </p:ext>
-            </p:extLst>
+            <p:extLst/>
           </p:nvPr>
         </p:nvSpPr>
         <p:spPr>
@@ -10830,10 +10987,10 @@
           <p:cNvPr id="26" name="Picture 25">
             <a:extLst>
               <a:ext uri="{FF2B5EF4-FFF2-40B4-BE49-F238E27FC236}">
-                <a16:creationId xmlns:a16="http://schemas.microsoft.com/office/drawing/2014/main" id="{2897127E-6CEF-446C-BE87-93B7C46E49D1}"/>
+                <a16:creationId xmlns:a16="http://schemas.microsoft.com/office/drawing/2014/main" xmlns="" id="{2897127E-6CEF-446C-BE87-93B7C46E49D1}"/>
               </a:ext>
               <a:ext uri="{C183D7F6-B498-43B3-948B-1728B52AA6E4}">
-                <adec:decorative xmlns:adec="http://schemas.microsoft.com/office/drawing/2017/decorative" val="1"/>
+                <adec:decorative xmlns:adec="http://schemas.microsoft.com/office/drawing/2017/decorative" xmlns="" val="1"/>
               </a:ext>
             </a:extLst>
           </p:cNvPr>
@@ -10841,11 +10998,7 @@
             <a:picLocks noGrp="1" noRot="1" noChangeAspect="1" noMove="1" noResize="1" noEditPoints="1" noAdjustHandles="1" noChangeArrowheads="1" noChangeShapeType="1" noCrop="1"/>
           </p:cNvPicPr>
           <p:nvPr>
-            <p:extLst>
-              <p:ext uri="{386F3935-93C4-4BCD-93E2-E3B085C9AB24}">
-                <p16:designElem xmlns:p16="http://schemas.microsoft.com/office/powerpoint/2015/main" val="1"/>
-              </p:ext>
-            </p:extLst>
+            <p:extLst/>
           </p:nvPr>
         </p:nvPicPr>
         <p:blipFill>
@@ -10875,7 +11028,7 @@
           <p:cNvPr id="2" name="標題 1">
             <a:extLst>
               <a:ext uri="{FF2B5EF4-FFF2-40B4-BE49-F238E27FC236}">
-                <a16:creationId xmlns:a16="http://schemas.microsoft.com/office/drawing/2014/main" id="{46020B5F-FA0F-4EF4-B12D-2C85FD71EEEE}"/>
+                <a16:creationId xmlns:a16="http://schemas.microsoft.com/office/drawing/2014/main" xmlns="" id="{46020B5F-FA0F-4EF4-B12D-2C85FD71EEEE}"/>
               </a:ext>
             </a:extLst>
           </p:cNvPr>
@@ -10937,7 +11090,7 @@
           <p:cNvPr id="36" name="內容版面配置區 2">
             <a:extLst>
               <a:ext uri="{FF2B5EF4-FFF2-40B4-BE49-F238E27FC236}">
-                <a16:creationId xmlns:a16="http://schemas.microsoft.com/office/drawing/2014/main" id="{7CF294F2-D940-4851-BC06-DE7E042A9BC2}"/>
+                <a16:creationId xmlns:a16="http://schemas.microsoft.com/office/drawing/2014/main" xmlns="" id="{7CF294F2-D940-4851-BC06-DE7E042A9BC2}"/>
               </a:ext>
             </a:extLst>
           </p:cNvPr>
@@ -11110,20 +11263,19 @@
   <p:clrMapOvr>
     <a:masterClrMapping/>
   </p:clrMapOvr>
+  <p:timing>
+    <p:tnLst>
+      <p:par>
+        <p:cTn id="1" dur="indefinite" restart="never" nodeType="tmRoot"/>
+      </p:par>
+    </p:tnLst>
+  </p:timing>
 </p:sld>
 </file>
 
 <file path=ppt/slides/slide4.xml><?xml version="1.0" encoding="utf-8"?>
 <p:sld xmlns:a="http://schemas.openxmlformats.org/drawingml/2006/main" xmlns:r="http://schemas.openxmlformats.org/officeDocument/2006/relationships" xmlns:p="http://schemas.openxmlformats.org/presentationml/2006/main">
   <p:cSld>
-    <p:bg>
-      <p:bgPr>
-        <a:solidFill>
-          <a:schemeClr val="bg1"/>
-        </a:solidFill>
-        <a:effectLst/>
-      </p:bgPr>
-    </p:bg>
     <p:spTree>
       <p:nvGrpSpPr>
         <p:cNvPr id="1" name=""/>
@@ -11143,10 +11295,10 @@
           <p:cNvPr id="54" name="Rectangle 47">
             <a:extLst>
               <a:ext uri="{FF2B5EF4-FFF2-40B4-BE49-F238E27FC236}">
-                <a16:creationId xmlns:a16="http://schemas.microsoft.com/office/drawing/2014/main" id="{8D70B121-56F4-4848-B38B-182089D909FA}"/>
+                <a16:creationId xmlns:a16="http://schemas.microsoft.com/office/drawing/2014/main" xmlns="" id="{8D70B121-56F4-4848-B38B-182089D909FA}"/>
               </a:ext>
               <a:ext uri="{C183D7F6-B498-43B3-948B-1728B52AA6E4}">
-                <adec:decorative xmlns:adec="http://schemas.microsoft.com/office/drawing/2017/decorative" val="1"/>
+                <adec:decorative xmlns:adec="http://schemas.microsoft.com/office/drawing/2017/decorative" xmlns="" val="1"/>
               </a:ext>
             </a:extLst>
           </p:cNvPr>
@@ -11154,11 +11306,7 @@
             <a:spLocks noGrp="1" noRot="1" noChangeAspect="1" noMove="1" noResize="1" noEditPoints="1" noAdjustHandles="1" noChangeArrowheads="1" noChangeShapeType="1" noTextEdit="1"/>
           </p:cNvSpPr>
           <p:nvPr>
-            <p:extLst>
-              <p:ext uri="{386F3935-93C4-4BCD-93E2-E3B085C9AB24}">
-                <p16:designElem xmlns:p16="http://schemas.microsoft.com/office/powerpoint/2015/main" val="1"/>
-              </p:ext>
-            </p:extLst>
+            <p:extLst/>
           </p:nvPr>
         </p:nvSpPr>
         <p:spPr bwMode="ltGray">
@@ -11208,7 +11356,7 @@
           <p:cNvPr id="2" name="標題 1">
             <a:extLst>
               <a:ext uri="{FF2B5EF4-FFF2-40B4-BE49-F238E27FC236}">
-                <a16:creationId xmlns:a16="http://schemas.microsoft.com/office/drawing/2014/main" id="{F3D93FE0-786E-4453-9BE1-89ACFB046D31}"/>
+                <a16:creationId xmlns:a16="http://schemas.microsoft.com/office/drawing/2014/main" xmlns="" id="{F3D93FE0-786E-4453-9BE1-89ACFB046D31}"/>
               </a:ext>
             </a:extLst>
           </p:cNvPr>
@@ -11271,10 +11419,10 @@
           <p:cNvPr id="55" name="Straight Connector 49">
             <a:extLst>
               <a:ext uri="{FF2B5EF4-FFF2-40B4-BE49-F238E27FC236}">
-                <a16:creationId xmlns:a16="http://schemas.microsoft.com/office/drawing/2014/main" id="{2D72A2C9-F3CA-4216-8BAD-FA4C970C3C4E}"/>
+                <a16:creationId xmlns:a16="http://schemas.microsoft.com/office/drawing/2014/main" xmlns="" id="{2D72A2C9-F3CA-4216-8BAD-FA4C970C3C4E}"/>
               </a:ext>
               <a:ext uri="{C183D7F6-B498-43B3-948B-1728B52AA6E4}">
-                <adec:decorative xmlns:adec="http://schemas.microsoft.com/office/drawing/2017/decorative" val="1"/>
+                <adec:decorative xmlns:adec="http://schemas.microsoft.com/office/drawing/2017/decorative" xmlns="" val="1"/>
               </a:ext>
             </a:extLst>
           </p:cNvPr>
@@ -11282,11 +11430,7 @@
             <a:cxnSpLocks noGrp="1" noRot="1" noChangeAspect="1" noMove="1" noResize="1" noEditPoints="1" noAdjustHandles="1" noChangeArrowheads="1" noChangeShapeType="1"/>
           </p:cNvCxnSpPr>
           <p:nvPr>
-            <p:extLst>
-              <p:ext uri="{386F3935-93C4-4BCD-93E2-E3B085C9AB24}">
-                <p16:designElem xmlns:p16="http://schemas.microsoft.com/office/powerpoint/2015/main" val="1"/>
-              </p:ext>
-            </p:extLst>
+            <p:extLst/>
           </p:nvPr>
         </p:nvCxnSpPr>
         <p:spPr>
@@ -11326,7 +11470,7 @@
           <p:cNvPr id="43" name="內容版面配置區 2">
             <a:extLst>
               <a:ext uri="{FF2B5EF4-FFF2-40B4-BE49-F238E27FC236}">
-                <a16:creationId xmlns:a16="http://schemas.microsoft.com/office/drawing/2014/main" id="{E42CC79C-1B08-41BA-8771-2CF2FE412B6E}"/>
+                <a16:creationId xmlns:a16="http://schemas.microsoft.com/office/drawing/2014/main" xmlns="" id="{E42CC79C-1B08-41BA-8771-2CF2FE412B6E}"/>
               </a:ext>
             </a:extLst>
           </p:cNvPr>
@@ -11373,20 +11517,19 @@
   <p:clrMapOvr>
     <a:masterClrMapping/>
   </p:clrMapOvr>
+  <p:timing>
+    <p:tnLst>
+      <p:par>
+        <p:cTn id="1" dur="indefinite" restart="never" nodeType="tmRoot"/>
+      </p:par>
+    </p:tnLst>
+  </p:timing>
 </p:sld>
 </file>
 
 <file path=ppt/slides/slide5.xml><?xml version="1.0" encoding="utf-8"?>
 <p:sld xmlns:a="http://schemas.openxmlformats.org/drawingml/2006/main" xmlns:r="http://schemas.openxmlformats.org/officeDocument/2006/relationships" xmlns:p="http://schemas.openxmlformats.org/presentationml/2006/main">
   <p:cSld>
-    <p:bg>
-      <p:bgPr>
-        <a:solidFill>
-          <a:schemeClr val="bg1"/>
-        </a:solidFill>
-        <a:effectLst/>
-      </p:bgPr>
-    </p:bg>
     <p:spTree>
       <p:nvGrpSpPr>
         <p:cNvPr id="1" name=""/>
@@ -11406,10 +11549,10 @@
           <p:cNvPr id="40" name="Rectangle 39">
             <a:extLst>
               <a:ext uri="{FF2B5EF4-FFF2-40B4-BE49-F238E27FC236}">
-                <a16:creationId xmlns:a16="http://schemas.microsoft.com/office/drawing/2014/main" id="{6753252F-4873-4F63-801D-CC719279A7D5}"/>
+                <a16:creationId xmlns:a16="http://schemas.microsoft.com/office/drawing/2014/main" xmlns="" id="{6753252F-4873-4F63-801D-CC719279A7D5}"/>
               </a:ext>
               <a:ext uri="{C183D7F6-B498-43B3-948B-1728B52AA6E4}">
-                <adec:decorative xmlns:adec="http://schemas.microsoft.com/office/drawing/2017/decorative" val="1"/>
+                <adec:decorative xmlns:adec="http://schemas.microsoft.com/office/drawing/2017/decorative" xmlns="" val="1"/>
               </a:ext>
             </a:extLst>
           </p:cNvPr>
@@ -11417,11 +11560,7 @@
             <a:spLocks noGrp="1" noRot="1" noChangeAspect="1" noMove="1" noResize="1" noEditPoints="1" noAdjustHandles="1" noChangeArrowheads="1" noChangeShapeType="1" noTextEdit="1"/>
           </p:cNvSpPr>
           <p:nvPr>
-            <p:extLst>
-              <p:ext uri="{386F3935-93C4-4BCD-93E2-E3B085C9AB24}">
-                <p16:designElem xmlns:p16="http://schemas.microsoft.com/office/powerpoint/2015/main" val="1"/>
-              </p:ext>
-            </p:extLst>
+            <p:extLst/>
           </p:nvPr>
         </p:nvSpPr>
         <p:spPr>
@@ -11469,10 +11608,10 @@
           <p:cNvPr id="42" name="Rectangle 41">
             <a:extLst>
               <a:ext uri="{FF2B5EF4-FFF2-40B4-BE49-F238E27FC236}">
-                <a16:creationId xmlns:a16="http://schemas.microsoft.com/office/drawing/2014/main" id="{047C8CCB-F95D-4249-92DD-651249D3535A}"/>
+                <a16:creationId xmlns:a16="http://schemas.microsoft.com/office/drawing/2014/main" xmlns="" id="{047C8CCB-F95D-4249-92DD-651249D3535A}"/>
               </a:ext>
               <a:ext uri="{C183D7F6-B498-43B3-948B-1728B52AA6E4}">
-                <adec:decorative xmlns:adec="http://schemas.microsoft.com/office/drawing/2017/decorative" val="1"/>
+                <adec:decorative xmlns:adec="http://schemas.microsoft.com/office/drawing/2017/decorative" xmlns="" val="1"/>
               </a:ext>
             </a:extLst>
           </p:cNvPr>
@@ -11480,11 +11619,7 @@
             <a:spLocks noGrp="1" noRot="1" noChangeAspect="1" noMove="1" noResize="1" noEditPoints="1" noAdjustHandles="1" noChangeArrowheads="1" noChangeShapeType="1" noTextEdit="1"/>
           </p:cNvSpPr>
           <p:nvPr>
-            <p:extLst>
-              <p:ext uri="{386F3935-93C4-4BCD-93E2-E3B085C9AB24}">
-                <p16:designElem xmlns:p16="http://schemas.microsoft.com/office/powerpoint/2015/main" val="1"/>
-              </p:ext>
-            </p:extLst>
+            <p:extLst/>
           </p:nvPr>
         </p:nvSpPr>
         <p:spPr>
@@ -11532,7 +11667,7 @@
           <p:cNvPr id="2" name="標題 1">
             <a:extLst>
               <a:ext uri="{FF2B5EF4-FFF2-40B4-BE49-F238E27FC236}">
-                <a16:creationId xmlns:a16="http://schemas.microsoft.com/office/drawing/2014/main" id="{78F66B1F-C7B0-402E-96FA-99ECF4BD8B33}"/>
+                <a16:creationId xmlns:a16="http://schemas.microsoft.com/office/drawing/2014/main" xmlns="" id="{78F66B1F-C7B0-402E-96FA-99ECF4BD8B33}"/>
               </a:ext>
             </a:extLst>
           </p:cNvPr>
@@ -11592,7 +11727,7 @@
           <p:cNvPr id="5" name="內容版面配置區 4" descr="一張含有 文字, 地圖 的圖片&#10;&#10;自動產生的描述">
             <a:extLst>
               <a:ext uri="{FF2B5EF4-FFF2-40B4-BE49-F238E27FC236}">
-                <a16:creationId xmlns:a16="http://schemas.microsoft.com/office/drawing/2014/main" id="{CE3D4B00-65A2-4E43-92D6-A5D509910394}"/>
+                <a16:creationId xmlns:a16="http://schemas.microsoft.com/office/drawing/2014/main" xmlns="" id="{CE3D4B00-65A2-4E43-92D6-A5D509910394}"/>
               </a:ext>
             </a:extLst>
           </p:cNvPr>
@@ -11635,20 +11770,19 @@
   <p:clrMapOvr>
     <a:masterClrMapping/>
   </p:clrMapOvr>
+  <p:timing>
+    <p:tnLst>
+      <p:par>
+        <p:cTn id="1" dur="indefinite" restart="never" nodeType="tmRoot"/>
+      </p:par>
+    </p:tnLst>
+  </p:timing>
 </p:sld>
 </file>
 
 <file path=ppt/slides/slide6.xml><?xml version="1.0" encoding="utf-8"?>
 <p:sld xmlns:a="http://schemas.openxmlformats.org/drawingml/2006/main" xmlns:r="http://schemas.openxmlformats.org/officeDocument/2006/relationships" xmlns:p="http://schemas.openxmlformats.org/presentationml/2006/main">
   <p:cSld>
-    <p:bg>
-      <p:bgPr>
-        <a:solidFill>
-          <a:schemeClr val="bg1"/>
-        </a:solidFill>
-        <a:effectLst/>
-      </p:bgPr>
-    </p:bg>
     <p:spTree>
       <p:nvGrpSpPr>
         <p:cNvPr id="1" name=""/>
@@ -11668,10 +11802,10 @@
           <p:cNvPr id="26" name="Rectangle 25">
             <a:extLst>
               <a:ext uri="{FF2B5EF4-FFF2-40B4-BE49-F238E27FC236}">
-                <a16:creationId xmlns:a16="http://schemas.microsoft.com/office/drawing/2014/main" id="{6D24BC9E-AC6A-42EE-AFD8-B290720B841F}"/>
+                <a16:creationId xmlns:a16="http://schemas.microsoft.com/office/drawing/2014/main" xmlns="" id="{6D24BC9E-AC6A-42EE-AFD8-B290720B841F}"/>
               </a:ext>
               <a:ext uri="{C183D7F6-B498-43B3-948B-1728B52AA6E4}">
-                <adec:decorative xmlns:adec="http://schemas.microsoft.com/office/drawing/2017/decorative" val="1"/>
+                <adec:decorative xmlns:adec="http://schemas.microsoft.com/office/drawing/2017/decorative" xmlns="" val="1"/>
               </a:ext>
             </a:extLst>
           </p:cNvPr>
@@ -11679,11 +11813,7 @@
             <a:spLocks noGrp="1" noRot="1" noChangeAspect="1" noMove="1" noResize="1" noEditPoints="1" noAdjustHandles="1" noChangeArrowheads="1" noChangeShapeType="1" noTextEdit="1"/>
           </p:cNvSpPr>
           <p:nvPr>
-            <p:extLst>
-              <p:ext uri="{386F3935-93C4-4BCD-93E2-E3B085C9AB24}">
-                <p16:designElem xmlns:p16="http://schemas.microsoft.com/office/powerpoint/2015/main" val="1"/>
-              </p:ext>
-            </p:extLst>
+            <p:extLst/>
           </p:nvPr>
         </p:nvSpPr>
         <p:spPr>
@@ -11728,10 +11858,10 @@
           <p:cNvPr id="28" name="Rectangle 27">
             <a:extLst>
               <a:ext uri="{FF2B5EF4-FFF2-40B4-BE49-F238E27FC236}">
-                <a16:creationId xmlns:a16="http://schemas.microsoft.com/office/drawing/2014/main" id="{0990C621-3B8B-4820-8328-D47EF7CE823C}"/>
+                <a16:creationId xmlns:a16="http://schemas.microsoft.com/office/drawing/2014/main" xmlns="" id="{0990C621-3B8B-4820-8328-D47EF7CE823C}"/>
               </a:ext>
               <a:ext uri="{C183D7F6-B498-43B3-948B-1728B52AA6E4}">
-                <adec:decorative xmlns:adec="http://schemas.microsoft.com/office/drawing/2017/decorative" val="1"/>
+                <adec:decorative xmlns:adec="http://schemas.microsoft.com/office/drawing/2017/decorative" xmlns="" val="1"/>
               </a:ext>
             </a:extLst>
           </p:cNvPr>
@@ -11739,11 +11869,7 @@
             <a:spLocks noGrp="1" noRot="1" noChangeAspect="1" noMove="1" noResize="1" noEditPoints="1" noAdjustHandles="1" noChangeArrowheads="1" noChangeShapeType="1" noTextEdit="1"/>
           </p:cNvSpPr>
           <p:nvPr>
-            <p:extLst>
-              <p:ext uri="{386F3935-93C4-4BCD-93E2-E3B085C9AB24}">
-                <p16:designElem xmlns:p16="http://schemas.microsoft.com/office/powerpoint/2015/main" val="1"/>
-              </p:ext>
-            </p:extLst>
+            <p:extLst/>
           </p:nvPr>
         </p:nvSpPr>
         <p:spPr>
@@ -11827,7 +11953,7 @@
           <p:cNvPr id="2" name="標題 1">
             <a:extLst>
               <a:ext uri="{FF2B5EF4-FFF2-40B4-BE49-F238E27FC236}">
-                <a16:creationId xmlns:a16="http://schemas.microsoft.com/office/drawing/2014/main" id="{8A83B1EE-3B8B-4FB0-8791-5E2039991A6C}"/>
+                <a16:creationId xmlns:a16="http://schemas.microsoft.com/office/drawing/2014/main" xmlns="" id="{8A83B1EE-3B8B-4FB0-8791-5E2039991A6C}"/>
               </a:ext>
             </a:extLst>
           </p:cNvPr>
@@ -11867,6 +11993,14 @@
               </a:rPr>
               <a:t>PV Model                                 </a:t>
             </a:r>
+            <a:r>
+              <a:rPr lang="en-US" altLang="zh-CN" sz="3200" kern="1200" dirty="0">
+                <a:latin typeface="+mj-lt"/>
+                <a:ea typeface="+mj-ea"/>
+                <a:cs typeface="+mj-cs"/>
+              </a:rPr>
+              <a:t/>
+            </a:r>
             <a:br>
               <a:rPr lang="en-US" altLang="zh-CN" sz="3200" kern="1200" dirty="0">
                 <a:latin typeface="+mj-lt"/>
@@ -11887,7 +12021,7 @@
           <p:cNvPr id="6" name="內容版面配置區 4">
             <a:extLst>
               <a:ext uri="{FF2B5EF4-FFF2-40B4-BE49-F238E27FC236}">
-                <a16:creationId xmlns:a16="http://schemas.microsoft.com/office/drawing/2014/main" id="{B95D590D-A740-4A27-85C7-1B30F5815409}"/>
+                <a16:creationId xmlns:a16="http://schemas.microsoft.com/office/drawing/2014/main" xmlns="" id="{B95D590D-A740-4A27-85C7-1B30F5815409}"/>
               </a:ext>
             </a:extLst>
           </p:cNvPr>
@@ -11923,7 +12057,7 @@
           <p:cNvPr id="5" name="內容版面配置區 4">
             <a:extLst>
               <a:ext uri="{FF2B5EF4-FFF2-40B4-BE49-F238E27FC236}">
-                <a16:creationId xmlns:a16="http://schemas.microsoft.com/office/drawing/2014/main" id="{42E1BAF7-84DC-490D-86B8-7D7D9086747C}"/>
+                <a16:creationId xmlns:a16="http://schemas.microsoft.com/office/drawing/2014/main" xmlns="" id="{42E1BAF7-84DC-490D-86B8-7D7D9086747C}"/>
               </a:ext>
             </a:extLst>
           </p:cNvPr>
@@ -11959,10 +12093,10 @@
           <p:cNvPr id="30" name="Rectangle 29">
             <a:extLst>
               <a:ext uri="{FF2B5EF4-FFF2-40B4-BE49-F238E27FC236}">
-                <a16:creationId xmlns:a16="http://schemas.microsoft.com/office/drawing/2014/main" id="{C1A2385B-1D2A-4E17-84FA-6CB7F0AAE473}"/>
+                <a16:creationId xmlns:a16="http://schemas.microsoft.com/office/drawing/2014/main" xmlns="" id="{C1A2385B-1D2A-4E17-84FA-6CB7F0AAE473}"/>
               </a:ext>
               <a:ext uri="{C183D7F6-B498-43B3-948B-1728B52AA6E4}">
-                <adec:decorative xmlns:adec="http://schemas.microsoft.com/office/drawing/2017/decorative" val="1"/>
+                <adec:decorative xmlns:adec="http://schemas.microsoft.com/office/drawing/2017/decorative" xmlns="" val="1"/>
               </a:ext>
             </a:extLst>
           </p:cNvPr>
@@ -11970,11 +12104,7 @@
             <a:spLocks noGrp="1" noRot="1" noChangeAspect="1" noMove="1" noResize="1" noEditPoints="1" noAdjustHandles="1" noChangeArrowheads="1" noChangeShapeType="1" noTextEdit="1"/>
           </p:cNvSpPr>
           <p:nvPr>
-            <p:extLst>
-              <p:ext uri="{386F3935-93C4-4BCD-93E2-E3B085C9AB24}">
-                <p16:designElem xmlns:p16="http://schemas.microsoft.com/office/powerpoint/2015/main" val="1"/>
-              </p:ext>
-            </p:extLst>
+            <p:extLst/>
           </p:nvPr>
         </p:nvSpPr>
         <p:spPr>
@@ -12027,10 +12157,10 @@
           <p:cNvPr id="32" name="Rectangle 31">
             <a:extLst>
               <a:ext uri="{FF2B5EF4-FFF2-40B4-BE49-F238E27FC236}">
-                <a16:creationId xmlns:a16="http://schemas.microsoft.com/office/drawing/2014/main" id="{5E791F2F-79DB-4CC0-9FA1-001E3E91E8B7}"/>
+                <a16:creationId xmlns:a16="http://schemas.microsoft.com/office/drawing/2014/main" xmlns="" id="{5E791F2F-79DB-4CC0-9FA1-001E3E91E8B7}"/>
               </a:ext>
               <a:ext uri="{C183D7F6-B498-43B3-948B-1728B52AA6E4}">
-                <adec:decorative xmlns:adec="http://schemas.microsoft.com/office/drawing/2017/decorative" val="1"/>
+                <adec:decorative xmlns:adec="http://schemas.microsoft.com/office/drawing/2017/decorative" xmlns="" val="1"/>
               </a:ext>
             </a:extLst>
           </p:cNvPr>
@@ -12038,11 +12168,7 @@
             <a:spLocks noGrp="1" noRot="1" noChangeAspect="1" noMove="1" noResize="1" noEditPoints="1" noAdjustHandles="1" noChangeArrowheads="1" noChangeShapeType="1" noTextEdit="1"/>
           </p:cNvSpPr>
           <p:nvPr>
-            <p:extLst>
-              <p:ext uri="{386F3935-93C4-4BCD-93E2-E3B085C9AB24}">
-                <p16:designElem xmlns:p16="http://schemas.microsoft.com/office/powerpoint/2015/main" val="1"/>
-              </p:ext>
-            </p:extLst>
+            <p:extLst/>
           </p:nvPr>
         </p:nvSpPr>
         <p:spPr>
@@ -12120,7 +12246,7 @@
           <p:cNvPr id="23" name="Content Placeholder 22">
             <a:extLst>
               <a:ext uri="{FF2B5EF4-FFF2-40B4-BE49-F238E27FC236}">
-                <a16:creationId xmlns:a16="http://schemas.microsoft.com/office/drawing/2014/main" id="{CAF33733-716F-4A54-9F3E-E48A79D32D63}"/>
+                <a16:creationId xmlns:a16="http://schemas.microsoft.com/office/drawing/2014/main" xmlns="" id="{CAF33733-716F-4A54-9F3E-E48A79D32D63}"/>
               </a:ext>
             </a:extLst>
           </p:cNvPr>
@@ -12182,20 +12308,19 @@
   <p:clrMapOvr>
     <a:masterClrMapping/>
   </p:clrMapOvr>
+  <p:timing>
+    <p:tnLst>
+      <p:par>
+        <p:cTn id="1" dur="indefinite" restart="never" nodeType="tmRoot"/>
+      </p:par>
+    </p:tnLst>
+  </p:timing>
 </p:sld>
 </file>
 
 <file path=ppt/slides/slide7.xml><?xml version="1.0" encoding="utf-8"?>
 <p:sld xmlns:a="http://schemas.openxmlformats.org/drawingml/2006/main" xmlns:r="http://schemas.openxmlformats.org/officeDocument/2006/relationships" xmlns:p="http://schemas.openxmlformats.org/presentationml/2006/main">
   <p:cSld>
-    <p:bg>
-      <p:bgPr>
-        <a:solidFill>
-          <a:schemeClr val="bg1"/>
-        </a:solidFill>
-        <a:effectLst/>
-      </p:bgPr>
-    </p:bg>
     <p:spTree>
       <p:nvGrpSpPr>
         <p:cNvPr id="1" name=""/>
@@ -12215,10 +12340,10 @@
           <p:cNvPr id="33" name="Rectangle 32">
             <a:extLst>
               <a:ext uri="{FF2B5EF4-FFF2-40B4-BE49-F238E27FC236}">
-                <a16:creationId xmlns:a16="http://schemas.microsoft.com/office/drawing/2014/main" id="{6D24BC9E-AC6A-42EE-AFD8-B290720B841F}"/>
+                <a16:creationId xmlns:a16="http://schemas.microsoft.com/office/drawing/2014/main" xmlns="" id="{6D24BC9E-AC6A-42EE-AFD8-B290720B841F}"/>
               </a:ext>
               <a:ext uri="{C183D7F6-B498-43B3-948B-1728B52AA6E4}">
-                <adec:decorative xmlns:adec="http://schemas.microsoft.com/office/drawing/2017/decorative" val="1"/>
+                <adec:decorative xmlns:adec="http://schemas.microsoft.com/office/drawing/2017/decorative" xmlns="" val="1"/>
               </a:ext>
             </a:extLst>
           </p:cNvPr>
@@ -12226,11 +12351,7 @@
             <a:spLocks noGrp="1" noRot="1" noChangeAspect="1" noMove="1" noResize="1" noEditPoints="1" noAdjustHandles="1" noChangeArrowheads="1" noChangeShapeType="1" noTextEdit="1"/>
           </p:cNvSpPr>
           <p:nvPr>
-            <p:extLst>
-              <p:ext uri="{386F3935-93C4-4BCD-93E2-E3B085C9AB24}">
-                <p16:designElem xmlns:p16="http://schemas.microsoft.com/office/powerpoint/2015/main" val="1"/>
-              </p:ext>
-            </p:extLst>
+            <p:extLst/>
           </p:nvPr>
         </p:nvSpPr>
         <p:spPr>
@@ -12275,10 +12396,10 @@
           <p:cNvPr id="35" name="Rectangle 34">
             <a:extLst>
               <a:ext uri="{FF2B5EF4-FFF2-40B4-BE49-F238E27FC236}">
-                <a16:creationId xmlns:a16="http://schemas.microsoft.com/office/drawing/2014/main" id="{0990C621-3B8B-4820-8328-D47EF7CE823C}"/>
+                <a16:creationId xmlns:a16="http://schemas.microsoft.com/office/drawing/2014/main" xmlns="" id="{0990C621-3B8B-4820-8328-D47EF7CE823C}"/>
               </a:ext>
               <a:ext uri="{C183D7F6-B498-43B3-948B-1728B52AA6E4}">
-                <adec:decorative xmlns:adec="http://schemas.microsoft.com/office/drawing/2017/decorative" val="1"/>
+                <adec:decorative xmlns:adec="http://schemas.microsoft.com/office/drawing/2017/decorative" xmlns="" val="1"/>
               </a:ext>
             </a:extLst>
           </p:cNvPr>
@@ -12286,11 +12407,7 @@
             <a:spLocks noGrp="1" noRot="1" noChangeAspect="1" noMove="1" noResize="1" noEditPoints="1" noAdjustHandles="1" noChangeArrowheads="1" noChangeShapeType="1" noTextEdit="1"/>
           </p:cNvSpPr>
           <p:nvPr>
-            <p:extLst>
-              <p:ext uri="{386F3935-93C4-4BCD-93E2-E3B085C9AB24}">
-                <p16:designElem xmlns:p16="http://schemas.microsoft.com/office/powerpoint/2015/main" val="1"/>
-              </p:ext>
-            </p:extLst>
+            <p:extLst/>
           </p:nvPr>
         </p:nvSpPr>
         <p:spPr>
@@ -12374,7 +12491,7 @@
           <p:cNvPr id="2" name="標題 1">
             <a:extLst>
               <a:ext uri="{FF2B5EF4-FFF2-40B4-BE49-F238E27FC236}">
-                <a16:creationId xmlns:a16="http://schemas.microsoft.com/office/drawing/2014/main" id="{A12C27B1-14F4-4B1B-9B9F-FD7928EBD732}"/>
+                <a16:creationId xmlns:a16="http://schemas.microsoft.com/office/drawing/2014/main" xmlns="" id="{A12C27B1-14F4-4B1B-9B9F-FD7928EBD732}"/>
               </a:ext>
             </a:extLst>
           </p:cNvPr>
@@ -12422,7 +12539,7 @@
           <p:cNvPr id="5" name="內容版面配置區 4" descr="一張含有 文字 的圖片&#10;&#10;自動產生的描述">
             <a:extLst>
               <a:ext uri="{FF2B5EF4-FFF2-40B4-BE49-F238E27FC236}">
-                <a16:creationId xmlns:a16="http://schemas.microsoft.com/office/drawing/2014/main" id="{A8E86EF4-DAB5-4070-91A2-2284216FAE4B}"/>
+                <a16:creationId xmlns:a16="http://schemas.microsoft.com/office/drawing/2014/main" xmlns="" id="{A8E86EF4-DAB5-4070-91A2-2284216FAE4B}"/>
               </a:ext>
             </a:extLst>
           </p:cNvPr>
@@ -12458,7 +12575,7 @@
           <p:cNvPr id="6" name="內容版面配置區 4" descr="一張含有 文字 的圖片&#10;&#10;自動產生的描述">
             <a:extLst>
               <a:ext uri="{FF2B5EF4-FFF2-40B4-BE49-F238E27FC236}">
-                <a16:creationId xmlns:a16="http://schemas.microsoft.com/office/drawing/2014/main" id="{FB06B33A-7DFD-4C99-9408-5D560E3D7E52}"/>
+                <a16:creationId xmlns:a16="http://schemas.microsoft.com/office/drawing/2014/main" xmlns="" id="{FB06B33A-7DFD-4C99-9408-5D560E3D7E52}"/>
               </a:ext>
             </a:extLst>
           </p:cNvPr>
@@ -12494,10 +12611,10 @@
           <p:cNvPr id="37" name="Rectangle 36">
             <a:extLst>
               <a:ext uri="{FF2B5EF4-FFF2-40B4-BE49-F238E27FC236}">
-                <a16:creationId xmlns:a16="http://schemas.microsoft.com/office/drawing/2014/main" id="{C1A2385B-1D2A-4E17-84FA-6CB7F0AAE473}"/>
+                <a16:creationId xmlns:a16="http://schemas.microsoft.com/office/drawing/2014/main" xmlns="" id="{C1A2385B-1D2A-4E17-84FA-6CB7F0AAE473}"/>
               </a:ext>
               <a:ext uri="{C183D7F6-B498-43B3-948B-1728B52AA6E4}">
-                <adec:decorative xmlns:adec="http://schemas.microsoft.com/office/drawing/2017/decorative" val="1"/>
+                <adec:decorative xmlns:adec="http://schemas.microsoft.com/office/drawing/2017/decorative" xmlns="" val="1"/>
               </a:ext>
             </a:extLst>
           </p:cNvPr>
@@ -12505,11 +12622,7 @@
             <a:spLocks noGrp="1" noRot="1" noChangeAspect="1" noMove="1" noResize="1" noEditPoints="1" noAdjustHandles="1" noChangeArrowheads="1" noChangeShapeType="1" noTextEdit="1"/>
           </p:cNvSpPr>
           <p:nvPr>
-            <p:extLst>
-              <p:ext uri="{386F3935-93C4-4BCD-93E2-E3B085C9AB24}">
-                <p16:designElem xmlns:p16="http://schemas.microsoft.com/office/powerpoint/2015/main" val="1"/>
-              </p:ext>
-            </p:extLst>
+            <p:extLst/>
           </p:nvPr>
         </p:nvSpPr>
         <p:spPr>
@@ -12562,10 +12675,10 @@
           <p:cNvPr id="39" name="Rectangle 38">
             <a:extLst>
               <a:ext uri="{FF2B5EF4-FFF2-40B4-BE49-F238E27FC236}">
-                <a16:creationId xmlns:a16="http://schemas.microsoft.com/office/drawing/2014/main" id="{5E791F2F-79DB-4CC0-9FA1-001E3E91E8B7}"/>
+                <a16:creationId xmlns:a16="http://schemas.microsoft.com/office/drawing/2014/main" xmlns="" id="{5E791F2F-79DB-4CC0-9FA1-001E3E91E8B7}"/>
               </a:ext>
               <a:ext uri="{C183D7F6-B498-43B3-948B-1728B52AA6E4}">
-                <adec:decorative xmlns:adec="http://schemas.microsoft.com/office/drawing/2017/decorative" val="1"/>
+                <adec:decorative xmlns:adec="http://schemas.microsoft.com/office/drawing/2017/decorative" xmlns="" val="1"/>
               </a:ext>
             </a:extLst>
           </p:cNvPr>
@@ -12573,11 +12686,7 @@
             <a:spLocks noGrp="1" noRot="1" noChangeAspect="1" noMove="1" noResize="1" noEditPoints="1" noAdjustHandles="1" noChangeArrowheads="1" noChangeShapeType="1" noTextEdit="1"/>
           </p:cNvSpPr>
           <p:nvPr>
-            <p:extLst>
-              <p:ext uri="{386F3935-93C4-4BCD-93E2-E3B085C9AB24}">
-                <p16:designElem xmlns:p16="http://schemas.microsoft.com/office/powerpoint/2015/main" val="1"/>
-              </p:ext>
-            </p:extLst>
+            <p:extLst/>
           </p:nvPr>
         </p:nvSpPr>
         <p:spPr>
@@ -12655,7 +12764,7 @@
           <p:cNvPr id="30" name="Content Placeholder 29">
             <a:extLst>
               <a:ext uri="{FF2B5EF4-FFF2-40B4-BE49-F238E27FC236}">
-                <a16:creationId xmlns:a16="http://schemas.microsoft.com/office/drawing/2014/main" id="{2EBFBA92-EC53-4CFF-BD66-C79409CF4EB1}"/>
+                <a16:creationId xmlns:a16="http://schemas.microsoft.com/office/drawing/2014/main" xmlns="" id="{2EBFBA92-EC53-4CFF-BD66-C79409CF4EB1}"/>
               </a:ext>
             </a:extLst>
           </p:cNvPr>
@@ -12708,20 +12817,19 @@
   <p:clrMapOvr>
     <a:masterClrMapping/>
   </p:clrMapOvr>
+  <p:timing>
+    <p:tnLst>
+      <p:par>
+        <p:cTn id="1" dur="indefinite" restart="never" nodeType="tmRoot"/>
+      </p:par>
+    </p:tnLst>
+  </p:timing>
 </p:sld>
 </file>
 
 <file path=ppt/slides/slide8.xml><?xml version="1.0" encoding="utf-8"?>
 <p:sld xmlns:a="http://schemas.openxmlformats.org/drawingml/2006/main" xmlns:r="http://schemas.openxmlformats.org/officeDocument/2006/relationships" xmlns:p="http://schemas.openxmlformats.org/presentationml/2006/main">
   <p:cSld>
-    <p:bg>
-      <p:bgPr>
-        <a:solidFill>
-          <a:schemeClr val="bg1"/>
-        </a:solidFill>
-        <a:effectLst/>
-      </p:bgPr>
-    </p:bg>
     <p:spTree>
       <p:nvGrpSpPr>
         <p:cNvPr id="1" name=""/>
@@ -12741,10 +12849,10 @@
           <p:cNvPr id="26" name="Rectangle 25">
             <a:extLst>
               <a:ext uri="{FF2B5EF4-FFF2-40B4-BE49-F238E27FC236}">
-                <a16:creationId xmlns:a16="http://schemas.microsoft.com/office/drawing/2014/main" id="{6D24BC9E-AC6A-42EE-AFD8-B290720B841F}"/>
+                <a16:creationId xmlns:a16="http://schemas.microsoft.com/office/drawing/2014/main" xmlns="" id="{6D24BC9E-AC6A-42EE-AFD8-B290720B841F}"/>
               </a:ext>
               <a:ext uri="{C183D7F6-B498-43B3-948B-1728B52AA6E4}">
-                <adec:decorative xmlns:adec="http://schemas.microsoft.com/office/drawing/2017/decorative" val="1"/>
+                <adec:decorative xmlns:adec="http://schemas.microsoft.com/office/drawing/2017/decorative" xmlns="" val="1"/>
               </a:ext>
             </a:extLst>
           </p:cNvPr>
@@ -12752,11 +12860,7 @@
             <a:spLocks noGrp="1" noRot="1" noChangeAspect="1" noMove="1" noResize="1" noEditPoints="1" noAdjustHandles="1" noChangeArrowheads="1" noChangeShapeType="1" noTextEdit="1"/>
           </p:cNvSpPr>
           <p:nvPr>
-            <p:extLst>
-              <p:ext uri="{386F3935-93C4-4BCD-93E2-E3B085C9AB24}">
-                <p16:designElem xmlns:p16="http://schemas.microsoft.com/office/powerpoint/2015/main" val="1"/>
-              </p:ext>
-            </p:extLst>
+            <p:extLst/>
           </p:nvPr>
         </p:nvSpPr>
         <p:spPr>
@@ -12801,10 +12905,10 @@
           <p:cNvPr id="28" name="Rectangle 27">
             <a:extLst>
               <a:ext uri="{FF2B5EF4-FFF2-40B4-BE49-F238E27FC236}">
-                <a16:creationId xmlns:a16="http://schemas.microsoft.com/office/drawing/2014/main" id="{0990C621-3B8B-4820-8328-D47EF7CE823C}"/>
+                <a16:creationId xmlns:a16="http://schemas.microsoft.com/office/drawing/2014/main" xmlns="" id="{0990C621-3B8B-4820-8328-D47EF7CE823C}"/>
               </a:ext>
               <a:ext uri="{C183D7F6-B498-43B3-948B-1728B52AA6E4}">
-                <adec:decorative xmlns:adec="http://schemas.microsoft.com/office/drawing/2017/decorative" val="1"/>
+                <adec:decorative xmlns:adec="http://schemas.microsoft.com/office/drawing/2017/decorative" xmlns="" val="1"/>
               </a:ext>
             </a:extLst>
           </p:cNvPr>
@@ -12812,11 +12916,7 @@
             <a:spLocks noGrp="1" noRot="1" noChangeAspect="1" noMove="1" noResize="1" noEditPoints="1" noAdjustHandles="1" noChangeArrowheads="1" noChangeShapeType="1" noTextEdit="1"/>
           </p:cNvSpPr>
           <p:nvPr>
-            <p:extLst>
-              <p:ext uri="{386F3935-93C4-4BCD-93E2-E3B085C9AB24}">
-                <p16:designElem xmlns:p16="http://schemas.microsoft.com/office/powerpoint/2015/main" val="1"/>
-              </p:ext>
-            </p:extLst>
+            <p:extLst/>
           </p:nvPr>
         </p:nvSpPr>
         <p:spPr>
@@ -12900,7 +13000,7 @@
           <p:cNvPr id="2" name="標題 1">
             <a:extLst>
               <a:ext uri="{FF2B5EF4-FFF2-40B4-BE49-F238E27FC236}">
-                <a16:creationId xmlns:a16="http://schemas.microsoft.com/office/drawing/2014/main" id="{C05949B2-CD3A-41AE-A1C4-C954BDDCC522}"/>
+                <a16:creationId xmlns:a16="http://schemas.microsoft.com/office/drawing/2014/main" xmlns="" id="{C05949B2-CD3A-41AE-A1C4-C954BDDCC522}"/>
               </a:ext>
             </a:extLst>
           </p:cNvPr>
@@ -12948,7 +13048,7 @@
           <p:cNvPr id="5" name="內容版面配置區 4">
             <a:extLst>
               <a:ext uri="{FF2B5EF4-FFF2-40B4-BE49-F238E27FC236}">
-                <a16:creationId xmlns:a16="http://schemas.microsoft.com/office/drawing/2014/main" id="{7A2567E0-07DB-40A2-B96F-E9DB648565BA}"/>
+                <a16:creationId xmlns:a16="http://schemas.microsoft.com/office/drawing/2014/main" xmlns="" id="{7A2567E0-07DB-40A2-B96F-E9DB648565BA}"/>
               </a:ext>
             </a:extLst>
           </p:cNvPr>
@@ -12984,7 +13084,7 @@
           <p:cNvPr id="6" name="內容版面配置區 4" descr="一張含有 文字 的圖片&#10;&#10;自動產生的描述">
             <a:extLst>
               <a:ext uri="{FF2B5EF4-FFF2-40B4-BE49-F238E27FC236}">
-                <a16:creationId xmlns:a16="http://schemas.microsoft.com/office/drawing/2014/main" id="{7FF74522-9BAF-4A90-9087-99FE4D843805}"/>
+                <a16:creationId xmlns:a16="http://schemas.microsoft.com/office/drawing/2014/main" xmlns="" id="{7FF74522-9BAF-4A90-9087-99FE4D843805}"/>
               </a:ext>
             </a:extLst>
           </p:cNvPr>
@@ -13020,10 +13120,10 @@
           <p:cNvPr id="30" name="Rectangle 29">
             <a:extLst>
               <a:ext uri="{FF2B5EF4-FFF2-40B4-BE49-F238E27FC236}">
-                <a16:creationId xmlns:a16="http://schemas.microsoft.com/office/drawing/2014/main" id="{C1A2385B-1D2A-4E17-84FA-6CB7F0AAE473}"/>
+                <a16:creationId xmlns:a16="http://schemas.microsoft.com/office/drawing/2014/main" xmlns="" id="{C1A2385B-1D2A-4E17-84FA-6CB7F0AAE473}"/>
               </a:ext>
               <a:ext uri="{C183D7F6-B498-43B3-948B-1728B52AA6E4}">
-                <adec:decorative xmlns:adec="http://schemas.microsoft.com/office/drawing/2017/decorative" val="1"/>
+                <adec:decorative xmlns:adec="http://schemas.microsoft.com/office/drawing/2017/decorative" xmlns="" val="1"/>
               </a:ext>
             </a:extLst>
           </p:cNvPr>
@@ -13031,11 +13131,7 @@
             <a:spLocks noGrp="1" noRot="1" noChangeAspect="1" noMove="1" noResize="1" noEditPoints="1" noAdjustHandles="1" noChangeArrowheads="1" noChangeShapeType="1" noTextEdit="1"/>
           </p:cNvSpPr>
           <p:nvPr>
-            <p:extLst>
-              <p:ext uri="{386F3935-93C4-4BCD-93E2-E3B085C9AB24}">
-                <p16:designElem xmlns:p16="http://schemas.microsoft.com/office/powerpoint/2015/main" val="1"/>
-              </p:ext>
-            </p:extLst>
+            <p:extLst/>
           </p:nvPr>
         </p:nvSpPr>
         <p:spPr>
@@ -13088,10 +13184,10 @@
           <p:cNvPr id="32" name="Rectangle 31">
             <a:extLst>
               <a:ext uri="{FF2B5EF4-FFF2-40B4-BE49-F238E27FC236}">
-                <a16:creationId xmlns:a16="http://schemas.microsoft.com/office/drawing/2014/main" id="{5E791F2F-79DB-4CC0-9FA1-001E3E91E8B7}"/>
+                <a16:creationId xmlns:a16="http://schemas.microsoft.com/office/drawing/2014/main" xmlns="" id="{5E791F2F-79DB-4CC0-9FA1-001E3E91E8B7}"/>
               </a:ext>
               <a:ext uri="{C183D7F6-B498-43B3-948B-1728B52AA6E4}">
-                <adec:decorative xmlns:adec="http://schemas.microsoft.com/office/drawing/2017/decorative" val="1"/>
+                <adec:decorative xmlns:adec="http://schemas.microsoft.com/office/drawing/2017/decorative" xmlns="" val="1"/>
               </a:ext>
             </a:extLst>
           </p:cNvPr>
@@ -13099,11 +13195,7 @@
             <a:spLocks noGrp="1" noRot="1" noChangeAspect="1" noMove="1" noResize="1" noEditPoints="1" noAdjustHandles="1" noChangeArrowheads="1" noChangeShapeType="1" noTextEdit="1"/>
           </p:cNvSpPr>
           <p:nvPr>
-            <p:extLst>
-              <p:ext uri="{386F3935-93C4-4BCD-93E2-E3B085C9AB24}">
-                <p16:designElem xmlns:p16="http://schemas.microsoft.com/office/powerpoint/2015/main" val="1"/>
-              </p:ext>
-            </p:extLst>
+            <p:extLst/>
           </p:nvPr>
         </p:nvSpPr>
         <p:spPr>
@@ -13181,7 +13273,7 @@
           <p:cNvPr id="23" name="Content Placeholder 22">
             <a:extLst>
               <a:ext uri="{FF2B5EF4-FFF2-40B4-BE49-F238E27FC236}">
-                <a16:creationId xmlns:a16="http://schemas.microsoft.com/office/drawing/2014/main" id="{5FF3C444-50BE-4552-9128-4096E54F2A3E}"/>
+                <a16:creationId xmlns:a16="http://schemas.microsoft.com/office/drawing/2014/main" xmlns="" id="{5FF3C444-50BE-4552-9128-4096E54F2A3E}"/>
               </a:ext>
             </a:extLst>
           </p:cNvPr>
@@ -13234,20 +13326,19 @@
   <p:clrMapOvr>
     <a:masterClrMapping/>
   </p:clrMapOvr>
+  <p:timing>
+    <p:tnLst>
+      <p:par>
+        <p:cTn id="1" dur="indefinite" restart="never" nodeType="tmRoot"/>
+      </p:par>
+    </p:tnLst>
+  </p:timing>
 </p:sld>
 </file>
 
 <file path=ppt/slides/slide9.xml><?xml version="1.0" encoding="utf-8"?>
 <p:sld xmlns:a="http://schemas.openxmlformats.org/drawingml/2006/main" xmlns:r="http://schemas.openxmlformats.org/officeDocument/2006/relationships" xmlns:p="http://schemas.openxmlformats.org/presentationml/2006/main">
   <p:cSld>
-    <p:bg>
-      <p:bgPr>
-        <a:solidFill>
-          <a:schemeClr val="bg1"/>
-        </a:solidFill>
-        <a:effectLst/>
-      </p:bgPr>
-    </p:bg>
     <p:spTree>
       <p:nvGrpSpPr>
         <p:cNvPr id="1" name=""/>
@@ -13267,10 +13358,10 @@
           <p:cNvPr id="26" name="Rectangle 25">
             <a:extLst>
               <a:ext uri="{FF2B5EF4-FFF2-40B4-BE49-F238E27FC236}">
-                <a16:creationId xmlns:a16="http://schemas.microsoft.com/office/drawing/2014/main" id="{AA474011-A49D-4C7A-BF41-0ACD0A2693B3}"/>
+                <a16:creationId xmlns:a16="http://schemas.microsoft.com/office/drawing/2014/main" xmlns="" id="{AA474011-A49D-4C7A-BF41-0ACD0A2693B3}"/>
               </a:ext>
               <a:ext uri="{C183D7F6-B498-43B3-948B-1728B52AA6E4}">
-                <adec:decorative xmlns:adec="http://schemas.microsoft.com/office/drawing/2017/decorative" val="1"/>
+                <adec:decorative xmlns:adec="http://schemas.microsoft.com/office/drawing/2017/decorative" xmlns="" val="1"/>
               </a:ext>
             </a:extLst>
           </p:cNvPr>
@@ -13278,11 +13369,7 @@
             <a:spLocks noGrp="1" noRot="1" noChangeAspect="1" noMove="1" noResize="1" noEditPoints="1" noAdjustHandles="1" noChangeArrowheads="1" noChangeShapeType="1" noTextEdit="1"/>
           </p:cNvSpPr>
           <p:nvPr>
-            <p:extLst>
-              <p:ext uri="{386F3935-93C4-4BCD-93E2-E3B085C9AB24}">
-                <p16:designElem xmlns:p16="http://schemas.microsoft.com/office/powerpoint/2015/main" val="1"/>
-              </p:ext>
-            </p:extLst>
+            <p:extLst/>
           </p:nvPr>
         </p:nvSpPr>
         <p:spPr>
@@ -13327,10 +13414,10 @@
           <p:cNvPr id="28" name="Rectangle 27">
             <a:extLst>
               <a:ext uri="{FF2B5EF4-FFF2-40B4-BE49-F238E27FC236}">
-                <a16:creationId xmlns:a16="http://schemas.microsoft.com/office/drawing/2014/main" id="{6D72081E-AD41-4FBB-B02B-698A68DBCA5E}"/>
+                <a16:creationId xmlns:a16="http://schemas.microsoft.com/office/drawing/2014/main" xmlns="" id="{6D72081E-AD41-4FBB-B02B-698A68DBCA5E}"/>
               </a:ext>
               <a:ext uri="{C183D7F6-B498-43B3-948B-1728B52AA6E4}">
-                <adec:decorative xmlns:adec="http://schemas.microsoft.com/office/drawing/2017/decorative" val="1"/>
+                <adec:decorative xmlns:adec="http://schemas.microsoft.com/office/drawing/2017/decorative" xmlns="" val="1"/>
               </a:ext>
             </a:extLst>
           </p:cNvPr>
@@ -13338,11 +13425,7 @@
             <a:spLocks noGrp="1" noRot="1" noChangeAspect="1" noMove="1" noResize="1" noEditPoints="1" noAdjustHandles="1" noChangeArrowheads="1" noChangeShapeType="1" noTextEdit="1"/>
           </p:cNvSpPr>
           <p:nvPr>
-            <p:extLst>
-              <p:ext uri="{386F3935-93C4-4BCD-93E2-E3B085C9AB24}">
-                <p16:designElem xmlns:p16="http://schemas.microsoft.com/office/powerpoint/2015/main" val="1"/>
-              </p:ext>
-            </p:extLst>
+            <p:extLst/>
           </p:nvPr>
         </p:nvSpPr>
         <p:spPr>
@@ -13426,7 +13509,7 @@
           <p:cNvPr id="2" name="標題 1">
             <a:extLst>
               <a:ext uri="{FF2B5EF4-FFF2-40B4-BE49-F238E27FC236}">
-                <a16:creationId xmlns:a16="http://schemas.microsoft.com/office/drawing/2014/main" id="{6115B777-2E4D-4E0F-818F-90F404544B30}"/>
+                <a16:creationId xmlns:a16="http://schemas.microsoft.com/office/drawing/2014/main" xmlns="" id="{6115B777-2E4D-4E0F-818F-90F404544B30}"/>
               </a:ext>
             </a:extLst>
           </p:cNvPr>
@@ -13488,7 +13571,7 @@
           <p:cNvPr id="5" name="內容版面配置區 4">
             <a:extLst>
               <a:ext uri="{FF2B5EF4-FFF2-40B4-BE49-F238E27FC236}">
-                <a16:creationId xmlns:a16="http://schemas.microsoft.com/office/drawing/2014/main" id="{A98FAC5C-8048-4867-9399-C2248D07287A}"/>
+                <a16:creationId xmlns:a16="http://schemas.microsoft.com/office/drawing/2014/main" xmlns="" id="{A98FAC5C-8048-4867-9399-C2248D07287A}"/>
               </a:ext>
             </a:extLst>
           </p:cNvPr>
@@ -13524,10 +13607,10 @@
           <p:cNvPr id="30" name="Rectangle 29">
             <a:extLst>
               <a:ext uri="{FF2B5EF4-FFF2-40B4-BE49-F238E27FC236}">
-                <a16:creationId xmlns:a16="http://schemas.microsoft.com/office/drawing/2014/main" id="{716248AD-805F-41BF-9B57-FC53E5B32F98}"/>
+                <a16:creationId xmlns:a16="http://schemas.microsoft.com/office/drawing/2014/main" xmlns="" id="{716248AD-805F-41BF-9B57-FC53E5B32F98}"/>
               </a:ext>
               <a:ext uri="{C183D7F6-B498-43B3-948B-1728B52AA6E4}">
-                <adec:decorative xmlns:adec="http://schemas.microsoft.com/office/drawing/2017/decorative" val="1"/>
+                <adec:decorative xmlns:adec="http://schemas.microsoft.com/office/drawing/2017/decorative" xmlns="" val="1"/>
               </a:ext>
             </a:extLst>
           </p:cNvPr>
@@ -13535,11 +13618,7 @@
             <a:spLocks noGrp="1" noRot="1" noChangeAspect="1" noMove="1" noResize="1" noEditPoints="1" noAdjustHandles="1" noChangeArrowheads="1" noChangeShapeType="1" noTextEdit="1"/>
           </p:cNvSpPr>
           <p:nvPr>
-            <p:extLst>
-              <p:ext uri="{386F3935-93C4-4BCD-93E2-E3B085C9AB24}">
-                <p16:designElem xmlns:p16="http://schemas.microsoft.com/office/powerpoint/2015/main" val="1"/>
-              </p:ext>
-            </p:extLst>
+            <p:extLst/>
           </p:nvPr>
         </p:nvSpPr>
         <p:spPr>
@@ -13592,10 +13671,10 @@
           <p:cNvPr id="32" name="Rectangle 31">
             <a:extLst>
               <a:ext uri="{FF2B5EF4-FFF2-40B4-BE49-F238E27FC236}">
-                <a16:creationId xmlns:a16="http://schemas.microsoft.com/office/drawing/2014/main" id="{1F82758F-B2B3-4F0A-BB90-4BFFEDD166D6}"/>
+                <a16:creationId xmlns:a16="http://schemas.microsoft.com/office/drawing/2014/main" xmlns="" id="{1F82758F-B2B3-4F0A-BB90-4BFFEDD166D6}"/>
               </a:ext>
               <a:ext uri="{C183D7F6-B498-43B3-948B-1728B52AA6E4}">
-                <adec:decorative xmlns:adec="http://schemas.microsoft.com/office/drawing/2017/decorative" val="1"/>
+                <adec:decorative xmlns:adec="http://schemas.microsoft.com/office/drawing/2017/decorative" xmlns="" val="1"/>
               </a:ext>
             </a:extLst>
           </p:cNvPr>
@@ -13603,11 +13682,7 @@
             <a:spLocks noGrp="1" noRot="1" noChangeAspect="1" noMove="1" noResize="1" noEditPoints="1" noAdjustHandles="1" noChangeArrowheads="1" noChangeShapeType="1" noTextEdit="1"/>
           </p:cNvSpPr>
           <p:nvPr>
-            <p:extLst>
-              <p:ext uri="{386F3935-93C4-4BCD-93E2-E3B085C9AB24}">
-                <p16:designElem xmlns:p16="http://schemas.microsoft.com/office/powerpoint/2015/main" val="1"/>
-              </p:ext>
-            </p:extLst>
+            <p:extLst/>
           </p:nvPr>
         </p:nvSpPr>
         <p:spPr>
@@ -13661,7 +13736,7 @@
           <p:cNvPr id="23" name="Content Placeholder 22">
             <a:extLst>
               <a:ext uri="{FF2B5EF4-FFF2-40B4-BE49-F238E27FC236}">
-                <a16:creationId xmlns:a16="http://schemas.microsoft.com/office/drawing/2014/main" id="{4637202D-E779-47D5-A8BD-0946F0FECB41}"/>
+                <a16:creationId xmlns:a16="http://schemas.microsoft.com/office/drawing/2014/main" xmlns="" id="{4637202D-E779-47D5-A8BD-0946F0FECB41}"/>
               </a:ext>
             </a:extLst>
           </p:cNvPr>
@@ -13698,6 +13773,13 @@
   <p:clrMapOvr>
     <a:masterClrMapping/>
   </p:clrMapOvr>
+  <p:timing>
+    <p:tnLst>
+      <p:par>
+        <p:cTn id="1" dur="indefinite" restart="never" nodeType="tmRoot"/>
+      </p:par>
+    </p:tnLst>
+  </p:timing>
 </p:sld>
 </file>
 

</xml_diff>